<commit_message>
Tried to export plots to powerpoint
</commit_message>
<xml_diff>
--- a/Presentation & Dashboard/DDS401_TeamNI_Case_Study_2.pptx
+++ b/Presentation & Dashboard/DDS401_TeamNI_Case_Study_2.pptx
@@ -10,12 +10,14 @@
     <p:sldId id="257" r:id="rId4"/>
     <p:sldId id="258" r:id="rId5"/>
     <p:sldId id="265" r:id="rId6"/>
-    <p:sldId id="261" r:id="rId7"/>
-    <p:sldId id="259" r:id="rId8"/>
-    <p:sldId id="260" r:id="rId9"/>
-    <p:sldId id="262" r:id="rId10"/>
-    <p:sldId id="263" r:id="rId11"/>
-    <p:sldId id="264" r:id="rId12"/>
+    <p:sldId id="259" r:id="rId7"/>
+    <p:sldId id="260" r:id="rId8"/>
+    <p:sldId id="261" r:id="rId9"/>
+    <p:sldId id="268" r:id="rId10"/>
+    <p:sldId id="267" r:id="rId11"/>
+    <p:sldId id="262" r:id="rId12"/>
+    <p:sldId id="263" r:id="rId13"/>
+    <p:sldId id="264" r:id="rId14"/>
   </p:sldIdLst>
   <p:sldSz cx="12192000" cy="6858000"/>
   <p:notesSz cx="6858000" cy="9144000"/>
@@ -114,13 +116,18 @@
       </a:defRPr>
     </a:lvl9pPr>
   </p:defaultTextStyle>
+  <p:extLst>
+    <p:ext uri="{EFAFB233-063F-42B5-8137-9DF3F51BA10A}">
+      <p15:sldGuideLst xmlns:p15="http://schemas.microsoft.com/office/powerpoint/2012/main"/>
+    </p:ext>
+  </p:extLst>
 </p:presentation>
 </file>
 
 <file path=ppt/revisionInfo.xml><?xml version="1.0" encoding="utf-8"?>
 <p1510:revInfo xmlns:a="http://schemas.openxmlformats.org/drawingml/2006/main" xmlns:r="http://schemas.openxmlformats.org/officeDocument/2006/relationships" xmlns:p1510="http://schemas.microsoft.com/office/powerpoint/2015/10/main">
   <p1510:revLst>
-    <p1510:client id="{9197C983-6F16-4D4F-AD95-479F5CC7F22A}" v="26" dt="2019-02-27T12:42:37.577"/>
+    <p1510:client id="{9197C983-6F16-4D4F-AD95-479F5CC7F22A}" v="62" dt="2019-02-27T16:50:35.602"/>
   </p1510:revLst>
 </p1510:revInfo>
 </file>
@@ -130,7 +137,7 @@
   <pc:docChgLst>
     <pc:chgData name="ayoade dare" userId="1c7e7bc2090c3d74" providerId="LiveId" clId="{9197C983-6F16-4D4F-AD95-479F5CC7F22A}"/>
     <pc:docChg chg="undo custSel mod addSld modSld sldOrd">
-      <pc:chgData name="ayoade dare" userId="1c7e7bc2090c3d74" providerId="LiveId" clId="{9197C983-6F16-4D4F-AD95-479F5CC7F22A}" dt="2019-02-27T12:43:22.404" v="794" actId="26606"/>
+      <pc:chgData name="ayoade dare" userId="1c7e7bc2090c3d74" providerId="LiveId" clId="{9197C983-6F16-4D4F-AD95-479F5CC7F22A}" dt="2019-02-27T16:50:51.446" v="901" actId="20577"/>
       <pc:docMkLst>
         <pc:docMk/>
       </pc:docMkLst>
@@ -193,6 +200,45 @@
             <pc:docMk/>
             <pc:sldMk cId="107446139" sldId="258"/>
             <ac:graphicFrameMk id="7" creationId="{A3A156F5-22EB-4703-B298-28C0CF6CA405}"/>
+          </ac:graphicFrameMkLst>
+        </pc:graphicFrameChg>
+      </pc:sldChg>
+      <pc:sldChg chg="addSp delSp modSp ord">
+        <pc:chgData name="ayoade dare" userId="1c7e7bc2090c3d74" providerId="LiveId" clId="{9197C983-6F16-4D4F-AD95-479F5CC7F22A}" dt="2019-02-27T16:31:22.853" v="809"/>
+        <pc:sldMkLst>
+          <pc:docMk/>
+          <pc:sldMk cId="1068772232" sldId="261"/>
+        </pc:sldMkLst>
+        <pc:spChg chg="del">
+          <ac:chgData name="ayoade dare" userId="1c7e7bc2090c3d74" providerId="LiveId" clId="{9197C983-6F16-4D4F-AD95-479F5CC7F22A}" dt="2019-02-27T16:30:26.846" v="801"/>
+          <ac:spMkLst>
+            <pc:docMk/>
+            <pc:sldMk cId="1068772232" sldId="261"/>
+            <ac:spMk id="2" creationId="{BAC26105-4D67-4F6F-9993-6D5AAA9A5FA2}"/>
+          </ac:spMkLst>
+        </pc:spChg>
+        <pc:spChg chg="del">
+          <ac:chgData name="ayoade dare" userId="1c7e7bc2090c3d74" providerId="LiveId" clId="{9197C983-6F16-4D4F-AD95-479F5CC7F22A}" dt="2019-02-27T16:30:26.846" v="801"/>
+          <ac:spMkLst>
+            <pc:docMk/>
+            <pc:sldMk cId="1068772232" sldId="261"/>
+            <ac:spMk id="3" creationId="{D552C8D5-F8F8-4BDC-8628-1026C9D7E332}"/>
+          </ac:spMkLst>
+        </pc:spChg>
+        <pc:graphicFrameChg chg="del mod">
+          <ac:chgData name="ayoade dare" userId="1c7e7bc2090c3d74" providerId="LiveId" clId="{9197C983-6F16-4D4F-AD95-479F5CC7F22A}" dt="2019-02-27T16:30:02.568" v="798" actId="478"/>
+          <ac:graphicFrameMkLst>
+            <pc:docMk/>
+            <pc:sldMk cId="1068772232" sldId="261"/>
+            <ac:graphicFrameMk id="4" creationId="{D2686EBF-6C8E-44FB-83E9-FA0D740256C9}"/>
+          </ac:graphicFrameMkLst>
+        </pc:graphicFrameChg>
+        <pc:graphicFrameChg chg="add mod">
+          <ac:chgData name="ayoade dare" userId="1c7e7bc2090c3d74" providerId="LiveId" clId="{9197C983-6F16-4D4F-AD95-479F5CC7F22A}" dt="2019-02-27T16:31:12.234" v="808" actId="14100"/>
+          <ac:graphicFrameMkLst>
+            <pc:docMk/>
+            <pc:sldMk cId="1068772232" sldId="261"/>
+            <ac:graphicFrameMk id="5" creationId="{E7591E42-1D4C-4E6A-AFDD-62C7CE348B08}"/>
           </ac:graphicFrameMkLst>
         </pc:graphicFrameChg>
       </pc:sldChg>
@@ -687,6 +733,116 @@
             <pc:docMk/>
             <pc:sldMk cId="1718002653" sldId="266"/>
             <ac:picMk id="9" creationId="{9A01ECE9-79DC-43E2-83FE-05D12EDA3F94}"/>
+          </ac:picMkLst>
+        </pc:picChg>
+      </pc:sldChg>
+      <pc:sldChg chg="addSp delSp modSp add">
+        <pc:chgData name="ayoade dare" userId="1c7e7bc2090c3d74" providerId="LiveId" clId="{9197C983-6F16-4D4F-AD95-479F5CC7F22A}" dt="2019-02-27T16:50:12.583" v="856" actId="20577"/>
+        <pc:sldMkLst>
+          <pc:docMk/>
+          <pc:sldMk cId="2423320413" sldId="267"/>
+        </pc:sldMkLst>
+        <pc:spChg chg="add mod">
+          <ac:chgData name="ayoade dare" userId="1c7e7bc2090c3d74" providerId="LiveId" clId="{9197C983-6F16-4D4F-AD95-479F5CC7F22A}" dt="2019-02-27T16:50:12.583" v="856" actId="20577"/>
+          <ac:spMkLst>
+            <pc:docMk/>
+            <pc:sldMk cId="2423320413" sldId="267"/>
+            <ac:spMk id="3" creationId="{3FFBEA8A-0002-4DC2-BB39-5983C0F9DF26}"/>
+          </ac:spMkLst>
+        </pc:spChg>
+        <pc:spChg chg="add del mod">
+          <ac:chgData name="ayoade dare" userId="1c7e7bc2090c3d74" providerId="LiveId" clId="{9197C983-6F16-4D4F-AD95-479F5CC7F22A}" dt="2019-02-27T16:43:21.494" v="835"/>
+          <ac:spMkLst>
+            <pc:docMk/>
+            <pc:sldMk cId="2423320413" sldId="267"/>
+            <ac:spMk id="4" creationId="{B2838D7B-2614-4528-A4D9-F445695BE0C8}"/>
+          </ac:spMkLst>
+        </pc:spChg>
+        <pc:spChg chg="add del mod">
+          <ac:chgData name="ayoade dare" userId="1c7e7bc2090c3d74" providerId="LiveId" clId="{9197C983-6F16-4D4F-AD95-479F5CC7F22A}" dt="2019-02-27T16:43:28.376" v="837"/>
+          <ac:spMkLst>
+            <pc:docMk/>
+            <pc:sldMk cId="2423320413" sldId="267"/>
+            <ac:spMk id="9" creationId="{5487CAC0-3B69-4A06-8DBE-4C61724C2F72}"/>
+          </ac:spMkLst>
+        </pc:spChg>
+        <pc:spChg chg="add del mod">
+          <ac:chgData name="ayoade dare" userId="1c7e7bc2090c3d74" providerId="LiveId" clId="{9197C983-6F16-4D4F-AD95-479F5CC7F22A}" dt="2019-02-27T16:43:34.345" v="839"/>
+          <ac:spMkLst>
+            <pc:docMk/>
+            <pc:sldMk cId="2423320413" sldId="267"/>
+            <ac:spMk id="13" creationId="{BDDE0685-5A28-409B-A7F7-C6B53DF207FB}"/>
+          </ac:spMkLst>
+        </pc:spChg>
+        <pc:graphicFrameChg chg="add del mod">
+          <ac:chgData name="ayoade dare" userId="1c7e7bc2090c3d74" providerId="LiveId" clId="{9197C983-6F16-4D4F-AD95-479F5CC7F22A}" dt="2019-02-27T16:42:32.359" v="831" actId="478"/>
+          <ac:graphicFrameMkLst>
+            <pc:docMk/>
+            <pc:sldMk cId="2423320413" sldId="267"/>
+            <ac:graphicFrameMk id="2" creationId="{D63D4F79-355F-45AF-B437-81406D6A3DF6}"/>
+          </ac:graphicFrameMkLst>
+        </pc:graphicFrameChg>
+        <pc:graphicFrameChg chg="add del mod">
+          <ac:chgData name="ayoade dare" userId="1c7e7bc2090c3d74" providerId="LiveId" clId="{9197C983-6F16-4D4F-AD95-479F5CC7F22A}" dt="2019-02-27T16:42:50.726" v="834" actId="478"/>
+          <ac:graphicFrameMkLst>
+            <pc:docMk/>
+            <pc:sldMk cId="2423320413" sldId="267"/>
+            <ac:graphicFrameMk id="5" creationId="{AC008592-444E-4CD3-A4C0-FD76D1C0059C}"/>
+          </ac:graphicFrameMkLst>
+        </pc:graphicFrameChg>
+        <pc:picChg chg="add del mod">
+          <ac:chgData name="ayoade dare" userId="1c7e7bc2090c3d74" providerId="LiveId" clId="{9197C983-6F16-4D4F-AD95-479F5CC7F22A}" dt="2019-02-27T16:43:23.897" v="836" actId="478"/>
+          <ac:picMkLst>
+            <pc:docMk/>
+            <pc:sldMk cId="2423320413" sldId="267"/>
+            <ac:picMk id="7" creationId="{44699F63-E187-4CC0-BA1A-B00DDCBBF74A}"/>
+          </ac:picMkLst>
+        </pc:picChg>
+        <pc:picChg chg="add del mod">
+          <ac:chgData name="ayoade dare" userId="1c7e7bc2090c3d74" providerId="LiveId" clId="{9197C983-6F16-4D4F-AD95-479F5CC7F22A}" dt="2019-02-27T16:43:31.521" v="838" actId="478"/>
+          <ac:picMkLst>
+            <pc:docMk/>
+            <pc:sldMk cId="2423320413" sldId="267"/>
+            <ac:picMk id="11" creationId="{26972910-795E-453E-A2E5-10C079E5BF03}"/>
+          </ac:picMkLst>
+        </pc:picChg>
+        <pc:picChg chg="add mod">
+          <ac:chgData name="ayoade dare" userId="1c7e7bc2090c3d74" providerId="LiveId" clId="{9197C983-6F16-4D4F-AD95-479F5CC7F22A}" dt="2019-02-27T16:43:34.345" v="839"/>
+          <ac:picMkLst>
+            <pc:docMk/>
+            <pc:sldMk cId="2423320413" sldId="267"/>
+            <ac:picMk id="15" creationId="{9FDE5CF5-1C98-4D9A-9E45-76796F34181D}"/>
+          </ac:picMkLst>
+        </pc:picChg>
+      </pc:sldChg>
+      <pc:sldChg chg="addSp delSp modSp add ord">
+        <pc:chgData name="ayoade dare" userId="1c7e7bc2090c3d74" providerId="LiveId" clId="{9197C983-6F16-4D4F-AD95-479F5CC7F22A}" dt="2019-02-27T16:50:51.446" v="901" actId="20577"/>
+        <pc:sldMkLst>
+          <pc:docMk/>
+          <pc:sldMk cId="909329800" sldId="268"/>
+        </pc:sldMkLst>
+        <pc:spChg chg="mod">
+          <ac:chgData name="ayoade dare" userId="1c7e7bc2090c3d74" providerId="LiveId" clId="{9197C983-6F16-4D4F-AD95-479F5CC7F22A}" dt="2019-02-27T16:50:51.446" v="901" actId="20577"/>
+          <ac:spMkLst>
+            <pc:docMk/>
+            <pc:sldMk cId="909329800" sldId="268"/>
+            <ac:spMk id="2" creationId="{47A035B7-AA91-47B2-875A-FCCE9CCE653D}"/>
+          </ac:spMkLst>
+        </pc:spChg>
+        <pc:spChg chg="del">
+          <ac:chgData name="ayoade dare" userId="1c7e7bc2090c3d74" providerId="LiveId" clId="{9197C983-6F16-4D4F-AD95-479F5CC7F22A}" dt="2019-02-27T16:43:53.004" v="841"/>
+          <ac:spMkLst>
+            <pc:docMk/>
+            <pc:sldMk cId="909329800" sldId="268"/>
+            <ac:spMk id="3" creationId="{3139C32F-B6C3-4502-92E6-A94B5EE21D9E}"/>
+          </ac:spMkLst>
+        </pc:spChg>
+        <pc:picChg chg="add mod">
+          <ac:chgData name="ayoade dare" userId="1c7e7bc2090c3d74" providerId="LiveId" clId="{9197C983-6F16-4D4F-AD95-479F5CC7F22A}" dt="2019-02-27T16:43:53.004" v="841"/>
+          <ac:picMkLst>
+            <pc:docMk/>
+            <pc:sldMk cId="909329800" sldId="268"/>
+            <ac:picMk id="5" creationId="{31620787-4E64-459B-B76D-9D620375F254}"/>
           </ac:picMkLst>
         </pc:picChg>
       </pc:sldChg>
@@ -11187,7 +11343,7 @@
           <a:noFill/>
           <a:extLst>
             <a:ext uri="{909E8E84-426E-40dd-AFC4-6F175D3DCCD1}">
-              <a14:hiddenFill xmlns:a14="http://schemas.microsoft.com/office/drawing/2010/main" xmlns="">
+              <a14:hiddenFill xmlns="" xmlns:a14="http://schemas.microsoft.com/office/drawing/2010/main">
                 <a:solidFill>
                   <a:srgbClr val="FFFFFF"/>
                 </a:solidFill>
@@ -11246,7 +11402,7 @@
             </a:ln>
             <a:extLst>
               <a:ext uri="{91240B29-F687-4f45-9708-019B960494DF}">
-                <a14:hiddenLine xmlns:a14="http://schemas.microsoft.com/office/drawing/2010/main" xmlns="" w="9525">
+                <a14:hiddenLine xmlns="" xmlns:a14="http://schemas.microsoft.com/office/drawing/2010/main" w="9525">
                   <a:solidFill>
                     <a:srgbClr val="000000"/>
                   </a:solidFill>
@@ -11336,7 +11492,7 @@
             </a:ln>
             <a:extLst>
               <a:ext uri="{91240B29-F687-4f45-9708-019B960494DF}">
-                <a14:hiddenLine xmlns:a14="http://schemas.microsoft.com/office/drawing/2010/main" xmlns="" w="9525">
+                <a14:hiddenLine xmlns="" xmlns:a14="http://schemas.microsoft.com/office/drawing/2010/main" w="9525">
                   <a:solidFill>
                     <a:srgbClr val="000000"/>
                   </a:solidFill>
@@ -11426,7 +11582,7 @@
             </a:ln>
             <a:extLst>
               <a:ext uri="{91240B29-F687-4f45-9708-019B960494DF}">
-                <a14:hiddenLine xmlns:a14="http://schemas.microsoft.com/office/drawing/2010/main" xmlns="" w="9525">
+                <a14:hiddenLine xmlns="" xmlns:a14="http://schemas.microsoft.com/office/drawing/2010/main" w="9525">
                   <a:solidFill>
                     <a:srgbClr val="000000"/>
                   </a:solidFill>
@@ -11460,7 +11616,7 @@
             </a:ln>
             <a:extLst>
               <a:ext uri="{91240B29-F687-4f45-9708-019B960494DF}">
-                <a14:hiddenLine xmlns:a14="http://schemas.microsoft.com/office/drawing/2010/main" xmlns="" w="9525">
+                <a14:hiddenLine xmlns="" xmlns:a14="http://schemas.microsoft.com/office/drawing/2010/main" w="9525">
                   <a:solidFill>
                     <a:srgbClr val="000000"/>
                   </a:solidFill>
@@ -11550,7 +11706,7 @@
             </a:ln>
             <a:extLst>
               <a:ext uri="{91240B29-F687-4f45-9708-019B960494DF}">
-                <a14:hiddenLine xmlns:a14="http://schemas.microsoft.com/office/drawing/2010/main" xmlns="" w="9525">
+                <a14:hiddenLine xmlns="" xmlns:a14="http://schemas.microsoft.com/office/drawing/2010/main" w="9525">
                   <a:solidFill>
                     <a:srgbClr val="000000"/>
                   </a:solidFill>
@@ -11612,7 +11768,7 @@
             </a:ln>
             <a:extLst>
               <a:ext uri="{91240B29-F687-4f45-9708-019B960494DF}">
-                <a14:hiddenLine xmlns:a14="http://schemas.microsoft.com/office/drawing/2010/main" xmlns="" w="9525">
+                <a14:hiddenLine xmlns="" xmlns:a14="http://schemas.microsoft.com/office/drawing/2010/main" w="9525">
                   <a:solidFill>
                     <a:srgbClr val="000000"/>
                   </a:solidFill>
@@ -11674,7 +11830,7 @@
             </a:ln>
             <a:extLst>
               <a:ext uri="{91240B29-F687-4f45-9708-019B960494DF}">
-                <a14:hiddenLine xmlns:a14="http://schemas.microsoft.com/office/drawing/2010/main" xmlns="" w="9525">
+                <a14:hiddenLine xmlns="" xmlns:a14="http://schemas.microsoft.com/office/drawing/2010/main" w="9525">
                   <a:solidFill>
                     <a:srgbClr val="000000"/>
                   </a:solidFill>
@@ -11764,7 +11920,7 @@
             </a:ln>
             <a:extLst>
               <a:ext uri="{91240B29-F687-4f45-9708-019B960494DF}">
-                <a14:hiddenLine xmlns:a14="http://schemas.microsoft.com/office/drawing/2010/main" xmlns="" w="9525">
+                <a14:hiddenLine xmlns="" xmlns:a14="http://schemas.microsoft.com/office/drawing/2010/main" w="9525">
                   <a:solidFill>
                     <a:srgbClr val="000000"/>
                   </a:solidFill>
@@ -11826,7 +11982,7 @@
             </a:ln>
             <a:extLst>
               <a:ext uri="{91240B29-F687-4f45-9708-019B960494DF}">
-                <a14:hiddenLine xmlns:a14="http://schemas.microsoft.com/office/drawing/2010/main" xmlns="" w="9525">
+                <a14:hiddenLine xmlns="" xmlns:a14="http://schemas.microsoft.com/office/drawing/2010/main" w="9525">
                   <a:solidFill>
                     <a:srgbClr val="000000"/>
                   </a:solidFill>
@@ -11888,7 +12044,7 @@
             </a:ln>
             <a:extLst>
               <a:ext uri="{91240B29-F687-4f45-9708-019B960494DF}">
-                <a14:hiddenLine xmlns:a14="http://schemas.microsoft.com/office/drawing/2010/main" xmlns="" w="9525">
+                <a14:hiddenLine xmlns="" xmlns:a14="http://schemas.microsoft.com/office/drawing/2010/main" w="9525">
                   <a:solidFill>
                     <a:srgbClr val="000000"/>
                   </a:solidFill>
@@ -11978,7 +12134,7 @@
             </a:ln>
             <a:extLst>
               <a:ext uri="{91240B29-F687-4f45-9708-019B960494DF}">
-                <a14:hiddenLine xmlns:a14="http://schemas.microsoft.com/office/drawing/2010/main" xmlns="" w="9525">
+                <a14:hiddenLine xmlns="" xmlns:a14="http://schemas.microsoft.com/office/drawing/2010/main" w="9525">
                   <a:solidFill>
                     <a:srgbClr val="000000"/>
                   </a:solidFill>
@@ -12068,7 +12224,7 @@
             </a:ln>
             <a:extLst>
               <a:ext uri="{91240B29-F687-4f45-9708-019B960494DF}">
-                <a14:hiddenLine xmlns:a14="http://schemas.microsoft.com/office/drawing/2010/main" xmlns="" w="9525">
+                <a14:hiddenLine xmlns="" xmlns:a14="http://schemas.microsoft.com/office/drawing/2010/main" w="9525">
                   <a:solidFill>
                     <a:srgbClr val="000000"/>
                   </a:solidFill>
@@ -12130,7 +12286,7 @@
             </a:ln>
             <a:extLst>
               <a:ext uri="{91240B29-F687-4f45-9708-019B960494DF}">
-                <a14:hiddenLine xmlns:a14="http://schemas.microsoft.com/office/drawing/2010/main" xmlns="" w="9525">
+                <a14:hiddenLine xmlns="" xmlns:a14="http://schemas.microsoft.com/office/drawing/2010/main" w="9525">
                   <a:solidFill>
                     <a:srgbClr val="000000"/>
                   </a:solidFill>
@@ -12240,7 +12396,7 @@
             </a:ln>
             <a:extLst>
               <a:ext uri="{91240B29-F687-4f45-9708-019B960494DF}">
-                <a14:hiddenLine xmlns:a14="http://schemas.microsoft.com/office/drawing/2010/main" xmlns="" w="9525">
+                <a14:hiddenLine xmlns="" xmlns:a14="http://schemas.microsoft.com/office/drawing/2010/main" w="9525">
                   <a:solidFill>
                     <a:srgbClr val="000000"/>
                   </a:solidFill>
@@ -12302,7 +12458,7 @@
             </a:ln>
             <a:extLst>
               <a:ext uri="{91240B29-F687-4f45-9708-019B960494DF}">
-                <a14:hiddenLine xmlns:a14="http://schemas.microsoft.com/office/drawing/2010/main" xmlns="" w="9525">
+                <a14:hiddenLine xmlns="" xmlns:a14="http://schemas.microsoft.com/office/drawing/2010/main" w="9525">
                   <a:solidFill>
                     <a:srgbClr val="000000"/>
                   </a:solidFill>
@@ -12392,7 +12548,7 @@
             </a:ln>
             <a:extLst>
               <a:ext uri="{91240B29-F687-4f45-9708-019B960494DF}">
-                <a14:hiddenLine xmlns:a14="http://schemas.microsoft.com/office/drawing/2010/main" xmlns="" w="9525">
+                <a14:hiddenLine xmlns="" xmlns:a14="http://schemas.microsoft.com/office/drawing/2010/main" w="9525">
                   <a:solidFill>
                     <a:srgbClr val="000000"/>
                   </a:solidFill>
@@ -12482,7 +12638,7 @@
             </a:ln>
             <a:extLst>
               <a:ext uri="{91240B29-F687-4f45-9708-019B960494DF}">
-                <a14:hiddenLine xmlns:a14="http://schemas.microsoft.com/office/drawing/2010/main" xmlns="" w="9525">
+                <a14:hiddenLine xmlns="" xmlns:a14="http://schemas.microsoft.com/office/drawing/2010/main" w="9525">
                   <a:solidFill>
                     <a:srgbClr val="000000"/>
                   </a:solidFill>
@@ -12544,7 +12700,7 @@
             </a:ln>
             <a:extLst>
               <a:ext uri="{91240B29-F687-4f45-9708-019B960494DF}">
-                <a14:hiddenLine xmlns:a14="http://schemas.microsoft.com/office/drawing/2010/main" xmlns="" w="9525">
+                <a14:hiddenLine xmlns="" xmlns:a14="http://schemas.microsoft.com/office/drawing/2010/main" w="9525">
                   <a:solidFill>
                     <a:srgbClr val="000000"/>
                   </a:solidFill>
@@ -12634,7 +12790,7 @@
             </a:ln>
             <a:extLst>
               <a:ext uri="{91240B29-F687-4f45-9708-019B960494DF}">
-                <a14:hiddenLine xmlns:a14="http://schemas.microsoft.com/office/drawing/2010/main" xmlns="" w="9525">
+                <a14:hiddenLine xmlns="" xmlns:a14="http://schemas.microsoft.com/office/drawing/2010/main" w="9525">
                   <a:solidFill>
                     <a:srgbClr val="000000"/>
                   </a:solidFill>
@@ -12724,7 +12880,7 @@
             </a:ln>
             <a:extLst>
               <a:ext uri="{91240B29-F687-4f45-9708-019B960494DF}">
-                <a14:hiddenLine xmlns:a14="http://schemas.microsoft.com/office/drawing/2010/main" xmlns="" w="9525">
+                <a14:hiddenLine xmlns="" xmlns:a14="http://schemas.microsoft.com/office/drawing/2010/main" w="9525">
                   <a:solidFill>
                     <a:srgbClr val="000000"/>
                   </a:solidFill>
@@ -12780,7 +12936,7 @@
             </a:ln>
             <a:extLst>
               <a:ext uri="{91240B29-F687-4f45-9708-019B960494DF}">
-                <a14:hiddenLine xmlns:a14="http://schemas.microsoft.com/office/drawing/2010/main" xmlns="" w="9525">
+                <a14:hiddenLine xmlns="" xmlns:a14="http://schemas.microsoft.com/office/drawing/2010/main" w="9525">
                   <a:solidFill>
                     <a:srgbClr val="000000"/>
                   </a:solidFill>
@@ -12870,7 +13026,7 @@
             </a:ln>
             <a:extLst>
               <a:ext uri="{91240B29-F687-4f45-9708-019B960494DF}">
-                <a14:hiddenLine xmlns:a14="http://schemas.microsoft.com/office/drawing/2010/main" xmlns="" w="9525">
+                <a14:hiddenLine xmlns="" xmlns:a14="http://schemas.microsoft.com/office/drawing/2010/main" w="9525">
                   <a:solidFill>
                     <a:srgbClr val="000000"/>
                   </a:solidFill>
@@ -12926,7 +13082,7 @@
             </a:ln>
             <a:extLst>
               <a:ext uri="{91240B29-F687-4f45-9708-019B960494DF}">
-                <a14:hiddenLine xmlns:a14="http://schemas.microsoft.com/office/drawing/2010/main" xmlns="" w="9525">
+                <a14:hiddenLine xmlns="" xmlns:a14="http://schemas.microsoft.com/office/drawing/2010/main" w="9525">
                   <a:solidFill>
                     <a:srgbClr val="000000"/>
                   </a:solidFill>
@@ -13016,7 +13172,7 @@
             </a:ln>
             <a:extLst>
               <a:ext uri="{91240B29-F687-4f45-9708-019B960494DF}">
-                <a14:hiddenLine xmlns:a14="http://schemas.microsoft.com/office/drawing/2010/main" xmlns="" w="9525">
+                <a14:hiddenLine xmlns="" xmlns:a14="http://schemas.microsoft.com/office/drawing/2010/main" w="9525">
                   <a:solidFill>
                     <a:srgbClr val="000000"/>
                   </a:solidFill>
@@ -13084,7 +13240,7 @@
             </a:ln>
             <a:extLst>
               <a:ext uri="{91240B29-F687-4f45-9708-019B960494DF}">
-                <a14:hiddenLine xmlns:a14="http://schemas.microsoft.com/office/drawing/2010/main" xmlns="" w="9525">
+                <a14:hiddenLine xmlns="" xmlns:a14="http://schemas.microsoft.com/office/drawing/2010/main" w="9525">
                   <a:solidFill>
                     <a:srgbClr val="000000"/>
                   </a:solidFill>
@@ -13174,7 +13330,7 @@
             </a:ln>
             <a:extLst>
               <a:ext uri="{91240B29-F687-4f45-9708-019B960494DF}">
-                <a14:hiddenLine xmlns:a14="http://schemas.microsoft.com/office/drawing/2010/main" xmlns="" w="9525">
+                <a14:hiddenLine xmlns="" xmlns:a14="http://schemas.microsoft.com/office/drawing/2010/main" w="9525">
                   <a:solidFill>
                     <a:srgbClr val="000000"/>
                   </a:solidFill>
@@ -13242,7 +13398,7 @@
             </a:ln>
             <a:extLst>
               <a:ext uri="{91240B29-F687-4f45-9708-019B960494DF}">
-                <a14:hiddenLine xmlns:a14="http://schemas.microsoft.com/office/drawing/2010/main" xmlns="" w="9525">
+                <a14:hiddenLine xmlns="" xmlns:a14="http://schemas.microsoft.com/office/drawing/2010/main" w="9525">
                   <a:solidFill>
                     <a:srgbClr val="000000"/>
                   </a:solidFill>
@@ -13332,7 +13488,7 @@
             </a:ln>
             <a:extLst>
               <a:ext uri="{91240B29-F687-4f45-9708-019B960494DF}">
-                <a14:hiddenLine xmlns:a14="http://schemas.microsoft.com/office/drawing/2010/main" xmlns="" w="9525">
+                <a14:hiddenLine xmlns="" xmlns:a14="http://schemas.microsoft.com/office/drawing/2010/main" w="9525">
                   <a:solidFill>
                     <a:srgbClr val="000000"/>
                   </a:solidFill>
@@ -13366,7 +13522,7 @@
             </a:ln>
             <a:extLst>
               <a:ext uri="{91240B29-F687-4f45-9708-019B960494DF}">
-                <a14:hiddenLine xmlns:a14="http://schemas.microsoft.com/office/drawing/2010/main" xmlns="" w="9525">
+                <a14:hiddenLine xmlns="" xmlns:a14="http://schemas.microsoft.com/office/drawing/2010/main" w="9525">
                   <a:solidFill>
                     <a:srgbClr val="000000"/>
                   </a:solidFill>
@@ -13456,7 +13612,7 @@
             </a:ln>
             <a:extLst>
               <a:ext uri="{91240B29-F687-4f45-9708-019B960494DF}">
-                <a14:hiddenLine xmlns:a14="http://schemas.microsoft.com/office/drawing/2010/main" xmlns="" w="9525">
+                <a14:hiddenLine xmlns="" xmlns:a14="http://schemas.microsoft.com/office/drawing/2010/main" w="9525">
                   <a:solidFill>
                     <a:srgbClr val="000000"/>
                   </a:solidFill>
@@ -13518,7 +13674,7 @@
             </a:ln>
             <a:extLst>
               <a:ext uri="{91240B29-F687-4f45-9708-019B960494DF}">
-                <a14:hiddenLine xmlns:a14="http://schemas.microsoft.com/office/drawing/2010/main" xmlns="" w="9525">
+                <a14:hiddenLine xmlns="" xmlns:a14="http://schemas.microsoft.com/office/drawing/2010/main" w="9525">
                   <a:solidFill>
                     <a:srgbClr val="000000"/>
                   </a:solidFill>
@@ -13580,7 +13736,7 @@
             </a:ln>
             <a:extLst>
               <a:ext uri="{91240B29-F687-4f45-9708-019B960494DF}">
-                <a14:hiddenLine xmlns:a14="http://schemas.microsoft.com/office/drawing/2010/main" xmlns="" w="9525">
+                <a14:hiddenLine xmlns="" xmlns:a14="http://schemas.microsoft.com/office/drawing/2010/main" w="9525">
                   <a:solidFill>
                     <a:srgbClr val="000000"/>
                   </a:solidFill>
@@ -13670,7 +13826,7 @@
             </a:ln>
             <a:extLst>
               <a:ext uri="{91240B29-F687-4f45-9708-019B960494DF}">
-                <a14:hiddenLine xmlns:a14="http://schemas.microsoft.com/office/drawing/2010/main" xmlns="" w="9525">
+                <a14:hiddenLine xmlns="" xmlns:a14="http://schemas.microsoft.com/office/drawing/2010/main" w="9525">
                   <a:solidFill>
                     <a:srgbClr val="000000"/>
                   </a:solidFill>
@@ -13738,7 +13894,7 @@
             </a:ln>
             <a:extLst>
               <a:ext uri="{91240B29-F687-4f45-9708-019B960494DF}">
-                <a14:hiddenLine xmlns:a14="http://schemas.microsoft.com/office/drawing/2010/main" xmlns="" w="9525">
+                <a14:hiddenLine xmlns="" xmlns:a14="http://schemas.microsoft.com/office/drawing/2010/main" w="9525">
                   <a:solidFill>
                     <a:srgbClr val="000000"/>
                   </a:solidFill>
@@ -13800,7 +13956,7 @@
             </a:ln>
             <a:extLst>
               <a:ext uri="{91240B29-F687-4f45-9708-019B960494DF}">
-                <a14:hiddenLine xmlns:a14="http://schemas.microsoft.com/office/drawing/2010/main" xmlns="" w="9525">
+                <a14:hiddenLine xmlns="" xmlns:a14="http://schemas.microsoft.com/office/drawing/2010/main" w="9525">
                   <a:solidFill>
                     <a:srgbClr val="000000"/>
                   </a:solidFill>
@@ -13890,7 +14046,7 @@
             </a:ln>
             <a:extLst>
               <a:ext uri="{91240B29-F687-4f45-9708-019B960494DF}">
-                <a14:hiddenLine xmlns:a14="http://schemas.microsoft.com/office/drawing/2010/main" xmlns="" w="9525">
+                <a14:hiddenLine xmlns="" xmlns:a14="http://schemas.microsoft.com/office/drawing/2010/main" w="9525">
                   <a:solidFill>
                     <a:srgbClr val="000000"/>
                   </a:solidFill>
@@ -13952,7 +14108,7 @@
             </a:ln>
             <a:extLst>
               <a:ext uri="{91240B29-F687-4f45-9708-019B960494DF}">
-                <a14:hiddenLine xmlns:a14="http://schemas.microsoft.com/office/drawing/2010/main" xmlns="" w="9525">
+                <a14:hiddenLine xmlns="" xmlns:a14="http://schemas.microsoft.com/office/drawing/2010/main" w="9525">
                   <a:solidFill>
                     <a:srgbClr val="000000"/>
                   </a:solidFill>
@@ -14042,7 +14198,7 @@
             </a:ln>
             <a:extLst>
               <a:ext uri="{91240B29-F687-4f45-9708-019B960494DF}">
-                <a14:hiddenLine xmlns:a14="http://schemas.microsoft.com/office/drawing/2010/main" xmlns="" w="9525">
+                <a14:hiddenLine xmlns="" xmlns:a14="http://schemas.microsoft.com/office/drawing/2010/main" w="9525">
                   <a:solidFill>
                     <a:srgbClr val="000000"/>
                   </a:solidFill>
@@ -14104,7 +14260,7 @@
             </a:ln>
             <a:extLst>
               <a:ext uri="{91240B29-F687-4f45-9708-019B960494DF}">
-                <a14:hiddenLine xmlns:a14="http://schemas.microsoft.com/office/drawing/2010/main" xmlns="" w="9525">
+                <a14:hiddenLine xmlns="" xmlns:a14="http://schemas.microsoft.com/office/drawing/2010/main" w="9525">
                   <a:solidFill>
                     <a:srgbClr val="000000"/>
                   </a:solidFill>
@@ -14194,7 +14350,7 @@
             </a:ln>
             <a:extLst>
               <a:ext uri="{91240B29-F687-4f45-9708-019B960494DF}">
-                <a14:hiddenLine xmlns:a14="http://schemas.microsoft.com/office/drawing/2010/main" xmlns="" w="9525">
+                <a14:hiddenLine xmlns="" xmlns:a14="http://schemas.microsoft.com/office/drawing/2010/main" w="9525">
                   <a:solidFill>
                     <a:srgbClr val="000000"/>
                   </a:solidFill>
@@ -14228,7 +14384,7 @@
             </a:ln>
             <a:extLst>
               <a:ext uri="{91240B29-F687-4f45-9708-019B960494DF}">
-                <a14:hiddenLine xmlns:a14="http://schemas.microsoft.com/office/drawing/2010/main" xmlns="" w="9525">
+                <a14:hiddenLine xmlns="" xmlns:a14="http://schemas.microsoft.com/office/drawing/2010/main" w="9525">
                   <a:solidFill>
                     <a:srgbClr val="000000"/>
                   </a:solidFill>
@@ -14293,7 +14449,7 @@
             </a:ln>
             <a:extLst>
               <a:ext uri="{91240B29-F687-4f45-9708-019B960494DF}">
-                <a14:hiddenLine xmlns:a14="http://schemas.microsoft.com/office/drawing/2010/main" xmlns="" w="9525">
+                <a14:hiddenLine xmlns="" xmlns:a14="http://schemas.microsoft.com/office/drawing/2010/main" w="9525">
                   <a:solidFill>
                     <a:srgbClr val="000000"/>
                   </a:solidFill>
@@ -14383,7 +14539,7 @@
             </a:ln>
             <a:extLst>
               <a:ext uri="{91240B29-F687-4f45-9708-019B960494DF}">
-                <a14:hiddenLine xmlns:a14="http://schemas.microsoft.com/office/drawing/2010/main" xmlns="" w="9525">
+                <a14:hiddenLine xmlns="" xmlns:a14="http://schemas.microsoft.com/office/drawing/2010/main" w="9525">
                   <a:solidFill>
                     <a:srgbClr val="000000"/>
                   </a:solidFill>
@@ -14445,7 +14601,7 @@
             </a:ln>
             <a:extLst>
               <a:ext uri="{91240B29-F687-4f45-9708-019B960494DF}">
-                <a14:hiddenLine xmlns:a14="http://schemas.microsoft.com/office/drawing/2010/main" xmlns="" w="9525">
+                <a14:hiddenLine xmlns="" xmlns:a14="http://schemas.microsoft.com/office/drawing/2010/main" w="9525">
                   <a:solidFill>
                     <a:srgbClr val="000000"/>
                   </a:solidFill>
@@ -14535,7 +14691,7 @@
             </a:ln>
             <a:extLst>
               <a:ext uri="{91240B29-F687-4f45-9708-019B960494DF}">
-                <a14:hiddenLine xmlns:a14="http://schemas.microsoft.com/office/drawing/2010/main" xmlns="" w="9525">
+                <a14:hiddenLine xmlns="" xmlns:a14="http://schemas.microsoft.com/office/drawing/2010/main" w="9525">
                   <a:solidFill>
                     <a:srgbClr val="000000"/>
                   </a:solidFill>
@@ -14625,7 +14781,7 @@
             </a:ln>
             <a:extLst>
               <a:ext uri="{91240B29-F687-4f45-9708-019B960494DF}">
-                <a14:hiddenLine xmlns:a14="http://schemas.microsoft.com/office/drawing/2010/main" xmlns="" w="9525">
+                <a14:hiddenLine xmlns="" xmlns:a14="http://schemas.microsoft.com/office/drawing/2010/main" w="9525">
                   <a:solidFill>
                     <a:srgbClr val="000000"/>
                   </a:solidFill>
@@ -14690,7 +14846,7 @@
             </a:ln>
             <a:extLst>
               <a:ext uri="{91240B29-F687-4f45-9708-019B960494DF}">
-                <a14:hiddenLine xmlns:a14="http://schemas.microsoft.com/office/drawing/2010/main" xmlns="" w="9525">
+                <a14:hiddenLine xmlns="" xmlns:a14="http://schemas.microsoft.com/office/drawing/2010/main" w="9525">
                   <a:solidFill>
                     <a:srgbClr val="000000"/>
                   </a:solidFill>
@@ -14752,7 +14908,7 @@
             </a:ln>
             <a:extLst>
               <a:ext uri="{91240B29-F687-4f45-9708-019B960494DF}">
-                <a14:hiddenLine xmlns:a14="http://schemas.microsoft.com/office/drawing/2010/main" xmlns="" w="9525">
+                <a14:hiddenLine xmlns="" xmlns:a14="http://schemas.microsoft.com/office/drawing/2010/main" w="9525">
                   <a:solidFill>
                     <a:srgbClr val="000000"/>
                   </a:solidFill>
@@ -14842,7 +14998,7 @@
             </a:ln>
             <a:extLst>
               <a:ext uri="{91240B29-F687-4f45-9708-019B960494DF}">
-                <a14:hiddenLine xmlns:a14="http://schemas.microsoft.com/office/drawing/2010/main" xmlns="" w="9525">
+                <a14:hiddenLine xmlns="" xmlns:a14="http://schemas.microsoft.com/office/drawing/2010/main" w="9525">
                   <a:solidFill>
                     <a:srgbClr val="000000"/>
                   </a:solidFill>
@@ -14932,7 +15088,7 @@
             </a:ln>
             <a:extLst>
               <a:ext uri="{91240B29-F687-4f45-9708-019B960494DF}">
-                <a14:hiddenLine xmlns:a14="http://schemas.microsoft.com/office/drawing/2010/main" xmlns="" w="9525">
+                <a14:hiddenLine xmlns="" xmlns:a14="http://schemas.microsoft.com/office/drawing/2010/main" w="9525">
                   <a:solidFill>
                     <a:srgbClr val="000000"/>
                   </a:solidFill>
@@ -14994,7 +15150,7 @@
             </a:ln>
             <a:extLst>
               <a:ext uri="{91240B29-F687-4f45-9708-019B960494DF}">
-                <a14:hiddenLine xmlns:a14="http://schemas.microsoft.com/office/drawing/2010/main" xmlns="" w="9525">
+                <a14:hiddenLine xmlns="" xmlns:a14="http://schemas.microsoft.com/office/drawing/2010/main" w="9525">
                   <a:solidFill>
                     <a:srgbClr val="000000"/>
                   </a:solidFill>
@@ -15114,7 +15270,7 @@
             </a:ln>
             <a:extLst>
               <a:ext uri="{91240B29-F687-4f45-9708-019B960494DF}">
-                <a14:hiddenLine xmlns:a14="http://schemas.microsoft.com/office/drawing/2010/main" xmlns="" w="9525">
+                <a14:hiddenLine xmlns="" xmlns:a14="http://schemas.microsoft.com/office/drawing/2010/main" w="9525">
                   <a:solidFill>
                     <a:srgbClr val="000000"/>
                   </a:solidFill>
@@ -15182,7 +15338,7 @@
             </a:ln>
             <a:extLst>
               <a:ext uri="{91240B29-F687-4f45-9708-019B960494DF}">
-                <a14:hiddenLine xmlns:a14="http://schemas.microsoft.com/office/drawing/2010/main" xmlns="" w="9525">
+                <a14:hiddenLine xmlns="" xmlns:a14="http://schemas.microsoft.com/office/drawing/2010/main" w="9525">
                   <a:solidFill>
                     <a:srgbClr val="000000"/>
                   </a:solidFill>
@@ -15272,7 +15428,7 @@
             </a:ln>
             <a:extLst>
               <a:ext uri="{91240B29-F687-4f45-9708-019B960494DF}">
-                <a14:hiddenLine xmlns:a14="http://schemas.microsoft.com/office/drawing/2010/main" xmlns="" w="9525">
+                <a14:hiddenLine xmlns="" xmlns:a14="http://schemas.microsoft.com/office/drawing/2010/main" w="9525">
                   <a:solidFill>
                     <a:srgbClr val="000000"/>
                   </a:solidFill>
@@ -15412,7 +15568,7 @@
           <a:p>
             <a:fld id="{CB81FF3C-9236-4431-B1BA-FF74CFEC165A}" type="datetimeFigureOut">
               <a:rPr lang="en-US" smtClean="0"/>
-              <a:t>2/26/2019</a:t>
+              <a:t>2/27/2019</a:t>
             </a:fld>
             <a:endParaRPr lang="en-US"/>
           </a:p>
@@ -15679,7 +15835,7 @@
           <a:p>
             <a:fld id="{CB81FF3C-9236-4431-B1BA-FF74CFEC165A}" type="datetimeFigureOut">
               <a:rPr lang="en-US" smtClean="0"/>
-              <a:t>2/26/2019</a:t>
+              <a:t>2/27/2019</a:t>
             </a:fld>
             <a:endParaRPr lang="en-US"/>
           </a:p>
@@ -15875,7 +16031,7 @@
           <a:p>
             <a:fld id="{CB81FF3C-9236-4431-B1BA-FF74CFEC165A}" type="datetimeFigureOut">
               <a:rPr lang="en-US" smtClean="0"/>
-              <a:t>2/26/2019</a:t>
+              <a:t>2/27/2019</a:t>
             </a:fld>
             <a:endParaRPr lang="en-US"/>
           </a:p>
@@ -16138,7 +16294,7 @@
           <a:p>
             <a:fld id="{CB81FF3C-9236-4431-B1BA-FF74CFEC165A}" type="datetimeFigureOut">
               <a:rPr lang="en-US" smtClean="0"/>
-              <a:t>2/26/2019</a:t>
+              <a:t>2/27/2019</a:t>
             </a:fld>
             <a:endParaRPr lang="en-US"/>
           </a:p>
@@ -16572,7 +16728,7 @@
           <a:p>
             <a:fld id="{CB81FF3C-9236-4431-B1BA-FF74CFEC165A}" type="datetimeFigureOut">
               <a:rPr lang="en-US" smtClean="0"/>
-              <a:t>2/26/2019</a:t>
+              <a:t>2/27/2019</a:t>
             </a:fld>
             <a:endParaRPr lang="en-US"/>
           </a:p>
@@ -17118,7 +17274,7 @@
           <a:p>
             <a:fld id="{CB81FF3C-9236-4431-B1BA-FF74CFEC165A}" type="datetimeFigureOut">
               <a:rPr lang="en-US" smtClean="0"/>
-              <a:t>2/26/2019</a:t>
+              <a:t>2/27/2019</a:t>
             </a:fld>
             <a:endParaRPr lang="en-US"/>
           </a:p>
@@ -17838,7 +17994,7 @@
           <a:p>
             <a:fld id="{CB81FF3C-9236-4431-B1BA-FF74CFEC165A}" type="datetimeFigureOut">
               <a:rPr lang="en-US" smtClean="0"/>
-              <a:t>2/26/2019</a:t>
+              <a:t>2/27/2019</a:t>
             </a:fld>
             <a:endParaRPr lang="en-US"/>
           </a:p>
@@ -18008,7 +18164,7 @@
           <a:p>
             <a:fld id="{CB81FF3C-9236-4431-B1BA-FF74CFEC165A}" type="datetimeFigureOut">
               <a:rPr lang="en-US" smtClean="0"/>
-              <a:t>2/26/2019</a:t>
+              <a:t>2/27/2019</a:t>
             </a:fld>
             <a:endParaRPr lang="en-US"/>
           </a:p>
@@ -18188,7 +18344,7 @@
           <a:p>
             <a:fld id="{CB81FF3C-9236-4431-B1BA-FF74CFEC165A}" type="datetimeFigureOut">
               <a:rPr lang="en-US" smtClean="0"/>
-              <a:t>2/26/2019</a:t>
+              <a:t>2/27/2019</a:t>
             </a:fld>
             <a:endParaRPr lang="en-US"/>
           </a:p>
@@ -18358,7 +18514,7 @@
           <a:p>
             <a:fld id="{CB81FF3C-9236-4431-B1BA-FF74CFEC165A}" type="datetimeFigureOut">
               <a:rPr lang="en-US" smtClean="0"/>
-              <a:t>2/26/2019</a:t>
+              <a:t>2/27/2019</a:t>
             </a:fld>
             <a:endParaRPr lang="en-US"/>
           </a:p>
@@ -18608,7 +18764,7 @@
           <a:p>
             <a:fld id="{CB81FF3C-9236-4431-B1BA-FF74CFEC165A}" type="datetimeFigureOut">
               <a:rPr lang="en-US" smtClean="0"/>
-              <a:t>2/26/2019</a:t>
+              <a:t>2/27/2019</a:t>
             </a:fld>
             <a:endParaRPr lang="en-US"/>
           </a:p>
@@ -18840,7 +18996,7 @@
           <a:p>
             <a:fld id="{CB81FF3C-9236-4431-B1BA-FF74CFEC165A}" type="datetimeFigureOut">
               <a:rPr lang="en-US" smtClean="0"/>
-              <a:t>2/26/2019</a:t>
+              <a:t>2/27/2019</a:t>
             </a:fld>
             <a:endParaRPr lang="en-US"/>
           </a:p>
@@ -19221,7 +19377,7 @@
           <a:p>
             <a:fld id="{CB81FF3C-9236-4431-B1BA-FF74CFEC165A}" type="datetimeFigureOut">
               <a:rPr lang="en-US" smtClean="0"/>
-              <a:t>2/26/2019</a:t>
+              <a:t>2/27/2019</a:t>
             </a:fld>
             <a:endParaRPr lang="en-US"/>
           </a:p>
@@ -19339,7 +19495,7 @@
           <a:p>
             <a:fld id="{CB81FF3C-9236-4431-B1BA-FF74CFEC165A}" type="datetimeFigureOut">
               <a:rPr lang="en-US" smtClean="0"/>
-              <a:t>2/26/2019</a:t>
+              <a:t>2/27/2019</a:t>
             </a:fld>
             <a:endParaRPr lang="en-US"/>
           </a:p>
@@ -19434,7 +19590,7 @@
           <a:p>
             <a:fld id="{CB81FF3C-9236-4431-B1BA-FF74CFEC165A}" type="datetimeFigureOut">
               <a:rPr lang="en-US" smtClean="0"/>
-              <a:t>2/26/2019</a:t>
+              <a:t>2/27/2019</a:t>
             </a:fld>
             <a:endParaRPr lang="en-US"/>
           </a:p>
@@ -19683,7 +19839,7 @@
           <a:p>
             <a:fld id="{CB81FF3C-9236-4431-B1BA-FF74CFEC165A}" type="datetimeFigureOut">
               <a:rPr lang="en-US" smtClean="0"/>
-              <a:t>2/26/2019</a:t>
+              <a:t>2/27/2019</a:t>
             </a:fld>
             <a:endParaRPr lang="en-US"/>
           </a:p>
@@ -19963,7 +20119,7 @@
           <a:p>
             <a:fld id="{CB81FF3C-9236-4431-B1BA-FF74CFEC165A}" type="datetimeFigureOut">
               <a:rPr lang="en-US" smtClean="0"/>
-              <a:t>2/26/2019</a:t>
+              <a:t>2/27/2019</a:t>
             </a:fld>
             <a:endParaRPr lang="en-US"/>
           </a:p>
@@ -20086,7 +20242,7 @@
           <a:noFill/>
           <a:extLst>
             <a:ext uri="{909E8E84-426E-40dd-AFC4-6F175D3DCCD1}">
-              <a14:hiddenFill xmlns:a14="http://schemas.microsoft.com/office/drawing/2010/main" xmlns="">
+              <a14:hiddenFill xmlns="" xmlns:a14="http://schemas.microsoft.com/office/drawing/2010/main">
                 <a:solidFill>
                   <a:srgbClr val="FFFFFF"/>
                 </a:solidFill>
@@ -20160,7 +20316,7 @@
               </a:ln>
               <a:extLst>
                 <a:ext uri="{91240B29-F687-4f45-9708-019B960494DF}">
-                  <a14:hiddenLine xmlns:a14="http://schemas.microsoft.com/office/drawing/2010/main" xmlns="" w="9525">
+                  <a14:hiddenLine xmlns="" xmlns:a14="http://schemas.microsoft.com/office/drawing/2010/main" w="9525">
                     <a:solidFill>
                       <a:srgbClr val="000000"/>
                     </a:solidFill>
@@ -20250,7 +20406,7 @@
               </a:ln>
               <a:extLst>
                 <a:ext uri="{91240B29-F687-4f45-9708-019B960494DF}">
-                  <a14:hiddenLine xmlns:a14="http://schemas.microsoft.com/office/drawing/2010/main" xmlns="" w="9525">
+                  <a14:hiddenLine xmlns="" xmlns:a14="http://schemas.microsoft.com/office/drawing/2010/main" w="9525">
                     <a:solidFill>
                       <a:srgbClr val="000000"/>
                     </a:solidFill>
@@ -20340,7 +20496,7 @@
               </a:ln>
               <a:extLst>
                 <a:ext uri="{91240B29-F687-4f45-9708-019B960494DF}">
-                  <a14:hiddenLine xmlns:a14="http://schemas.microsoft.com/office/drawing/2010/main" xmlns="" w="9525">
+                  <a14:hiddenLine xmlns="" xmlns:a14="http://schemas.microsoft.com/office/drawing/2010/main" w="9525">
                     <a:solidFill>
                       <a:srgbClr val="000000"/>
                     </a:solidFill>
@@ -20402,7 +20558,7 @@
               </a:ln>
               <a:extLst>
                 <a:ext uri="{91240B29-F687-4f45-9708-019B960494DF}">
-                  <a14:hiddenLine xmlns:a14="http://schemas.microsoft.com/office/drawing/2010/main" xmlns="" w="9525">
+                  <a14:hiddenLine xmlns="" xmlns:a14="http://schemas.microsoft.com/office/drawing/2010/main" w="9525">
                     <a:solidFill>
                       <a:srgbClr val="000000"/>
                     </a:solidFill>
@@ -20492,7 +20648,7 @@
               </a:ln>
               <a:extLst>
                 <a:ext uri="{91240B29-F687-4f45-9708-019B960494DF}">
-                  <a14:hiddenLine xmlns:a14="http://schemas.microsoft.com/office/drawing/2010/main" xmlns="" w="9525">
+                  <a14:hiddenLine xmlns="" xmlns:a14="http://schemas.microsoft.com/office/drawing/2010/main" w="9525">
                     <a:solidFill>
                       <a:srgbClr val="000000"/>
                     </a:solidFill>
@@ -20554,7 +20710,7 @@
               </a:ln>
               <a:extLst>
                 <a:ext uri="{91240B29-F687-4f45-9708-019B960494DF}">
-                  <a14:hiddenLine xmlns:a14="http://schemas.microsoft.com/office/drawing/2010/main" xmlns="" w="9525">
+                  <a14:hiddenLine xmlns="" xmlns:a14="http://schemas.microsoft.com/office/drawing/2010/main" w="9525">
                     <a:solidFill>
                       <a:srgbClr val="000000"/>
                     </a:solidFill>
@@ -20616,7 +20772,7 @@
               </a:ln>
               <a:extLst>
                 <a:ext uri="{91240B29-F687-4f45-9708-019B960494DF}">
-                  <a14:hiddenLine xmlns:a14="http://schemas.microsoft.com/office/drawing/2010/main" xmlns="" w="9525">
+                  <a14:hiddenLine xmlns="" xmlns:a14="http://schemas.microsoft.com/office/drawing/2010/main" w="9525">
                     <a:solidFill>
                       <a:srgbClr val="000000"/>
                     </a:solidFill>
@@ -20706,7 +20862,7 @@
               </a:ln>
               <a:extLst>
                 <a:ext uri="{91240B29-F687-4f45-9708-019B960494DF}">
-                  <a14:hiddenLine xmlns:a14="http://schemas.microsoft.com/office/drawing/2010/main" xmlns="" w="9525">
+                  <a14:hiddenLine xmlns="" xmlns:a14="http://schemas.microsoft.com/office/drawing/2010/main" w="9525">
                     <a:solidFill>
                       <a:srgbClr val="000000"/>
                     </a:solidFill>
@@ -20796,7 +20952,7 @@
               </a:ln>
               <a:extLst>
                 <a:ext uri="{91240B29-F687-4f45-9708-019B960494DF}">
-                  <a14:hiddenLine xmlns:a14="http://schemas.microsoft.com/office/drawing/2010/main" xmlns="" w="9525">
+                  <a14:hiddenLine xmlns="" xmlns:a14="http://schemas.microsoft.com/office/drawing/2010/main" w="9525">
                     <a:solidFill>
                       <a:srgbClr val="000000"/>
                     </a:solidFill>
@@ -20858,7 +21014,7 @@
               </a:ln>
               <a:extLst>
                 <a:ext uri="{91240B29-F687-4f45-9708-019B960494DF}">
-                  <a14:hiddenLine xmlns:a14="http://schemas.microsoft.com/office/drawing/2010/main" xmlns="" w="9525">
+                  <a14:hiddenLine xmlns="" xmlns:a14="http://schemas.microsoft.com/office/drawing/2010/main" w="9525">
                     <a:solidFill>
                       <a:srgbClr val="000000"/>
                     </a:solidFill>
@@ -20968,7 +21124,7 @@
               </a:ln>
               <a:extLst>
                 <a:ext uri="{91240B29-F687-4f45-9708-019B960494DF}">
-                  <a14:hiddenLine xmlns:a14="http://schemas.microsoft.com/office/drawing/2010/main" xmlns="" w="9525">
+                  <a14:hiddenLine xmlns="" xmlns:a14="http://schemas.microsoft.com/office/drawing/2010/main" w="9525">
                     <a:solidFill>
                       <a:srgbClr val="000000"/>
                     </a:solidFill>
@@ -21052,7 +21208,7 @@
               </a:ln>
               <a:extLst>
                 <a:ext uri="{91240B29-F687-4f45-9708-019B960494DF}">
-                  <a14:hiddenLine xmlns:a14="http://schemas.microsoft.com/office/drawing/2010/main" xmlns="" w="9525">
+                  <a14:hiddenLine xmlns="" xmlns:a14="http://schemas.microsoft.com/office/drawing/2010/main" w="9525">
                     <a:solidFill>
                       <a:srgbClr val="000000"/>
                     </a:solidFill>
@@ -21114,7 +21270,7 @@
               </a:ln>
               <a:extLst>
                 <a:ext uri="{91240B29-F687-4f45-9708-019B960494DF}">
-                  <a14:hiddenLine xmlns:a14="http://schemas.microsoft.com/office/drawing/2010/main" xmlns="" w="9525">
+                  <a14:hiddenLine xmlns="" xmlns:a14="http://schemas.microsoft.com/office/drawing/2010/main" w="9525">
                     <a:solidFill>
                       <a:srgbClr val="000000"/>
                     </a:solidFill>
@@ -21176,7 +21332,7 @@
               </a:ln>
               <a:extLst>
                 <a:ext uri="{91240B29-F687-4f45-9708-019B960494DF}">
-                  <a14:hiddenLine xmlns:a14="http://schemas.microsoft.com/office/drawing/2010/main" xmlns="" w="9525">
+                  <a14:hiddenLine xmlns="" xmlns:a14="http://schemas.microsoft.com/office/drawing/2010/main" w="9525">
                     <a:solidFill>
                       <a:srgbClr val="000000"/>
                     </a:solidFill>
@@ -21266,7 +21422,7 @@
               </a:ln>
               <a:extLst>
                 <a:ext uri="{91240B29-F687-4f45-9708-019B960494DF}">
-                  <a14:hiddenLine xmlns:a14="http://schemas.microsoft.com/office/drawing/2010/main" xmlns="" w="9525">
+                  <a14:hiddenLine xmlns="" xmlns:a14="http://schemas.microsoft.com/office/drawing/2010/main" w="9525">
                     <a:solidFill>
                       <a:srgbClr val="000000"/>
                     </a:solidFill>
@@ -21300,7 +21456,7 @@
               </a:ln>
               <a:extLst>
                 <a:ext uri="{91240B29-F687-4f45-9708-019B960494DF}">
-                  <a14:hiddenLine xmlns:a14="http://schemas.microsoft.com/office/drawing/2010/main" xmlns="" w="9525">
+                  <a14:hiddenLine xmlns="" xmlns:a14="http://schemas.microsoft.com/office/drawing/2010/main" w="9525">
                     <a:solidFill>
                       <a:srgbClr val="000000"/>
                     </a:solidFill>
@@ -21365,7 +21521,7 @@
               </a:ln>
               <a:extLst>
                 <a:ext uri="{91240B29-F687-4f45-9708-019B960494DF}">
-                  <a14:hiddenLine xmlns:a14="http://schemas.microsoft.com/office/drawing/2010/main" xmlns="" w="9525">
+                  <a14:hiddenLine xmlns="" xmlns:a14="http://schemas.microsoft.com/office/drawing/2010/main" w="9525">
                     <a:solidFill>
                       <a:srgbClr val="000000"/>
                     </a:solidFill>
@@ -21455,7 +21611,7 @@
               </a:ln>
               <a:extLst>
                 <a:ext uri="{91240B29-F687-4f45-9708-019B960494DF}">
-                  <a14:hiddenLine xmlns:a14="http://schemas.microsoft.com/office/drawing/2010/main" xmlns="" w="9525">
+                  <a14:hiddenLine xmlns="" xmlns:a14="http://schemas.microsoft.com/office/drawing/2010/main" w="9525">
                     <a:solidFill>
                       <a:srgbClr val="000000"/>
                     </a:solidFill>
@@ -21517,7 +21673,7 @@
               </a:ln>
               <a:extLst>
                 <a:ext uri="{91240B29-F687-4f45-9708-019B960494DF}">
-                  <a14:hiddenLine xmlns:a14="http://schemas.microsoft.com/office/drawing/2010/main" xmlns="" w="9525">
+                  <a14:hiddenLine xmlns="" xmlns:a14="http://schemas.microsoft.com/office/drawing/2010/main" w="9525">
                     <a:solidFill>
                       <a:srgbClr val="000000"/>
                     </a:solidFill>
@@ -21607,7 +21763,7 @@
               </a:ln>
               <a:extLst>
                 <a:ext uri="{91240B29-F687-4f45-9708-019B960494DF}">
-                  <a14:hiddenLine xmlns:a14="http://schemas.microsoft.com/office/drawing/2010/main" xmlns="" w="9525">
+                  <a14:hiddenLine xmlns="" xmlns:a14="http://schemas.microsoft.com/office/drawing/2010/main" w="9525">
                     <a:solidFill>
                       <a:srgbClr val="000000"/>
                     </a:solidFill>
@@ -21672,7 +21828,7 @@
               </a:ln>
               <a:extLst>
                 <a:ext uri="{91240B29-F687-4f45-9708-019B960494DF}">
-                  <a14:hiddenLine xmlns:a14="http://schemas.microsoft.com/office/drawing/2010/main" xmlns="" w="9525">
+                  <a14:hiddenLine xmlns="" xmlns:a14="http://schemas.microsoft.com/office/drawing/2010/main" w="9525">
                     <a:solidFill>
                       <a:srgbClr val="000000"/>
                     </a:solidFill>
@@ -21734,7 +21890,7 @@
               </a:ln>
               <a:extLst>
                 <a:ext uri="{91240B29-F687-4f45-9708-019B960494DF}">
-                  <a14:hiddenLine xmlns:a14="http://schemas.microsoft.com/office/drawing/2010/main" xmlns="" w="9525">
+                  <a14:hiddenLine xmlns="" xmlns:a14="http://schemas.microsoft.com/office/drawing/2010/main" w="9525">
                     <a:solidFill>
                       <a:srgbClr val="000000"/>
                     </a:solidFill>
@@ -21824,7 +21980,7 @@
               </a:ln>
               <a:extLst>
                 <a:ext uri="{91240B29-F687-4f45-9708-019B960494DF}">
-                  <a14:hiddenLine xmlns:a14="http://schemas.microsoft.com/office/drawing/2010/main" xmlns="" w="9525">
+                  <a14:hiddenLine xmlns="" xmlns:a14="http://schemas.microsoft.com/office/drawing/2010/main" w="9525">
                     <a:solidFill>
                       <a:srgbClr val="000000"/>
                     </a:solidFill>
@@ -21914,7 +22070,7 @@
               </a:ln>
               <a:extLst>
                 <a:ext uri="{91240B29-F687-4f45-9708-019B960494DF}">
-                  <a14:hiddenLine xmlns:a14="http://schemas.microsoft.com/office/drawing/2010/main" xmlns="" w="9525">
+                  <a14:hiddenLine xmlns="" xmlns:a14="http://schemas.microsoft.com/office/drawing/2010/main" w="9525">
                     <a:solidFill>
                       <a:srgbClr val="000000"/>
                     </a:solidFill>
@@ -21979,7 +22135,7 @@
               </a:ln>
               <a:extLst>
                 <a:ext uri="{91240B29-F687-4f45-9708-019B960494DF}">
-                  <a14:hiddenLine xmlns:a14="http://schemas.microsoft.com/office/drawing/2010/main" xmlns="" w="9525">
+                  <a14:hiddenLine xmlns="" xmlns:a14="http://schemas.microsoft.com/office/drawing/2010/main" w="9525">
                     <a:solidFill>
                       <a:srgbClr val="000000"/>
                     </a:solidFill>
@@ -22099,7 +22255,7 @@
               </a:ln>
               <a:extLst>
                 <a:ext uri="{91240B29-F687-4f45-9708-019B960494DF}">
-                  <a14:hiddenLine xmlns:a14="http://schemas.microsoft.com/office/drawing/2010/main" xmlns="" w="9525">
+                  <a14:hiddenLine xmlns="" xmlns:a14="http://schemas.microsoft.com/office/drawing/2010/main" w="9525">
                     <a:solidFill>
                       <a:srgbClr val="000000"/>
                     </a:solidFill>
@@ -22180,7 +22336,7 @@
               </a:ln>
               <a:extLst>
                 <a:ext uri="{91240B29-F687-4f45-9708-019B960494DF}">
-                  <a14:hiddenLine xmlns:a14="http://schemas.microsoft.com/office/drawing/2010/main" xmlns="" w="9525">
+                  <a14:hiddenLine xmlns="" xmlns:a14="http://schemas.microsoft.com/office/drawing/2010/main" w="9525">
                     <a:solidFill>
                       <a:srgbClr val="000000"/>
                     </a:solidFill>
@@ -22295,7 +22451,7 @@
               </a:ln>
               <a:extLst>
                 <a:ext uri="{91240B29-F687-4f45-9708-019B960494DF}">
-                  <a14:hiddenLine xmlns:a14="http://schemas.microsoft.com/office/drawing/2010/main" xmlns="" w="9525">
+                  <a14:hiddenLine xmlns="" xmlns:a14="http://schemas.microsoft.com/office/drawing/2010/main" w="9525">
                     <a:solidFill>
                       <a:srgbClr val="000000"/>
                     </a:solidFill>
@@ -22385,7 +22541,7 @@
               </a:ln>
               <a:extLst>
                 <a:ext uri="{91240B29-F687-4f45-9708-019B960494DF}">
-                  <a14:hiddenLine xmlns:a14="http://schemas.microsoft.com/office/drawing/2010/main" xmlns="" w="9525">
+                  <a14:hiddenLine xmlns="" xmlns:a14="http://schemas.microsoft.com/office/drawing/2010/main" w="9525">
                     <a:solidFill>
                       <a:srgbClr val="000000"/>
                     </a:solidFill>
@@ -22450,7 +22606,7 @@
               </a:ln>
               <a:extLst>
                 <a:ext uri="{91240B29-F687-4f45-9708-019B960494DF}">
-                  <a14:hiddenLine xmlns:a14="http://schemas.microsoft.com/office/drawing/2010/main" xmlns="" w="9525">
+                  <a14:hiddenLine xmlns="" xmlns:a14="http://schemas.microsoft.com/office/drawing/2010/main" w="9525">
                     <a:solidFill>
                       <a:srgbClr val="000000"/>
                     </a:solidFill>
@@ -22540,7 +22696,7 @@
               </a:ln>
               <a:extLst>
                 <a:ext uri="{91240B29-F687-4f45-9708-019B960494DF}">
-                  <a14:hiddenLine xmlns:a14="http://schemas.microsoft.com/office/drawing/2010/main" xmlns="" w="9525">
+                  <a14:hiddenLine xmlns="" xmlns:a14="http://schemas.microsoft.com/office/drawing/2010/main" w="9525">
                     <a:solidFill>
                       <a:srgbClr val="000000"/>
                     </a:solidFill>
@@ -22608,7 +22764,7 @@
               </a:ln>
               <a:extLst>
                 <a:ext uri="{91240B29-F687-4f45-9708-019B960494DF}">
-                  <a14:hiddenLine xmlns:a14="http://schemas.microsoft.com/office/drawing/2010/main" xmlns="" w="9525">
+                  <a14:hiddenLine xmlns="" xmlns:a14="http://schemas.microsoft.com/office/drawing/2010/main" w="9525">
                     <a:solidFill>
                       <a:srgbClr val="000000"/>
                     </a:solidFill>
@@ -22698,7 +22854,7 @@
               </a:ln>
               <a:extLst>
                 <a:ext uri="{91240B29-F687-4f45-9708-019B960494DF}">
-                  <a14:hiddenLine xmlns:a14="http://schemas.microsoft.com/office/drawing/2010/main" xmlns="" w="9525">
+                  <a14:hiddenLine xmlns="" xmlns:a14="http://schemas.microsoft.com/office/drawing/2010/main" w="9525">
                     <a:solidFill>
                       <a:srgbClr val="000000"/>
                     </a:solidFill>
@@ -22766,7 +22922,7 @@
               </a:ln>
               <a:extLst>
                 <a:ext uri="{91240B29-F687-4f45-9708-019B960494DF}">
-                  <a14:hiddenLine xmlns:a14="http://schemas.microsoft.com/office/drawing/2010/main" xmlns="" w="9525">
+                  <a14:hiddenLine xmlns="" xmlns:a14="http://schemas.microsoft.com/office/drawing/2010/main" w="9525">
                     <a:solidFill>
                       <a:srgbClr val="000000"/>
                     </a:solidFill>
@@ -22856,7 +23012,7 @@
               </a:ln>
               <a:extLst>
                 <a:ext uri="{91240B29-F687-4f45-9708-019B960494DF}">
-                  <a14:hiddenLine xmlns:a14="http://schemas.microsoft.com/office/drawing/2010/main" xmlns="" w="9525">
+                  <a14:hiddenLine xmlns="" xmlns:a14="http://schemas.microsoft.com/office/drawing/2010/main" w="9525">
                     <a:solidFill>
                       <a:srgbClr val="000000"/>
                     </a:solidFill>
@@ -22890,7 +23046,7 @@
               </a:ln>
               <a:extLst>
                 <a:ext uri="{91240B29-F687-4f45-9708-019B960494DF}">
-                  <a14:hiddenLine xmlns:a14="http://schemas.microsoft.com/office/drawing/2010/main" xmlns="" w="9525">
+                  <a14:hiddenLine xmlns="" xmlns:a14="http://schemas.microsoft.com/office/drawing/2010/main" w="9525">
                     <a:solidFill>
                       <a:srgbClr val="000000"/>
                     </a:solidFill>
@@ -23030,7 +23186,7 @@
           <a:p>
             <a:fld id="{CB81FF3C-9236-4431-B1BA-FF74CFEC165A}" type="datetimeFigureOut">
               <a:rPr lang="en-US" smtClean="0"/>
-              <a:t>2/26/2019</a:t>
+              <a:t>2/27/2019</a:t>
             </a:fld>
             <a:endParaRPr lang="en-US"/>
           </a:p>
@@ -23621,6 +23777,186 @@
       </p:grpSpPr>
       <p:sp>
         <p:nvSpPr>
+          <p:cNvPr id="3" name="Title 2">
+            <a:extLst>
+              <a:ext uri="{FF2B5EF4-FFF2-40B4-BE49-F238E27FC236}">
+                <a16:creationId xmlns:a16="http://schemas.microsoft.com/office/drawing/2014/main" id="{3FFBEA8A-0002-4DC2-BB39-5983C0F9DF26}"/>
+              </a:ext>
+            </a:extLst>
+          </p:cNvPr>
+          <p:cNvSpPr>
+            <a:spLocks noGrp="1"/>
+          </p:cNvSpPr>
+          <p:nvPr>
+            <p:ph type="title"/>
+          </p:nvPr>
+        </p:nvSpPr>
+        <p:spPr/>
+        <p:txBody>
+          <a:bodyPr/>
+          <a:lstStyle/>
+          <a:p>
+            <a:r>
+              <a:rPr lang="en-US" dirty="0" err="1"/>
+              <a:t>Mtry</a:t>
+            </a:r>
+            <a:r>
+              <a:rPr lang="en-US" dirty="0"/>
+              <a:t> iteration</a:t>
+            </a:r>
+          </a:p>
+        </p:txBody>
+      </p:sp>
+      <p:pic>
+        <p:nvPicPr>
+          <p:cNvPr id="15" name="Content Placeholder 14">
+            <a:extLst>
+              <a:ext uri="{FF2B5EF4-FFF2-40B4-BE49-F238E27FC236}">
+                <a16:creationId xmlns:a16="http://schemas.microsoft.com/office/drawing/2014/main" id="{9FDE5CF5-1C98-4D9A-9E45-76796F34181D}"/>
+              </a:ext>
+            </a:extLst>
+          </p:cNvPr>
+          <p:cNvPicPr>
+            <a:picLocks noGrp="1" noChangeAspect="1"/>
+          </p:cNvPicPr>
+          <p:nvPr>
+            <p:ph idx="1"/>
+          </p:nvPr>
+        </p:nvPicPr>
+        <p:blipFill>
+          <a:blip r:embed="rId2">
+            <a:extLst>
+              <a:ext uri="{28A0092B-C50C-407E-A947-70E740481C1C}">
+                <a14:useLocalDpi xmlns:a14="http://schemas.microsoft.com/office/drawing/2010/main" val="0"/>
+              </a:ext>
+            </a:extLst>
+          </a:blip>
+          <a:stretch>
+            <a:fillRect/>
+          </a:stretch>
+        </p:blipFill>
+        <p:spPr>
+          <a:xfrm>
+            <a:off x="3880843" y="2249488"/>
+            <a:ext cx="4427139" cy="3541712"/>
+          </a:xfrm>
+        </p:spPr>
+      </p:pic>
+    </p:spTree>
+    <p:extLst>
+      <p:ext uri="{BB962C8B-B14F-4D97-AF65-F5344CB8AC3E}">
+        <p14:creationId xmlns:p14="http://schemas.microsoft.com/office/powerpoint/2010/main" val="2423320413"/>
+      </p:ext>
+    </p:extLst>
+  </p:cSld>
+  <p:clrMapOvr>
+    <a:masterClrMapping/>
+  </p:clrMapOvr>
+</p:sld>
+</file>
+
+<file path=ppt/slides/slide11.xml><?xml version="1.0" encoding="utf-8"?>
+<p:sld xmlns:a="http://schemas.openxmlformats.org/drawingml/2006/main" xmlns:r="http://schemas.openxmlformats.org/officeDocument/2006/relationships" xmlns:p="http://schemas.openxmlformats.org/presentationml/2006/main">
+  <p:cSld>
+    <p:spTree>
+      <p:nvGrpSpPr>
+        <p:cNvPr id="1" name=""/>
+        <p:cNvGrpSpPr/>
+        <p:nvPr/>
+      </p:nvGrpSpPr>
+      <p:grpSpPr>
+        <a:xfrm>
+          <a:off x="0" y="0"/>
+          <a:ext cx="0" cy="0"/>
+          <a:chOff x="0" y="0"/>
+          <a:chExt cx="0" cy="0"/>
+        </a:xfrm>
+      </p:grpSpPr>
+      <p:sp>
+        <p:nvSpPr>
+          <p:cNvPr id="2" name="Title 1">
+            <a:extLst>
+              <a:ext uri="{FF2B5EF4-FFF2-40B4-BE49-F238E27FC236}">
+                <a16:creationId xmlns:a16="http://schemas.microsoft.com/office/drawing/2014/main" id="{93659AED-62A4-412E-8260-E0FCB0416743}"/>
+              </a:ext>
+            </a:extLst>
+          </p:cNvPr>
+          <p:cNvSpPr>
+            <a:spLocks noGrp="1"/>
+          </p:cNvSpPr>
+          <p:nvPr>
+            <p:ph type="title"/>
+          </p:nvPr>
+        </p:nvSpPr>
+        <p:spPr/>
+        <p:txBody>
+          <a:bodyPr/>
+          <a:lstStyle/>
+          <a:p>
+            <a:r>
+              <a:rPr lang="en-US" dirty="0"/>
+              <a:t>OBSERVATIONS </a:t>
+            </a:r>
+          </a:p>
+        </p:txBody>
+      </p:sp>
+      <p:sp>
+        <p:nvSpPr>
+          <p:cNvPr id="3" name="Content Placeholder 2">
+            <a:extLst>
+              <a:ext uri="{FF2B5EF4-FFF2-40B4-BE49-F238E27FC236}">
+                <a16:creationId xmlns:a16="http://schemas.microsoft.com/office/drawing/2014/main" id="{7AA3378D-A764-442A-8DBD-DD5EB27E9931}"/>
+              </a:ext>
+            </a:extLst>
+          </p:cNvPr>
+          <p:cNvSpPr>
+            <a:spLocks noGrp="1"/>
+          </p:cNvSpPr>
+          <p:nvPr>
+            <p:ph idx="1"/>
+          </p:nvPr>
+        </p:nvSpPr>
+        <p:spPr/>
+        <p:txBody>
+          <a:bodyPr/>
+          <a:lstStyle/>
+          <a:p>
+            <a:endParaRPr lang="en-US"/>
+          </a:p>
+        </p:txBody>
+      </p:sp>
+    </p:spTree>
+    <p:extLst>
+      <p:ext uri="{BB962C8B-B14F-4D97-AF65-F5344CB8AC3E}">
+        <p14:creationId xmlns:p14="http://schemas.microsoft.com/office/powerpoint/2010/main" val="1430479338"/>
+      </p:ext>
+    </p:extLst>
+  </p:cSld>
+  <p:clrMapOvr>
+    <a:masterClrMapping/>
+  </p:clrMapOvr>
+</p:sld>
+</file>
+
+<file path=ppt/slides/slide12.xml><?xml version="1.0" encoding="utf-8"?>
+<p:sld xmlns:a="http://schemas.openxmlformats.org/drawingml/2006/main" xmlns:r="http://schemas.openxmlformats.org/officeDocument/2006/relationships" xmlns:p="http://schemas.openxmlformats.org/presentationml/2006/main">
+  <p:cSld>
+    <p:spTree>
+      <p:nvGrpSpPr>
+        <p:cNvPr id="1" name=""/>
+        <p:cNvGrpSpPr/>
+        <p:nvPr/>
+      </p:nvGrpSpPr>
+      <p:grpSpPr>
+        <a:xfrm>
+          <a:off x="0" y="0"/>
+          <a:ext cx="0" cy="0"/>
+          <a:chOff x="0" y="0"/>
+          <a:chExt cx="0" cy="0"/>
+        </a:xfrm>
+      </p:grpSpPr>
+      <p:sp>
+        <p:nvSpPr>
           <p:cNvPr id="2" name="Title 1">
             <a:extLst>
               <a:ext uri="{FF2B5EF4-FFF2-40B4-BE49-F238E27FC236}">
@@ -23690,7 +24026,7 @@
 </p:sld>
 </file>
 
-<file path=ppt/slides/slide11.xml><?xml version="1.0" encoding="utf-8"?>
+<file path=ppt/slides/slide13.xml><?xml version="1.0" encoding="utf-8"?>
 <p:sld xmlns:a="http://schemas.openxmlformats.org/drawingml/2006/main" xmlns:r="http://schemas.openxmlformats.org/officeDocument/2006/relationships" xmlns:p="http://schemas.openxmlformats.org/presentationml/2006/main">
   <p:cSld>
     <p:spTree>
@@ -23959,7 +24295,7 @@
             <a:noFill/>
             <a:extLst>
               <a:ext uri="{909E8E84-426E-40dd-AFC4-6F175D3DCCD1}">
-                <a14:hiddenFill xmlns="" xmlns:a16="http://schemas.microsoft.com/office/drawing/2014/main" xmlns:a14="http://schemas.microsoft.com/office/drawing/2010/main" xmlns:p14="http://schemas.microsoft.com/office/powerpoint/2010/main">
+                <a14:hiddenFill xmlns:p14="http://schemas.microsoft.com/office/powerpoint/2010/main" xmlns:a14="http://schemas.microsoft.com/office/drawing/2010/main" xmlns:a16="http://schemas.microsoft.com/office/drawing/2014/main" xmlns="">
                   <a:solidFill>
                     <a:srgbClr val="FFFFFF"/>
                   </a:solidFill>
@@ -24174,7 +24510,7 @@
             </a:ln>
             <a:extLst>
               <a:ext uri="{91240B29-F687-4f45-9708-019B960494DF}">
-                <a14:hiddenLine xmlns="" xmlns:a16="http://schemas.microsoft.com/office/drawing/2014/main" xmlns:a14="http://schemas.microsoft.com/office/drawing/2010/main" xmlns:p14="http://schemas.microsoft.com/office/powerpoint/2010/main" w="9525">
+                <a14:hiddenLine xmlns:p14="http://schemas.microsoft.com/office/powerpoint/2010/main" xmlns:a14="http://schemas.microsoft.com/office/drawing/2010/main" xmlns:a16="http://schemas.microsoft.com/office/drawing/2014/main" xmlns="" w="9525">
                   <a:solidFill>
                     <a:srgbClr val="000000"/>
                   </a:solidFill>
@@ -24279,7 +24615,7 @@
             </a:ln>
             <a:extLst>
               <a:ext uri="{91240B29-F687-4f45-9708-019B960494DF}">
-                <a14:hiddenLine xmlns="" xmlns:a16="http://schemas.microsoft.com/office/drawing/2014/main" xmlns:a14="http://schemas.microsoft.com/office/drawing/2010/main" xmlns:p14="http://schemas.microsoft.com/office/powerpoint/2010/main" w="9525">
+                <a14:hiddenLine xmlns:p14="http://schemas.microsoft.com/office/powerpoint/2010/main" xmlns:a14="http://schemas.microsoft.com/office/drawing/2010/main" xmlns:a16="http://schemas.microsoft.com/office/drawing/2014/main" xmlns="" w="9525">
                   <a:solidFill>
                     <a:srgbClr val="000000"/>
                   </a:solidFill>
@@ -24384,7 +24720,7 @@
             </a:ln>
             <a:extLst>
               <a:ext uri="{91240B29-F687-4f45-9708-019B960494DF}">
-                <a14:hiddenLine xmlns="" xmlns:a16="http://schemas.microsoft.com/office/drawing/2014/main" xmlns:a14="http://schemas.microsoft.com/office/drawing/2010/main" xmlns:p14="http://schemas.microsoft.com/office/powerpoint/2010/main" w="9525">
+                <a14:hiddenLine xmlns:p14="http://schemas.microsoft.com/office/powerpoint/2010/main" xmlns:a14="http://schemas.microsoft.com/office/drawing/2010/main" xmlns:a16="http://schemas.microsoft.com/office/drawing/2014/main" xmlns="" w="9525">
                   <a:solidFill>
                     <a:srgbClr val="000000"/>
                   </a:solidFill>
@@ -24433,7 +24769,7 @@
             </a:ln>
             <a:extLst>
               <a:ext uri="{91240B29-F687-4f45-9708-019B960494DF}">
-                <a14:hiddenLine xmlns="" xmlns:a16="http://schemas.microsoft.com/office/drawing/2014/main" xmlns:a14="http://schemas.microsoft.com/office/drawing/2010/main" xmlns:p14="http://schemas.microsoft.com/office/powerpoint/2010/main" w="9525">
+                <a14:hiddenLine xmlns:p14="http://schemas.microsoft.com/office/powerpoint/2010/main" xmlns:a14="http://schemas.microsoft.com/office/drawing/2010/main" xmlns:a16="http://schemas.microsoft.com/office/drawing/2014/main" xmlns="" w="9525">
                   <a:solidFill>
                     <a:srgbClr val="000000"/>
                   </a:solidFill>
@@ -24538,7 +24874,7 @@
             </a:ln>
             <a:extLst>
               <a:ext uri="{91240B29-F687-4f45-9708-019B960494DF}">
-                <a14:hiddenLine xmlns="" xmlns:a16="http://schemas.microsoft.com/office/drawing/2014/main" xmlns:a14="http://schemas.microsoft.com/office/drawing/2010/main" xmlns:p14="http://schemas.microsoft.com/office/powerpoint/2010/main" w="9525">
+                <a14:hiddenLine xmlns:p14="http://schemas.microsoft.com/office/powerpoint/2010/main" xmlns:a14="http://schemas.microsoft.com/office/drawing/2010/main" xmlns:a16="http://schemas.microsoft.com/office/drawing/2014/main" xmlns="" w="9525">
                   <a:solidFill>
                     <a:srgbClr val="000000"/>
                   </a:solidFill>
@@ -24615,7 +24951,7 @@
             </a:ln>
             <a:extLst>
               <a:ext uri="{91240B29-F687-4f45-9708-019B960494DF}">
-                <a14:hiddenLine xmlns="" xmlns:a16="http://schemas.microsoft.com/office/drawing/2014/main" xmlns:a14="http://schemas.microsoft.com/office/drawing/2010/main" xmlns:p14="http://schemas.microsoft.com/office/powerpoint/2010/main" w="9525">
+                <a14:hiddenLine xmlns:p14="http://schemas.microsoft.com/office/powerpoint/2010/main" xmlns:a14="http://schemas.microsoft.com/office/drawing/2010/main" xmlns:a16="http://schemas.microsoft.com/office/drawing/2014/main" xmlns="" w="9525">
                   <a:solidFill>
                     <a:srgbClr val="000000"/>
                   </a:solidFill>
@@ -24692,7 +25028,7 @@
             </a:ln>
             <a:extLst>
               <a:ext uri="{91240B29-F687-4f45-9708-019B960494DF}">
-                <a14:hiddenLine xmlns="" xmlns:a16="http://schemas.microsoft.com/office/drawing/2014/main" xmlns:a14="http://schemas.microsoft.com/office/drawing/2010/main" xmlns:p14="http://schemas.microsoft.com/office/powerpoint/2010/main" w="9525">
+                <a14:hiddenLine xmlns:p14="http://schemas.microsoft.com/office/powerpoint/2010/main" xmlns:a14="http://schemas.microsoft.com/office/drawing/2010/main" xmlns:a16="http://schemas.microsoft.com/office/drawing/2014/main" xmlns="" w="9525">
                   <a:solidFill>
                     <a:srgbClr val="000000"/>
                   </a:solidFill>
@@ -24797,7 +25133,7 @@
             </a:ln>
             <a:extLst>
               <a:ext uri="{91240B29-F687-4f45-9708-019B960494DF}">
-                <a14:hiddenLine xmlns="" xmlns:a16="http://schemas.microsoft.com/office/drawing/2014/main" xmlns:a14="http://schemas.microsoft.com/office/drawing/2010/main" xmlns:p14="http://schemas.microsoft.com/office/powerpoint/2010/main" w="9525">
+                <a14:hiddenLine xmlns:p14="http://schemas.microsoft.com/office/powerpoint/2010/main" xmlns:a14="http://schemas.microsoft.com/office/drawing/2010/main" xmlns:a16="http://schemas.microsoft.com/office/drawing/2014/main" xmlns="" w="9525">
                   <a:solidFill>
                     <a:srgbClr val="000000"/>
                   </a:solidFill>
@@ -24874,7 +25210,7 @@
             </a:ln>
             <a:extLst>
               <a:ext uri="{91240B29-F687-4f45-9708-019B960494DF}">
-                <a14:hiddenLine xmlns="" xmlns:a16="http://schemas.microsoft.com/office/drawing/2014/main" xmlns:a14="http://schemas.microsoft.com/office/drawing/2010/main" xmlns:p14="http://schemas.microsoft.com/office/powerpoint/2010/main" w="9525">
+                <a14:hiddenLine xmlns:p14="http://schemas.microsoft.com/office/powerpoint/2010/main" xmlns:a14="http://schemas.microsoft.com/office/drawing/2010/main" xmlns:a16="http://schemas.microsoft.com/office/drawing/2014/main" xmlns="" w="9525">
                   <a:solidFill>
                     <a:srgbClr val="000000"/>
                   </a:solidFill>
@@ -24951,7 +25287,7 @@
             </a:ln>
             <a:extLst>
               <a:ext uri="{91240B29-F687-4f45-9708-019B960494DF}">
-                <a14:hiddenLine xmlns="" xmlns:a16="http://schemas.microsoft.com/office/drawing/2014/main" xmlns:a14="http://schemas.microsoft.com/office/drawing/2010/main" xmlns:p14="http://schemas.microsoft.com/office/powerpoint/2010/main" w="9525">
+                <a14:hiddenLine xmlns:p14="http://schemas.microsoft.com/office/powerpoint/2010/main" xmlns:a14="http://schemas.microsoft.com/office/drawing/2010/main" xmlns:a16="http://schemas.microsoft.com/office/drawing/2014/main" xmlns="" w="9525">
                   <a:solidFill>
                     <a:srgbClr val="000000"/>
                   </a:solidFill>
@@ -25056,7 +25392,7 @@
             </a:ln>
             <a:extLst>
               <a:ext uri="{91240B29-F687-4f45-9708-019B960494DF}">
-                <a14:hiddenLine xmlns="" xmlns:a16="http://schemas.microsoft.com/office/drawing/2014/main" xmlns:a14="http://schemas.microsoft.com/office/drawing/2010/main" xmlns:p14="http://schemas.microsoft.com/office/powerpoint/2010/main" w="9525">
+                <a14:hiddenLine xmlns:p14="http://schemas.microsoft.com/office/powerpoint/2010/main" xmlns:a14="http://schemas.microsoft.com/office/drawing/2010/main" xmlns:a16="http://schemas.microsoft.com/office/drawing/2014/main" xmlns="" w="9525">
                   <a:solidFill>
                     <a:srgbClr val="000000"/>
                   </a:solidFill>
@@ -25161,7 +25497,7 @@
             </a:ln>
             <a:extLst>
               <a:ext uri="{91240B29-F687-4f45-9708-019B960494DF}">
-                <a14:hiddenLine xmlns="" xmlns:a16="http://schemas.microsoft.com/office/drawing/2014/main" xmlns:a14="http://schemas.microsoft.com/office/drawing/2010/main" xmlns:p14="http://schemas.microsoft.com/office/powerpoint/2010/main" w="9525">
+                <a14:hiddenLine xmlns:p14="http://schemas.microsoft.com/office/powerpoint/2010/main" xmlns:a14="http://schemas.microsoft.com/office/drawing/2010/main" xmlns:a16="http://schemas.microsoft.com/office/drawing/2014/main" xmlns="" w="9525">
                   <a:solidFill>
                     <a:srgbClr val="000000"/>
                   </a:solidFill>
@@ -25238,7 +25574,7 @@
             </a:ln>
             <a:extLst>
               <a:ext uri="{91240B29-F687-4f45-9708-019B960494DF}">
-                <a14:hiddenLine xmlns="" xmlns:a16="http://schemas.microsoft.com/office/drawing/2014/main" xmlns:a14="http://schemas.microsoft.com/office/drawing/2010/main" xmlns:p14="http://schemas.microsoft.com/office/powerpoint/2010/main" w="9525">
+                <a14:hiddenLine xmlns:p14="http://schemas.microsoft.com/office/powerpoint/2010/main" xmlns:a14="http://schemas.microsoft.com/office/drawing/2010/main" xmlns:a16="http://schemas.microsoft.com/office/drawing/2014/main" xmlns="" w="9525">
                   <a:solidFill>
                     <a:srgbClr val="000000"/>
                   </a:solidFill>
@@ -25363,7 +25699,7 @@
             </a:ln>
             <a:extLst>
               <a:ext uri="{91240B29-F687-4f45-9708-019B960494DF}">
-                <a14:hiddenLine xmlns="" xmlns:a16="http://schemas.microsoft.com/office/drawing/2014/main" xmlns:a14="http://schemas.microsoft.com/office/drawing/2010/main" xmlns:p14="http://schemas.microsoft.com/office/powerpoint/2010/main" w="9525">
+                <a14:hiddenLine xmlns:p14="http://schemas.microsoft.com/office/powerpoint/2010/main" xmlns:a14="http://schemas.microsoft.com/office/drawing/2010/main" xmlns:a16="http://schemas.microsoft.com/office/drawing/2014/main" xmlns="" w="9525">
                   <a:solidFill>
                     <a:srgbClr val="000000"/>
                   </a:solidFill>
@@ -25440,7 +25776,7 @@
             </a:ln>
             <a:extLst>
               <a:ext uri="{91240B29-F687-4f45-9708-019B960494DF}">
-                <a14:hiddenLine xmlns="" xmlns:a16="http://schemas.microsoft.com/office/drawing/2014/main" xmlns:a14="http://schemas.microsoft.com/office/drawing/2010/main" xmlns:p14="http://schemas.microsoft.com/office/powerpoint/2010/main" w="9525">
+                <a14:hiddenLine xmlns:p14="http://schemas.microsoft.com/office/powerpoint/2010/main" xmlns:a14="http://schemas.microsoft.com/office/drawing/2010/main" xmlns:a16="http://schemas.microsoft.com/office/drawing/2014/main" xmlns="" w="9525">
                   <a:solidFill>
                     <a:srgbClr val="000000"/>
                   </a:solidFill>
@@ -25545,7 +25881,7 @@
             </a:ln>
             <a:extLst>
               <a:ext uri="{91240B29-F687-4f45-9708-019B960494DF}">
-                <a14:hiddenLine xmlns="" xmlns:a16="http://schemas.microsoft.com/office/drawing/2014/main" xmlns:a14="http://schemas.microsoft.com/office/drawing/2010/main" xmlns:p14="http://schemas.microsoft.com/office/powerpoint/2010/main" w="9525">
+                <a14:hiddenLine xmlns:p14="http://schemas.microsoft.com/office/powerpoint/2010/main" xmlns:a14="http://schemas.microsoft.com/office/drawing/2010/main" xmlns:a16="http://schemas.microsoft.com/office/drawing/2014/main" xmlns="" w="9525">
                   <a:solidFill>
                     <a:srgbClr val="000000"/>
                   </a:solidFill>
@@ -25650,7 +25986,7 @@
             </a:ln>
             <a:extLst>
               <a:ext uri="{91240B29-F687-4f45-9708-019B960494DF}">
-                <a14:hiddenLine xmlns="" xmlns:a16="http://schemas.microsoft.com/office/drawing/2014/main" xmlns:a14="http://schemas.microsoft.com/office/drawing/2010/main" xmlns:p14="http://schemas.microsoft.com/office/powerpoint/2010/main" w="9525">
+                <a14:hiddenLine xmlns:p14="http://schemas.microsoft.com/office/powerpoint/2010/main" xmlns:a14="http://schemas.microsoft.com/office/drawing/2010/main" xmlns:a16="http://schemas.microsoft.com/office/drawing/2014/main" xmlns="" w="9525">
                   <a:solidFill>
                     <a:srgbClr val="000000"/>
                   </a:solidFill>
@@ -25727,7 +26063,7 @@
             </a:ln>
             <a:extLst>
               <a:ext uri="{91240B29-F687-4f45-9708-019B960494DF}">
-                <a14:hiddenLine xmlns="" xmlns:a16="http://schemas.microsoft.com/office/drawing/2014/main" xmlns:a14="http://schemas.microsoft.com/office/drawing/2010/main" xmlns:p14="http://schemas.microsoft.com/office/powerpoint/2010/main" w="9525">
+                <a14:hiddenLine xmlns:p14="http://schemas.microsoft.com/office/powerpoint/2010/main" xmlns:a14="http://schemas.microsoft.com/office/drawing/2010/main" xmlns:a16="http://schemas.microsoft.com/office/drawing/2014/main" xmlns="" w="9525">
                   <a:solidFill>
                     <a:srgbClr val="000000"/>
                   </a:solidFill>
@@ -25832,7 +26168,7 @@
             </a:ln>
             <a:extLst>
               <a:ext uri="{91240B29-F687-4f45-9708-019B960494DF}">
-                <a14:hiddenLine xmlns="" xmlns:a16="http://schemas.microsoft.com/office/drawing/2014/main" xmlns:a14="http://schemas.microsoft.com/office/drawing/2010/main" xmlns:p14="http://schemas.microsoft.com/office/powerpoint/2010/main" w="9525">
+                <a14:hiddenLine xmlns:p14="http://schemas.microsoft.com/office/powerpoint/2010/main" xmlns:a14="http://schemas.microsoft.com/office/drawing/2010/main" xmlns:a16="http://schemas.microsoft.com/office/drawing/2014/main" xmlns="" w="9525">
                   <a:solidFill>
                     <a:srgbClr val="000000"/>
                   </a:solidFill>
@@ -25937,7 +26273,7 @@
             </a:ln>
             <a:extLst>
               <a:ext uri="{91240B29-F687-4f45-9708-019B960494DF}">
-                <a14:hiddenLine xmlns="" xmlns:a16="http://schemas.microsoft.com/office/drawing/2014/main" xmlns:a14="http://schemas.microsoft.com/office/drawing/2010/main" xmlns:p14="http://schemas.microsoft.com/office/powerpoint/2010/main" w="9525">
+                <a14:hiddenLine xmlns:p14="http://schemas.microsoft.com/office/powerpoint/2010/main" xmlns:a14="http://schemas.microsoft.com/office/drawing/2010/main" xmlns:a16="http://schemas.microsoft.com/office/drawing/2014/main" xmlns="" w="9525">
                   <a:solidFill>
                     <a:srgbClr val="000000"/>
                   </a:solidFill>
@@ -26008,7 +26344,7 @@
             </a:ln>
             <a:extLst>
               <a:ext uri="{91240B29-F687-4f45-9708-019B960494DF}">
-                <a14:hiddenLine xmlns="" xmlns:a16="http://schemas.microsoft.com/office/drawing/2014/main" xmlns:a14="http://schemas.microsoft.com/office/drawing/2010/main" xmlns:p14="http://schemas.microsoft.com/office/powerpoint/2010/main" w="9525">
+                <a14:hiddenLine xmlns:p14="http://schemas.microsoft.com/office/powerpoint/2010/main" xmlns:a14="http://schemas.microsoft.com/office/drawing/2010/main" xmlns:a16="http://schemas.microsoft.com/office/drawing/2014/main" xmlns="" w="9525">
                   <a:solidFill>
                     <a:srgbClr val="000000"/>
                   </a:solidFill>
@@ -26113,7 +26449,7 @@
             </a:ln>
             <a:extLst>
               <a:ext uri="{91240B29-F687-4f45-9708-019B960494DF}">
-                <a14:hiddenLine xmlns="" xmlns:a16="http://schemas.microsoft.com/office/drawing/2014/main" xmlns:a14="http://schemas.microsoft.com/office/drawing/2010/main" xmlns:p14="http://schemas.microsoft.com/office/powerpoint/2010/main" w="9525">
+                <a14:hiddenLine xmlns:p14="http://schemas.microsoft.com/office/powerpoint/2010/main" xmlns:a14="http://schemas.microsoft.com/office/drawing/2010/main" xmlns:a16="http://schemas.microsoft.com/office/drawing/2014/main" xmlns="" w="9525">
                   <a:solidFill>
                     <a:srgbClr val="000000"/>
                   </a:solidFill>
@@ -26184,7 +26520,7 @@
             </a:ln>
             <a:extLst>
               <a:ext uri="{91240B29-F687-4f45-9708-019B960494DF}">
-                <a14:hiddenLine xmlns="" xmlns:a16="http://schemas.microsoft.com/office/drawing/2014/main" xmlns:a14="http://schemas.microsoft.com/office/drawing/2010/main" xmlns:p14="http://schemas.microsoft.com/office/powerpoint/2010/main" w="9525">
+                <a14:hiddenLine xmlns:p14="http://schemas.microsoft.com/office/powerpoint/2010/main" xmlns:a14="http://schemas.microsoft.com/office/drawing/2010/main" xmlns:a16="http://schemas.microsoft.com/office/drawing/2014/main" xmlns="" w="9525">
                   <a:solidFill>
                     <a:srgbClr val="000000"/>
                   </a:solidFill>
@@ -26289,7 +26625,7 @@
             </a:ln>
             <a:extLst>
               <a:ext uri="{91240B29-F687-4f45-9708-019B960494DF}">
-                <a14:hiddenLine xmlns="" xmlns:a16="http://schemas.microsoft.com/office/drawing/2014/main" xmlns:a14="http://schemas.microsoft.com/office/drawing/2010/main" xmlns:p14="http://schemas.microsoft.com/office/powerpoint/2010/main" w="9525">
+                <a14:hiddenLine xmlns:p14="http://schemas.microsoft.com/office/powerpoint/2010/main" xmlns:a14="http://schemas.microsoft.com/office/drawing/2010/main" xmlns:a16="http://schemas.microsoft.com/office/drawing/2014/main" xmlns="" w="9525">
                   <a:solidFill>
                     <a:srgbClr val="000000"/>
                   </a:solidFill>
@@ -26372,7 +26708,7 @@
             </a:ln>
             <a:extLst>
               <a:ext uri="{91240B29-F687-4f45-9708-019B960494DF}">
-                <a14:hiddenLine xmlns="" xmlns:a16="http://schemas.microsoft.com/office/drawing/2014/main" xmlns:a14="http://schemas.microsoft.com/office/drawing/2010/main" xmlns:p14="http://schemas.microsoft.com/office/powerpoint/2010/main" w="9525">
+                <a14:hiddenLine xmlns:p14="http://schemas.microsoft.com/office/powerpoint/2010/main" xmlns:a14="http://schemas.microsoft.com/office/drawing/2010/main" xmlns:a16="http://schemas.microsoft.com/office/drawing/2014/main" xmlns="" w="9525">
                   <a:solidFill>
                     <a:srgbClr val="000000"/>
                   </a:solidFill>
@@ -26477,7 +26813,7 @@
             </a:ln>
             <a:extLst>
               <a:ext uri="{91240B29-F687-4f45-9708-019B960494DF}">
-                <a14:hiddenLine xmlns="" xmlns:a16="http://schemas.microsoft.com/office/drawing/2014/main" xmlns:a14="http://schemas.microsoft.com/office/drawing/2010/main" xmlns:p14="http://schemas.microsoft.com/office/powerpoint/2010/main" w="9525">
+                <a14:hiddenLine xmlns:p14="http://schemas.microsoft.com/office/powerpoint/2010/main" xmlns:a14="http://schemas.microsoft.com/office/drawing/2010/main" xmlns:a16="http://schemas.microsoft.com/office/drawing/2014/main" xmlns="" w="9525">
                   <a:solidFill>
                     <a:srgbClr val="000000"/>
                   </a:solidFill>
@@ -26560,7 +26896,7 @@
             </a:ln>
             <a:extLst>
               <a:ext uri="{91240B29-F687-4f45-9708-019B960494DF}">
-                <a14:hiddenLine xmlns="" xmlns:a16="http://schemas.microsoft.com/office/drawing/2014/main" xmlns:a14="http://schemas.microsoft.com/office/drawing/2010/main" xmlns:p14="http://schemas.microsoft.com/office/powerpoint/2010/main" w="9525">
+                <a14:hiddenLine xmlns:p14="http://schemas.microsoft.com/office/powerpoint/2010/main" xmlns:a14="http://schemas.microsoft.com/office/drawing/2010/main" xmlns:a16="http://schemas.microsoft.com/office/drawing/2014/main" xmlns="" w="9525">
                   <a:solidFill>
                     <a:srgbClr val="000000"/>
                   </a:solidFill>
@@ -26665,7 +27001,7 @@
             </a:ln>
             <a:extLst>
               <a:ext uri="{91240B29-F687-4f45-9708-019B960494DF}">
-                <a14:hiddenLine xmlns="" xmlns:a16="http://schemas.microsoft.com/office/drawing/2014/main" xmlns:a14="http://schemas.microsoft.com/office/drawing/2010/main" xmlns:p14="http://schemas.microsoft.com/office/powerpoint/2010/main" w="9525">
+                <a14:hiddenLine xmlns:p14="http://schemas.microsoft.com/office/powerpoint/2010/main" xmlns:a14="http://schemas.microsoft.com/office/drawing/2010/main" xmlns:a16="http://schemas.microsoft.com/office/drawing/2014/main" xmlns="" w="9525">
                   <a:solidFill>
                     <a:srgbClr val="000000"/>
                   </a:solidFill>
@@ -26714,7 +27050,7 @@
             </a:ln>
             <a:extLst>
               <a:ext uri="{91240B29-F687-4f45-9708-019B960494DF}">
-                <a14:hiddenLine xmlns="" xmlns:a16="http://schemas.microsoft.com/office/drawing/2014/main" xmlns:a14="http://schemas.microsoft.com/office/drawing/2010/main" xmlns:p14="http://schemas.microsoft.com/office/powerpoint/2010/main" w="9525">
+                <a14:hiddenLine xmlns:p14="http://schemas.microsoft.com/office/powerpoint/2010/main" xmlns:a14="http://schemas.microsoft.com/office/drawing/2010/main" xmlns:a16="http://schemas.microsoft.com/office/drawing/2014/main" xmlns="" w="9525">
                   <a:solidFill>
                     <a:srgbClr val="000000"/>
                   </a:solidFill>
@@ -26819,7 +27155,7 @@
             </a:ln>
             <a:extLst>
               <a:ext uri="{91240B29-F687-4f45-9708-019B960494DF}">
-                <a14:hiddenLine xmlns="" xmlns:a16="http://schemas.microsoft.com/office/drawing/2014/main" xmlns:a14="http://schemas.microsoft.com/office/drawing/2010/main" xmlns:p14="http://schemas.microsoft.com/office/powerpoint/2010/main" w="9525">
+                <a14:hiddenLine xmlns:p14="http://schemas.microsoft.com/office/powerpoint/2010/main" xmlns:a14="http://schemas.microsoft.com/office/drawing/2010/main" xmlns:a16="http://schemas.microsoft.com/office/drawing/2014/main" xmlns="" w="9525">
                   <a:solidFill>
                     <a:srgbClr val="000000"/>
                   </a:solidFill>
@@ -26896,7 +27232,7 @@
             </a:ln>
             <a:extLst>
               <a:ext uri="{91240B29-F687-4f45-9708-019B960494DF}">
-                <a14:hiddenLine xmlns="" xmlns:a16="http://schemas.microsoft.com/office/drawing/2014/main" xmlns:a14="http://schemas.microsoft.com/office/drawing/2010/main" xmlns:p14="http://schemas.microsoft.com/office/powerpoint/2010/main" w="9525">
+                <a14:hiddenLine xmlns:p14="http://schemas.microsoft.com/office/powerpoint/2010/main" xmlns:a14="http://schemas.microsoft.com/office/drawing/2010/main" xmlns:a16="http://schemas.microsoft.com/office/drawing/2014/main" xmlns="" w="9525">
                   <a:solidFill>
                     <a:srgbClr val="000000"/>
                   </a:solidFill>
@@ -26973,7 +27309,7 @@
             </a:ln>
             <a:extLst>
               <a:ext uri="{91240B29-F687-4f45-9708-019B960494DF}">
-                <a14:hiddenLine xmlns="" xmlns:a16="http://schemas.microsoft.com/office/drawing/2014/main" xmlns:a14="http://schemas.microsoft.com/office/drawing/2010/main" xmlns:p14="http://schemas.microsoft.com/office/powerpoint/2010/main" w="9525">
+                <a14:hiddenLine xmlns:p14="http://schemas.microsoft.com/office/powerpoint/2010/main" xmlns:a14="http://schemas.microsoft.com/office/drawing/2010/main" xmlns:a16="http://schemas.microsoft.com/office/drawing/2014/main" xmlns="" w="9525">
                   <a:solidFill>
                     <a:srgbClr val="000000"/>
                   </a:solidFill>
@@ -27078,7 +27414,7 @@
             </a:ln>
             <a:extLst>
               <a:ext uri="{91240B29-F687-4f45-9708-019B960494DF}">
-                <a14:hiddenLine xmlns="" xmlns:a16="http://schemas.microsoft.com/office/drawing/2014/main" xmlns:a14="http://schemas.microsoft.com/office/drawing/2010/main" xmlns:p14="http://schemas.microsoft.com/office/powerpoint/2010/main" w="9525">
+                <a14:hiddenLine xmlns:p14="http://schemas.microsoft.com/office/powerpoint/2010/main" xmlns:a14="http://schemas.microsoft.com/office/drawing/2010/main" xmlns:a16="http://schemas.microsoft.com/office/drawing/2014/main" xmlns="" w="9525">
                   <a:solidFill>
                     <a:srgbClr val="000000"/>
                   </a:solidFill>
@@ -27161,7 +27497,7 @@
             </a:ln>
             <a:extLst>
               <a:ext uri="{91240B29-F687-4f45-9708-019B960494DF}">
-                <a14:hiddenLine xmlns="" xmlns:a16="http://schemas.microsoft.com/office/drawing/2014/main" xmlns:a14="http://schemas.microsoft.com/office/drawing/2010/main" xmlns:p14="http://schemas.microsoft.com/office/powerpoint/2010/main" w="9525">
+                <a14:hiddenLine xmlns:p14="http://schemas.microsoft.com/office/powerpoint/2010/main" xmlns:a14="http://schemas.microsoft.com/office/drawing/2010/main" xmlns:a16="http://schemas.microsoft.com/office/drawing/2014/main" xmlns="" w="9525">
                   <a:solidFill>
                     <a:srgbClr val="000000"/>
                   </a:solidFill>
@@ -27238,7 +27574,7 @@
             </a:ln>
             <a:extLst>
               <a:ext uri="{91240B29-F687-4f45-9708-019B960494DF}">
-                <a14:hiddenLine xmlns="" xmlns:a16="http://schemas.microsoft.com/office/drawing/2014/main" xmlns:a14="http://schemas.microsoft.com/office/drawing/2010/main" xmlns:p14="http://schemas.microsoft.com/office/powerpoint/2010/main" w="9525">
+                <a14:hiddenLine xmlns:p14="http://schemas.microsoft.com/office/powerpoint/2010/main" xmlns:a14="http://schemas.microsoft.com/office/drawing/2010/main" xmlns:a16="http://schemas.microsoft.com/office/drawing/2014/main" xmlns="" w="9525">
                   <a:solidFill>
                     <a:srgbClr val="000000"/>
                   </a:solidFill>
@@ -27343,7 +27679,7 @@
             </a:ln>
             <a:extLst>
               <a:ext uri="{91240B29-F687-4f45-9708-019B960494DF}">
-                <a14:hiddenLine xmlns="" xmlns:a16="http://schemas.microsoft.com/office/drawing/2014/main" xmlns:a14="http://schemas.microsoft.com/office/drawing/2010/main" xmlns:p14="http://schemas.microsoft.com/office/powerpoint/2010/main" w="9525">
+                <a14:hiddenLine xmlns:p14="http://schemas.microsoft.com/office/powerpoint/2010/main" xmlns:a14="http://schemas.microsoft.com/office/drawing/2010/main" xmlns:a16="http://schemas.microsoft.com/office/drawing/2014/main" xmlns="" w="9525">
                   <a:solidFill>
                     <a:srgbClr val="000000"/>
                   </a:solidFill>
@@ -27420,7 +27756,7 @@
             </a:ln>
             <a:extLst>
               <a:ext uri="{91240B29-F687-4f45-9708-019B960494DF}">
-                <a14:hiddenLine xmlns="" xmlns:a16="http://schemas.microsoft.com/office/drawing/2014/main" xmlns:a14="http://schemas.microsoft.com/office/drawing/2010/main" xmlns:p14="http://schemas.microsoft.com/office/powerpoint/2010/main" w="9525">
+                <a14:hiddenLine xmlns:p14="http://schemas.microsoft.com/office/powerpoint/2010/main" xmlns:a14="http://schemas.microsoft.com/office/drawing/2010/main" xmlns:a16="http://schemas.microsoft.com/office/drawing/2014/main" xmlns="" w="9525">
                   <a:solidFill>
                     <a:srgbClr val="000000"/>
                   </a:solidFill>
@@ -27525,7 +27861,7 @@
             </a:ln>
             <a:extLst>
               <a:ext uri="{91240B29-F687-4f45-9708-019B960494DF}">
-                <a14:hiddenLine xmlns="" xmlns:a16="http://schemas.microsoft.com/office/drawing/2014/main" xmlns:a14="http://schemas.microsoft.com/office/drawing/2010/main" xmlns:p14="http://schemas.microsoft.com/office/powerpoint/2010/main" w="9525">
+                <a14:hiddenLine xmlns:p14="http://schemas.microsoft.com/office/powerpoint/2010/main" xmlns:a14="http://schemas.microsoft.com/office/drawing/2010/main" xmlns:a16="http://schemas.microsoft.com/office/drawing/2014/main" xmlns="" w="9525">
                   <a:solidFill>
                     <a:srgbClr val="000000"/>
                   </a:solidFill>
@@ -27602,7 +27938,7 @@
             </a:ln>
             <a:extLst>
               <a:ext uri="{91240B29-F687-4f45-9708-019B960494DF}">
-                <a14:hiddenLine xmlns="" xmlns:a16="http://schemas.microsoft.com/office/drawing/2014/main" xmlns:a14="http://schemas.microsoft.com/office/drawing/2010/main" xmlns:p14="http://schemas.microsoft.com/office/powerpoint/2010/main" w="9525">
+                <a14:hiddenLine xmlns:p14="http://schemas.microsoft.com/office/powerpoint/2010/main" xmlns:a14="http://schemas.microsoft.com/office/drawing/2010/main" xmlns:a16="http://schemas.microsoft.com/office/drawing/2014/main" xmlns="" w="9525">
                   <a:solidFill>
                     <a:srgbClr val="000000"/>
                   </a:solidFill>
@@ -27707,7 +28043,7 @@
             </a:ln>
             <a:extLst>
               <a:ext uri="{91240B29-F687-4f45-9708-019B960494DF}">
-                <a14:hiddenLine xmlns="" xmlns:a16="http://schemas.microsoft.com/office/drawing/2014/main" xmlns:a14="http://schemas.microsoft.com/office/drawing/2010/main" xmlns:p14="http://schemas.microsoft.com/office/powerpoint/2010/main" w="9525">
+                <a14:hiddenLine xmlns:p14="http://schemas.microsoft.com/office/powerpoint/2010/main" xmlns:a14="http://schemas.microsoft.com/office/drawing/2010/main" xmlns:a16="http://schemas.microsoft.com/office/drawing/2014/main" xmlns="" w="9525">
                   <a:solidFill>
                     <a:srgbClr val="000000"/>
                   </a:solidFill>
@@ -27756,7 +28092,7 @@
             </a:ln>
             <a:extLst>
               <a:ext uri="{91240B29-F687-4f45-9708-019B960494DF}">
-                <a14:hiddenLine xmlns="" xmlns:a16="http://schemas.microsoft.com/office/drawing/2014/main" xmlns:a14="http://schemas.microsoft.com/office/drawing/2010/main" xmlns:p14="http://schemas.microsoft.com/office/powerpoint/2010/main" w="9525">
+                <a14:hiddenLine xmlns:p14="http://schemas.microsoft.com/office/powerpoint/2010/main" xmlns:a14="http://schemas.microsoft.com/office/drawing/2010/main" xmlns:a16="http://schemas.microsoft.com/office/drawing/2014/main" xmlns="" w="9525">
                   <a:solidFill>
                     <a:srgbClr val="000000"/>
                   </a:solidFill>
@@ -27836,7 +28172,7 @@
             </a:ln>
             <a:extLst>
               <a:ext uri="{91240B29-F687-4f45-9708-019B960494DF}">
-                <a14:hiddenLine xmlns="" xmlns:a16="http://schemas.microsoft.com/office/drawing/2014/main" xmlns:a14="http://schemas.microsoft.com/office/drawing/2010/main" xmlns:p14="http://schemas.microsoft.com/office/powerpoint/2010/main" w="9525">
+                <a14:hiddenLine xmlns:p14="http://schemas.microsoft.com/office/powerpoint/2010/main" xmlns:a14="http://schemas.microsoft.com/office/drawing/2010/main" xmlns:a16="http://schemas.microsoft.com/office/drawing/2014/main" xmlns="" w="9525">
                   <a:solidFill>
                     <a:srgbClr val="000000"/>
                   </a:solidFill>
@@ -27941,7 +28277,7 @@
             </a:ln>
             <a:extLst>
               <a:ext uri="{91240B29-F687-4f45-9708-019B960494DF}">
-                <a14:hiddenLine xmlns="" xmlns:a16="http://schemas.microsoft.com/office/drawing/2014/main" xmlns:a14="http://schemas.microsoft.com/office/drawing/2010/main" xmlns:p14="http://schemas.microsoft.com/office/powerpoint/2010/main" w="9525">
+                <a14:hiddenLine xmlns:p14="http://schemas.microsoft.com/office/powerpoint/2010/main" xmlns:a14="http://schemas.microsoft.com/office/drawing/2010/main" xmlns:a16="http://schemas.microsoft.com/office/drawing/2014/main" xmlns="" w="9525">
                   <a:solidFill>
                     <a:srgbClr val="000000"/>
                   </a:solidFill>
@@ -28018,7 +28354,7 @@
             </a:ln>
             <a:extLst>
               <a:ext uri="{91240B29-F687-4f45-9708-019B960494DF}">
-                <a14:hiddenLine xmlns="" xmlns:a16="http://schemas.microsoft.com/office/drawing/2014/main" xmlns:a14="http://schemas.microsoft.com/office/drawing/2010/main" xmlns:p14="http://schemas.microsoft.com/office/powerpoint/2010/main" w="9525">
+                <a14:hiddenLine xmlns:p14="http://schemas.microsoft.com/office/powerpoint/2010/main" xmlns:a14="http://schemas.microsoft.com/office/drawing/2010/main" xmlns:a16="http://schemas.microsoft.com/office/drawing/2014/main" xmlns="" w="9525">
                   <a:solidFill>
                     <a:srgbClr val="000000"/>
                   </a:solidFill>
@@ -28123,7 +28459,7 @@
             </a:ln>
             <a:extLst>
               <a:ext uri="{91240B29-F687-4f45-9708-019B960494DF}">
-                <a14:hiddenLine xmlns="" xmlns:a16="http://schemas.microsoft.com/office/drawing/2014/main" xmlns:a14="http://schemas.microsoft.com/office/drawing/2010/main" xmlns:p14="http://schemas.microsoft.com/office/powerpoint/2010/main" w="9525">
+                <a14:hiddenLine xmlns:p14="http://schemas.microsoft.com/office/powerpoint/2010/main" xmlns:a14="http://schemas.microsoft.com/office/drawing/2010/main" xmlns:a16="http://schemas.microsoft.com/office/drawing/2014/main" xmlns="" w="9525">
                   <a:solidFill>
                     <a:srgbClr val="000000"/>
                   </a:solidFill>
@@ -28228,7 +28564,7 @@
             </a:ln>
             <a:extLst>
               <a:ext uri="{91240B29-F687-4f45-9708-019B960494DF}">
-                <a14:hiddenLine xmlns="" xmlns:a16="http://schemas.microsoft.com/office/drawing/2014/main" xmlns:a14="http://schemas.microsoft.com/office/drawing/2010/main" xmlns:p14="http://schemas.microsoft.com/office/powerpoint/2010/main" w="9525">
+                <a14:hiddenLine xmlns:p14="http://schemas.microsoft.com/office/powerpoint/2010/main" xmlns:a14="http://schemas.microsoft.com/office/drawing/2010/main" xmlns:a16="http://schemas.microsoft.com/office/drawing/2014/main" xmlns="" w="9525">
                   <a:solidFill>
                     <a:srgbClr val="000000"/>
                   </a:solidFill>
@@ -28308,7 +28644,7 @@
             </a:ln>
             <a:extLst>
               <a:ext uri="{91240B29-F687-4f45-9708-019B960494DF}">
-                <a14:hiddenLine xmlns="" xmlns:a16="http://schemas.microsoft.com/office/drawing/2014/main" xmlns:a14="http://schemas.microsoft.com/office/drawing/2010/main" xmlns:p14="http://schemas.microsoft.com/office/powerpoint/2010/main" w="9525">
+                <a14:hiddenLine xmlns:p14="http://schemas.microsoft.com/office/powerpoint/2010/main" xmlns:a14="http://schemas.microsoft.com/office/drawing/2010/main" xmlns:a16="http://schemas.microsoft.com/office/drawing/2014/main" xmlns="" w="9525">
                   <a:solidFill>
                     <a:srgbClr val="000000"/>
                   </a:solidFill>
@@ -28385,7 +28721,7 @@
             </a:ln>
             <a:extLst>
               <a:ext uri="{91240B29-F687-4f45-9708-019B960494DF}">
-                <a14:hiddenLine xmlns="" xmlns:a16="http://schemas.microsoft.com/office/drawing/2014/main" xmlns:a14="http://schemas.microsoft.com/office/drawing/2010/main" xmlns:p14="http://schemas.microsoft.com/office/powerpoint/2010/main" w="9525">
+                <a14:hiddenLine xmlns:p14="http://schemas.microsoft.com/office/powerpoint/2010/main" xmlns:a14="http://schemas.microsoft.com/office/drawing/2010/main" xmlns:a16="http://schemas.microsoft.com/office/drawing/2014/main" xmlns="" w="9525">
                   <a:solidFill>
                     <a:srgbClr val="000000"/>
                   </a:solidFill>
@@ -28490,7 +28826,7 @@
             </a:ln>
             <a:extLst>
               <a:ext uri="{91240B29-F687-4f45-9708-019B960494DF}">
-                <a14:hiddenLine xmlns="" xmlns:a16="http://schemas.microsoft.com/office/drawing/2014/main" xmlns:a14="http://schemas.microsoft.com/office/drawing/2010/main" xmlns:p14="http://schemas.microsoft.com/office/powerpoint/2010/main" w="9525">
+                <a14:hiddenLine xmlns:p14="http://schemas.microsoft.com/office/powerpoint/2010/main" xmlns:a14="http://schemas.microsoft.com/office/drawing/2010/main" xmlns:a16="http://schemas.microsoft.com/office/drawing/2014/main" xmlns="" w="9525">
                   <a:solidFill>
                     <a:srgbClr val="000000"/>
                   </a:solidFill>
@@ -28595,7 +28931,7 @@
             </a:ln>
             <a:extLst>
               <a:ext uri="{91240B29-F687-4f45-9708-019B960494DF}">
-                <a14:hiddenLine xmlns="" xmlns:a16="http://schemas.microsoft.com/office/drawing/2014/main" xmlns:a14="http://schemas.microsoft.com/office/drawing/2010/main" xmlns:p14="http://schemas.microsoft.com/office/powerpoint/2010/main" w="9525">
+                <a14:hiddenLine xmlns:p14="http://schemas.microsoft.com/office/powerpoint/2010/main" xmlns:a14="http://schemas.microsoft.com/office/drawing/2010/main" xmlns:a16="http://schemas.microsoft.com/office/drawing/2014/main" xmlns="" w="9525">
                   <a:solidFill>
                     <a:srgbClr val="000000"/>
                   </a:solidFill>
@@ -28672,7 +29008,7 @@
             </a:ln>
             <a:extLst>
               <a:ext uri="{91240B29-F687-4f45-9708-019B960494DF}">
-                <a14:hiddenLine xmlns="" xmlns:a16="http://schemas.microsoft.com/office/drawing/2014/main" xmlns:a14="http://schemas.microsoft.com/office/drawing/2010/main" xmlns:p14="http://schemas.microsoft.com/office/powerpoint/2010/main" w="9525">
+                <a14:hiddenLine xmlns:p14="http://schemas.microsoft.com/office/powerpoint/2010/main" xmlns:a14="http://schemas.microsoft.com/office/drawing/2010/main" xmlns:a16="http://schemas.microsoft.com/office/drawing/2014/main" xmlns="" w="9525">
                   <a:solidFill>
                     <a:srgbClr val="000000"/>
                   </a:solidFill>
@@ -28807,7 +29143,7 @@
             </a:ln>
             <a:extLst>
               <a:ext uri="{91240B29-F687-4f45-9708-019B960494DF}">
-                <a14:hiddenLine xmlns="" xmlns:a16="http://schemas.microsoft.com/office/drawing/2014/main" xmlns:a14="http://schemas.microsoft.com/office/drawing/2010/main" xmlns:p14="http://schemas.microsoft.com/office/powerpoint/2010/main" w="9525">
+                <a14:hiddenLine xmlns:p14="http://schemas.microsoft.com/office/powerpoint/2010/main" xmlns:a14="http://schemas.microsoft.com/office/drawing/2010/main" xmlns:a16="http://schemas.microsoft.com/office/drawing/2014/main" xmlns="" w="9525">
                   <a:solidFill>
                     <a:srgbClr val="000000"/>
                   </a:solidFill>
@@ -28890,7 +29226,7 @@
             </a:ln>
             <a:extLst>
               <a:ext uri="{91240B29-F687-4f45-9708-019B960494DF}">
-                <a14:hiddenLine xmlns="" xmlns:a16="http://schemas.microsoft.com/office/drawing/2014/main" xmlns:a14="http://schemas.microsoft.com/office/drawing/2010/main" xmlns:p14="http://schemas.microsoft.com/office/powerpoint/2010/main" w="9525">
+                <a14:hiddenLine xmlns:p14="http://schemas.microsoft.com/office/powerpoint/2010/main" xmlns:a14="http://schemas.microsoft.com/office/drawing/2010/main" xmlns:a16="http://schemas.microsoft.com/office/drawing/2014/main" xmlns="" w="9525">
                   <a:solidFill>
                     <a:srgbClr val="000000"/>
                   </a:solidFill>
@@ -28995,7 +29331,7 @@
             </a:ln>
             <a:extLst>
               <a:ext uri="{91240B29-F687-4f45-9708-019B960494DF}">
-                <a14:hiddenLine xmlns="" xmlns:a16="http://schemas.microsoft.com/office/drawing/2014/main" xmlns:a14="http://schemas.microsoft.com/office/drawing/2010/main" xmlns:p14="http://schemas.microsoft.com/office/powerpoint/2010/main" w="9525">
+                <a14:hiddenLine xmlns:p14="http://schemas.microsoft.com/office/powerpoint/2010/main" xmlns:a14="http://schemas.microsoft.com/office/drawing/2010/main" xmlns:a16="http://schemas.microsoft.com/office/drawing/2014/main" xmlns="" w="9525">
                   <a:solidFill>
                     <a:srgbClr val="000000"/>
                   </a:solidFill>
@@ -29125,7 +29461,7 @@
             </a:ln>
             <a:extLst>
               <a:ext uri="{91240B29-F687-4f45-9708-019B960494DF}">
-                <a14:hiddenLine xmlns="" xmlns:a16="http://schemas.microsoft.com/office/drawing/2014/main" xmlns:a14="http://schemas.microsoft.com/office/drawing/2010/main" xmlns:p14="http://schemas.microsoft.com/office/powerpoint/2010/main" w="9525">
+                <a14:hiddenLine xmlns:p14="http://schemas.microsoft.com/office/powerpoint/2010/main" xmlns:a14="http://schemas.microsoft.com/office/drawing/2010/main" xmlns:a16="http://schemas.microsoft.com/office/drawing/2014/main" xmlns="" w="9525">
                   <a:solidFill>
                     <a:srgbClr val="000000"/>
                   </a:solidFill>
@@ -29255,7 +29591,7 @@
             </a:ln>
             <a:extLst>
               <a:ext uri="{91240B29-F687-4f45-9708-019B960494DF}">
-                <a14:hiddenLine xmlns="" xmlns:a16="http://schemas.microsoft.com/office/drawing/2014/main" xmlns:a14="http://schemas.microsoft.com/office/drawing/2010/main" xmlns:p14="http://schemas.microsoft.com/office/powerpoint/2010/main" w="9525">
+                <a14:hiddenLine xmlns:p14="http://schemas.microsoft.com/office/powerpoint/2010/main" xmlns:a14="http://schemas.microsoft.com/office/drawing/2010/main" xmlns:a16="http://schemas.microsoft.com/office/drawing/2014/main" xmlns="" w="9525">
                   <a:solidFill>
                     <a:srgbClr val="000000"/>
                   </a:solidFill>
@@ -29360,7 +29696,7 @@
             </a:ln>
             <a:extLst>
               <a:ext uri="{91240B29-F687-4f45-9708-019B960494DF}">
-                <a14:hiddenLine xmlns="" xmlns:a16="http://schemas.microsoft.com/office/drawing/2014/main" xmlns:a14="http://schemas.microsoft.com/office/drawing/2010/main" xmlns:p14="http://schemas.microsoft.com/office/powerpoint/2010/main" w="9525">
+                <a14:hiddenLine xmlns:p14="http://schemas.microsoft.com/office/powerpoint/2010/main" xmlns:a14="http://schemas.microsoft.com/office/drawing/2010/main" xmlns:a16="http://schemas.microsoft.com/office/drawing/2014/main" xmlns="" w="9525">
                   <a:solidFill>
                     <a:srgbClr val="000000"/>
                   </a:solidFill>
@@ -29440,7 +29776,7 @@
             </a:ln>
             <a:extLst>
               <a:ext uri="{91240B29-F687-4f45-9708-019B960494DF}">
-                <a14:hiddenLine xmlns="" xmlns:a16="http://schemas.microsoft.com/office/drawing/2014/main" xmlns:a14="http://schemas.microsoft.com/office/drawing/2010/main" xmlns:p14="http://schemas.microsoft.com/office/powerpoint/2010/main" w="9525">
+                <a14:hiddenLine xmlns:p14="http://schemas.microsoft.com/office/powerpoint/2010/main" xmlns:a14="http://schemas.microsoft.com/office/drawing/2010/main" xmlns:a16="http://schemas.microsoft.com/office/drawing/2014/main" xmlns="" w="9525">
                   <a:solidFill>
                     <a:srgbClr val="000000"/>
                   </a:solidFill>
@@ -29545,7 +29881,7 @@
             </a:ln>
             <a:extLst>
               <a:ext uri="{91240B29-F687-4f45-9708-019B960494DF}">
-                <a14:hiddenLine xmlns="" xmlns:a16="http://schemas.microsoft.com/office/drawing/2014/main" xmlns:a14="http://schemas.microsoft.com/office/drawing/2010/main" xmlns:p14="http://schemas.microsoft.com/office/powerpoint/2010/main" w="9525">
+                <a14:hiddenLine xmlns:p14="http://schemas.microsoft.com/office/powerpoint/2010/main" xmlns:a14="http://schemas.microsoft.com/office/drawing/2010/main" xmlns:a16="http://schemas.microsoft.com/office/drawing/2014/main" xmlns="" w="9525">
                   <a:solidFill>
                     <a:srgbClr val="000000"/>
                   </a:solidFill>
@@ -29628,7 +29964,7 @@
             </a:ln>
             <a:extLst>
               <a:ext uri="{91240B29-F687-4f45-9708-019B960494DF}">
-                <a14:hiddenLine xmlns="" xmlns:a16="http://schemas.microsoft.com/office/drawing/2014/main" xmlns:a14="http://schemas.microsoft.com/office/drawing/2010/main" xmlns:p14="http://schemas.microsoft.com/office/powerpoint/2010/main" w="9525">
+                <a14:hiddenLine xmlns:p14="http://schemas.microsoft.com/office/powerpoint/2010/main" xmlns:a14="http://schemas.microsoft.com/office/drawing/2010/main" xmlns:a16="http://schemas.microsoft.com/office/drawing/2014/main" xmlns="" w="9525">
                   <a:solidFill>
                     <a:srgbClr val="000000"/>
                   </a:solidFill>
@@ -29733,7 +30069,7 @@
             </a:ln>
             <a:extLst>
               <a:ext uri="{91240B29-F687-4f45-9708-019B960494DF}">
-                <a14:hiddenLine xmlns="" xmlns:a16="http://schemas.microsoft.com/office/drawing/2014/main" xmlns:a14="http://schemas.microsoft.com/office/drawing/2010/main" xmlns:p14="http://schemas.microsoft.com/office/powerpoint/2010/main" w="9525">
+                <a14:hiddenLine xmlns:p14="http://schemas.microsoft.com/office/powerpoint/2010/main" xmlns:a14="http://schemas.microsoft.com/office/drawing/2010/main" xmlns:a16="http://schemas.microsoft.com/office/drawing/2014/main" xmlns="" w="9525">
                   <a:solidFill>
                     <a:srgbClr val="000000"/>
                   </a:solidFill>
@@ -29816,7 +30152,7 @@
             </a:ln>
             <a:extLst>
               <a:ext uri="{91240B29-F687-4f45-9708-019B960494DF}">
-                <a14:hiddenLine xmlns="" xmlns:a16="http://schemas.microsoft.com/office/drawing/2014/main" xmlns:a14="http://schemas.microsoft.com/office/drawing/2010/main" xmlns:p14="http://schemas.microsoft.com/office/powerpoint/2010/main" w="9525">
+                <a14:hiddenLine xmlns:p14="http://schemas.microsoft.com/office/powerpoint/2010/main" xmlns:a14="http://schemas.microsoft.com/office/drawing/2010/main" xmlns:a16="http://schemas.microsoft.com/office/drawing/2014/main" xmlns="" w="9525">
                   <a:solidFill>
                     <a:srgbClr val="000000"/>
                   </a:solidFill>
@@ -29921,7 +30257,7 @@
             </a:ln>
             <a:extLst>
               <a:ext uri="{91240B29-F687-4f45-9708-019B960494DF}">
-                <a14:hiddenLine xmlns="" xmlns:a16="http://schemas.microsoft.com/office/drawing/2014/main" xmlns:a14="http://schemas.microsoft.com/office/drawing/2010/main" xmlns:p14="http://schemas.microsoft.com/office/powerpoint/2010/main" w="9525">
+                <a14:hiddenLine xmlns:p14="http://schemas.microsoft.com/office/powerpoint/2010/main" xmlns:a14="http://schemas.microsoft.com/office/drawing/2010/main" xmlns:a16="http://schemas.microsoft.com/office/drawing/2014/main" xmlns="" w="9525">
                   <a:solidFill>
                     <a:srgbClr val="000000"/>
                   </a:solidFill>
@@ -29970,7 +30306,7 @@
             </a:ln>
             <a:extLst>
               <a:ext uri="{91240B29-F687-4f45-9708-019B960494DF}">
-                <a14:hiddenLine xmlns="" xmlns:a16="http://schemas.microsoft.com/office/drawing/2014/main" xmlns:a14="http://schemas.microsoft.com/office/drawing/2010/main" xmlns:p14="http://schemas.microsoft.com/office/powerpoint/2010/main" w="9525">
+                <a14:hiddenLine xmlns:p14="http://schemas.microsoft.com/office/powerpoint/2010/main" xmlns:a14="http://schemas.microsoft.com/office/drawing/2010/main" xmlns:a16="http://schemas.microsoft.com/office/drawing/2014/main" xmlns="" w="9525">
                   <a:solidFill>
                     <a:srgbClr val="000000"/>
                   </a:solidFill>
@@ -30381,86 +30717,6 @@
           <p:cNvPr id="2" name="Title 1">
             <a:extLst>
               <a:ext uri="{FF2B5EF4-FFF2-40B4-BE49-F238E27FC236}">
-                <a16:creationId xmlns:a16="http://schemas.microsoft.com/office/drawing/2014/main" id="{BAC26105-4D67-4F6F-9993-6D5AAA9A5FA2}"/>
-              </a:ext>
-            </a:extLst>
-          </p:cNvPr>
-          <p:cNvSpPr>
-            <a:spLocks noGrp="1"/>
-          </p:cNvSpPr>
-          <p:nvPr>
-            <p:ph type="title"/>
-          </p:nvPr>
-        </p:nvSpPr>
-        <p:spPr/>
-        <p:txBody>
-          <a:bodyPr/>
-          <a:lstStyle/>
-          <a:p>
-            <a:endParaRPr lang="en-US"/>
-          </a:p>
-        </p:txBody>
-      </p:sp>
-      <p:sp>
-        <p:nvSpPr>
-          <p:cNvPr id="3" name="Content Placeholder 2">
-            <a:extLst>
-              <a:ext uri="{FF2B5EF4-FFF2-40B4-BE49-F238E27FC236}">
-                <a16:creationId xmlns:a16="http://schemas.microsoft.com/office/drawing/2014/main" id="{D552C8D5-F8F8-4BDC-8628-1026C9D7E332}"/>
-              </a:ext>
-            </a:extLst>
-          </p:cNvPr>
-          <p:cNvSpPr>
-            <a:spLocks noGrp="1"/>
-          </p:cNvSpPr>
-          <p:nvPr>
-            <p:ph idx="1"/>
-          </p:nvPr>
-        </p:nvSpPr>
-        <p:spPr/>
-        <p:txBody>
-          <a:bodyPr/>
-          <a:lstStyle/>
-          <a:p>
-            <a:endParaRPr lang="en-US"/>
-          </a:p>
-        </p:txBody>
-      </p:sp>
-    </p:spTree>
-    <p:extLst>
-      <p:ext uri="{BB962C8B-B14F-4D97-AF65-F5344CB8AC3E}">
-        <p14:creationId xmlns:p14="http://schemas.microsoft.com/office/powerpoint/2010/main" val="1068772232"/>
-      </p:ext>
-    </p:extLst>
-  </p:cSld>
-  <p:clrMapOvr>
-    <a:masterClrMapping/>
-  </p:clrMapOvr>
-</p:sld>
-</file>
-
-<file path=ppt/slides/slide7.xml><?xml version="1.0" encoding="utf-8"?>
-<p:sld xmlns:a="http://schemas.openxmlformats.org/drawingml/2006/main" xmlns:r="http://schemas.openxmlformats.org/officeDocument/2006/relationships" xmlns:p="http://schemas.openxmlformats.org/presentationml/2006/main">
-  <p:cSld>
-    <p:spTree>
-      <p:nvGrpSpPr>
-        <p:cNvPr id="1" name=""/>
-        <p:cNvGrpSpPr/>
-        <p:nvPr/>
-      </p:nvGrpSpPr>
-      <p:grpSpPr>
-        <a:xfrm>
-          <a:off x="0" y="0"/>
-          <a:ext cx="0" cy="0"/>
-          <a:chOff x="0" y="0"/>
-          <a:chExt cx="0" cy="0"/>
-        </a:xfrm>
-      </p:grpSpPr>
-      <p:sp>
-        <p:nvSpPr>
-          <p:cNvPr id="2" name="Title 1">
-            <a:extLst>
-              <a:ext uri="{FF2B5EF4-FFF2-40B4-BE49-F238E27FC236}">
                 <a16:creationId xmlns:a16="http://schemas.microsoft.com/office/drawing/2014/main" id="{55820EE6-6D5F-4C0D-8770-0CC1440B0117}"/>
               </a:ext>
             </a:extLst>
@@ -30522,7 +30778,7 @@
 </p:sld>
 </file>
 
-<file path=ppt/slides/slide8.xml><?xml version="1.0" encoding="utf-8"?>
+<file path=ppt/slides/slide7.xml><?xml version="1.0" encoding="utf-8"?>
 <p:sld xmlns:a="http://schemas.openxmlformats.org/drawingml/2006/main" xmlns:r="http://schemas.openxmlformats.org/officeDocument/2006/relationships" xmlns:p="http://schemas.openxmlformats.org/presentationml/2006/main">
   <p:cSld>
     <p:spTree>
@@ -30605,6 +30861,105 @@
 </p:sld>
 </file>
 
+<file path=ppt/slides/slide8.xml><?xml version="1.0" encoding="utf-8"?>
+<p:sld xmlns:a="http://schemas.openxmlformats.org/drawingml/2006/main" xmlns:r="http://schemas.openxmlformats.org/officeDocument/2006/relationships" xmlns:p="http://schemas.openxmlformats.org/presentationml/2006/main">
+  <p:cSld>
+    <p:spTree>
+      <p:nvGrpSpPr>
+        <p:cNvPr id="1" name=""/>
+        <p:cNvGrpSpPr/>
+        <p:nvPr/>
+      </p:nvGrpSpPr>
+      <p:grpSpPr>
+        <a:xfrm>
+          <a:off x="0" y="0"/>
+          <a:ext cx="0" cy="0"/>
+          <a:chOff x="0" y="0"/>
+          <a:chExt cx="0" cy="0"/>
+        </a:xfrm>
+      </p:grpSpPr>
+      <p:graphicFrame>
+        <p:nvGraphicFramePr>
+          <p:cNvPr id="5" name="Object 4">
+            <a:extLst>
+              <a:ext uri="{FF2B5EF4-FFF2-40B4-BE49-F238E27FC236}">
+                <a16:creationId xmlns:a16="http://schemas.microsoft.com/office/drawing/2014/main" id="{E7591E42-1D4C-4E6A-AFDD-62C7CE348B08}"/>
+              </a:ext>
+            </a:extLst>
+          </p:cNvPr>
+          <p:cNvGraphicFramePr>
+            <a:graphicFrameLocks noChangeAspect="1"/>
+          </p:cNvGraphicFramePr>
+          <p:nvPr>
+            <p:extLst>
+              <p:ext uri="{D42A27DB-BD31-4B8C-83A1-F6EECF244321}">
+                <p14:modId xmlns:p14="http://schemas.microsoft.com/office/powerpoint/2010/main" val="1309017066"/>
+              </p:ext>
+            </p:extLst>
+          </p:nvPr>
+        </p:nvGraphicFramePr>
+        <p:xfrm>
+          <a:off x="1243584" y="0"/>
+          <a:ext cx="10040112" cy="6858000"/>
+        </p:xfrm>
+        <a:graphic>
+          <a:graphicData uri="http://schemas.openxmlformats.org/presentationml/2006/ole">
+            <mc:AlternateContent xmlns:mc="http://schemas.openxmlformats.org/markup-compatibility/2006">
+              <mc:Choice xmlns:v="urn:schemas-microsoft-com:vml" Requires="v">
+                <p:oleObj spid="_x0000_s1026" name="Acrobat Document" r:id="rId3" imgW="2914254" imgH="3771477" progId="AcroExch.Document.DC">
+                  <p:embed/>
+                </p:oleObj>
+              </mc:Choice>
+              <mc:Fallback>
+                <p:oleObj name="Acrobat Document" r:id="rId3" imgW="2914254" imgH="3771477" progId="AcroExch.Document.DC">
+                  <p:embed/>
+                  <p:pic>
+                    <p:nvPicPr>
+                      <p:cNvPr id="5" name="Object 4">
+                        <a:extLst>
+                          <a:ext uri="{FF2B5EF4-FFF2-40B4-BE49-F238E27FC236}">
+                            <a16:creationId xmlns:a16="http://schemas.microsoft.com/office/drawing/2014/main" id="{E7591E42-1D4C-4E6A-AFDD-62C7CE348B08}"/>
+                          </a:ext>
+                        </a:extLst>
+                      </p:cNvPr>
+                      <p:cNvPicPr/>
+                      <p:nvPr/>
+                    </p:nvPicPr>
+                    <p:blipFill>
+                      <a:blip r:embed="rId4"/>
+                      <a:stretch>
+                        <a:fillRect/>
+                      </a:stretch>
+                    </p:blipFill>
+                    <p:spPr>
+                      <a:xfrm>
+                        <a:off x="1243584" y="0"/>
+                        <a:ext cx="10040112" cy="6858000"/>
+                      </a:xfrm>
+                      <a:prstGeom prst="rect">
+                        <a:avLst/>
+                      </a:prstGeom>
+                    </p:spPr>
+                  </p:pic>
+                </p:oleObj>
+              </mc:Fallback>
+            </mc:AlternateContent>
+          </a:graphicData>
+        </a:graphic>
+      </p:graphicFrame>
+    </p:spTree>
+    <p:extLst>
+      <p:ext uri="{BB962C8B-B14F-4D97-AF65-F5344CB8AC3E}">
+        <p14:creationId xmlns:p14="http://schemas.microsoft.com/office/powerpoint/2010/main" val="1068772232"/>
+      </p:ext>
+    </p:extLst>
+  </p:cSld>
+  <p:clrMapOvr>
+    <a:masterClrMapping/>
+  </p:clrMapOvr>
+</p:sld>
+</file>
+
 <file path=ppt/slides/slide9.xml><?xml version="1.0" encoding="utf-8"?>
 <p:sld xmlns:a="http://schemas.openxmlformats.org/drawingml/2006/main" xmlns:r="http://schemas.openxmlformats.org/officeDocument/2006/relationships" xmlns:p="http://schemas.openxmlformats.org/presentationml/2006/main">
   <p:cSld>
@@ -30627,7 +30982,7 @@
           <p:cNvPr id="2" name="Title 1">
             <a:extLst>
               <a:ext uri="{FF2B5EF4-FFF2-40B4-BE49-F238E27FC236}">
-                <a16:creationId xmlns:a16="http://schemas.microsoft.com/office/drawing/2014/main" id="{93659AED-62A4-412E-8260-E0FCB0416743}"/>
+                <a16:creationId xmlns:a16="http://schemas.microsoft.com/office/drawing/2014/main" id="{47A035B7-AA91-47B2-875A-FCCE9CCE653D}"/>
               </a:ext>
             </a:extLst>
           </p:cNvPr>
@@ -30645,40 +31000,55 @@
           <a:p>
             <a:r>
               <a:rPr lang="en-US" dirty="0"/>
-              <a:t>OBSERVATIONS </a:t>
+              <a:t>Variables </a:t>
             </a:r>
+            <a:r>
+              <a:rPr lang="en-US"/>
+              <a:t>by importance</a:t>
+            </a:r>
+            <a:endParaRPr lang="en-US" dirty="0"/>
           </a:p>
         </p:txBody>
       </p:sp>
-      <p:sp>
-        <p:nvSpPr>
-          <p:cNvPr id="3" name="Content Placeholder 2">
+      <p:pic>
+        <p:nvPicPr>
+          <p:cNvPr id="5" name="Content Placeholder 4">
             <a:extLst>
               <a:ext uri="{FF2B5EF4-FFF2-40B4-BE49-F238E27FC236}">
-                <a16:creationId xmlns:a16="http://schemas.microsoft.com/office/drawing/2014/main" id="{7AA3378D-A764-442A-8DBD-DD5EB27E9931}"/>
+                <a16:creationId xmlns:a16="http://schemas.microsoft.com/office/drawing/2014/main" id="{31620787-4E64-459B-B76D-9D620375F254}"/>
               </a:ext>
             </a:extLst>
           </p:cNvPr>
-          <p:cNvSpPr>
-            <a:spLocks noGrp="1"/>
-          </p:cNvSpPr>
+          <p:cNvPicPr>
+            <a:picLocks noGrp="1" noChangeAspect="1"/>
+          </p:cNvPicPr>
           <p:nvPr>
             <p:ph idx="1"/>
           </p:nvPr>
-        </p:nvSpPr>
-        <p:spPr/>
-        <p:txBody>
-          <a:bodyPr/>
-          <a:lstStyle/>
-          <a:p>
-            <a:endParaRPr lang="en-US"/>
-          </a:p>
-        </p:txBody>
-      </p:sp>
+        </p:nvPicPr>
+        <p:blipFill>
+          <a:blip r:embed="rId2">
+            <a:extLst>
+              <a:ext uri="{28A0092B-C50C-407E-A947-70E740481C1C}">
+                <a14:useLocalDpi xmlns:a14="http://schemas.microsoft.com/office/drawing/2010/main" val="0"/>
+              </a:ext>
+            </a:extLst>
+          </a:blip>
+          <a:stretch>
+            <a:fillRect/>
+          </a:stretch>
+        </p:blipFill>
+        <p:spPr>
+          <a:xfrm>
+            <a:off x="3880843" y="2249488"/>
+            <a:ext cx="4427139" cy="3541712"/>
+          </a:xfrm>
+        </p:spPr>
+      </p:pic>
     </p:spTree>
     <p:extLst>
       <p:ext uri="{BB962C8B-B14F-4D97-AF65-F5344CB8AC3E}">
-        <p14:creationId xmlns:p14="http://schemas.microsoft.com/office/powerpoint/2010/main" val="1430479338"/>
+        <p14:creationId xmlns:p14="http://schemas.microsoft.com/office/powerpoint/2010/main" val="909329800"/>
       </p:ext>
     </p:extLst>
   </p:cSld>

</xml_diff>

<commit_message>
Added more EDA to code & updated powerpoint
</commit_message>
<xml_diff>
--- a/Presentation & Dashboard/DDS401_TeamNI_Case_Study_2.pptx
+++ b/Presentation & Dashboard/DDS401_TeamNI_Case_Study_2.pptx
@@ -10,14 +10,16 @@
     <p:sldId id="257" r:id="rId4"/>
     <p:sldId id="258" r:id="rId5"/>
     <p:sldId id="265" r:id="rId6"/>
-    <p:sldId id="259" r:id="rId7"/>
-    <p:sldId id="260" r:id="rId8"/>
-    <p:sldId id="261" r:id="rId9"/>
-    <p:sldId id="268" r:id="rId10"/>
-    <p:sldId id="267" r:id="rId11"/>
-    <p:sldId id="262" r:id="rId12"/>
-    <p:sldId id="263" r:id="rId13"/>
-    <p:sldId id="264" r:id="rId14"/>
+    <p:sldId id="260" r:id="rId7"/>
+    <p:sldId id="259" r:id="rId8"/>
+    <p:sldId id="269" r:id="rId9"/>
+    <p:sldId id="270" r:id="rId10"/>
+    <p:sldId id="268" r:id="rId11"/>
+    <p:sldId id="261" r:id="rId12"/>
+    <p:sldId id="267" r:id="rId13"/>
+    <p:sldId id="262" r:id="rId14"/>
+    <p:sldId id="263" r:id="rId15"/>
+    <p:sldId id="264" r:id="rId16"/>
   </p:sldIdLst>
   <p:sldSz cx="12192000" cy="6858000"/>
   <p:notesSz cx="6858000" cy="9144000"/>
@@ -127,7 +129,7 @@
 <file path=ppt/revisionInfo.xml><?xml version="1.0" encoding="utf-8"?>
 <p1510:revInfo xmlns:a="http://schemas.openxmlformats.org/drawingml/2006/main" xmlns:r="http://schemas.openxmlformats.org/officeDocument/2006/relationships" xmlns:p1510="http://schemas.microsoft.com/office/powerpoint/2015/10/main">
   <p1510:revLst>
-    <p1510:client id="{9197C983-6F16-4D4F-AD95-479F5CC7F22A}" v="62" dt="2019-02-27T16:50:35.602"/>
+    <p1510:client id="{9197C983-6F16-4D4F-AD95-479F5CC7F22A}" v="70" dt="2019-02-27T21:04:17.044"/>
   </p1510:revLst>
 </p1510:revInfo>
 </file>
@@ -137,7 +139,7 @@
   <pc:docChgLst>
     <pc:chgData name="ayoade dare" userId="1c7e7bc2090c3d74" providerId="LiveId" clId="{9197C983-6F16-4D4F-AD95-479F5CC7F22A}"/>
     <pc:docChg chg="undo custSel mod addSld modSld sldOrd">
-      <pc:chgData name="ayoade dare" userId="1c7e7bc2090c3d74" providerId="LiveId" clId="{9197C983-6F16-4D4F-AD95-479F5CC7F22A}" dt="2019-02-27T16:50:51.446" v="901" actId="20577"/>
+      <pc:chgData name="ayoade dare" userId="1c7e7bc2090c3d74" providerId="LiveId" clId="{9197C983-6F16-4D4F-AD95-479F5CC7F22A}" dt="2019-02-27T21:04:56.238" v="1122" actId="14100"/>
       <pc:docMkLst>
         <pc:docMk/>
       </pc:docMkLst>
@@ -203,8 +205,62 @@
           </ac:graphicFrameMkLst>
         </pc:graphicFrameChg>
       </pc:sldChg>
+      <pc:sldChg chg="addSp delSp modSp">
+        <pc:chgData name="ayoade dare" userId="1c7e7bc2090c3d74" providerId="LiveId" clId="{9197C983-6F16-4D4F-AD95-479F5CC7F22A}" dt="2019-02-27T21:02:33.728" v="1047" actId="14100"/>
+        <pc:sldMkLst>
+          <pc:docMk/>
+          <pc:sldMk cId="2133803405" sldId="259"/>
+        </pc:sldMkLst>
+        <pc:spChg chg="del">
+          <ac:chgData name="ayoade dare" userId="1c7e7bc2090c3d74" providerId="LiveId" clId="{9197C983-6F16-4D4F-AD95-479F5CC7F22A}" dt="2019-02-27T20:52:05.048" v="902"/>
+          <ac:spMkLst>
+            <pc:docMk/>
+            <pc:sldMk cId="2133803405" sldId="259"/>
+            <ac:spMk id="3" creationId="{3C70AF10-ED1F-44E8-8703-0BA8C1E61740}"/>
+          </ac:spMkLst>
+        </pc:spChg>
+        <pc:picChg chg="add mod">
+          <ac:chgData name="ayoade dare" userId="1c7e7bc2090c3d74" providerId="LiveId" clId="{9197C983-6F16-4D4F-AD95-479F5CC7F22A}" dt="2019-02-27T21:02:33.728" v="1047" actId="14100"/>
+          <ac:picMkLst>
+            <pc:docMk/>
+            <pc:sldMk cId="2133803405" sldId="259"/>
+            <ac:picMk id="4" creationId="{2EFE59C8-26E7-4DAB-9256-51FDBB3D724F}"/>
+          </ac:picMkLst>
+        </pc:picChg>
+      </pc:sldChg>
       <pc:sldChg chg="addSp delSp modSp ord">
-        <pc:chgData name="ayoade dare" userId="1c7e7bc2090c3d74" providerId="LiveId" clId="{9197C983-6F16-4D4F-AD95-479F5CC7F22A}" dt="2019-02-27T16:31:22.853" v="809"/>
+        <pc:chgData name="ayoade dare" userId="1c7e7bc2090c3d74" providerId="LiveId" clId="{9197C983-6F16-4D4F-AD95-479F5CC7F22A}" dt="2019-02-27T21:02:26.902" v="1046" actId="1076"/>
+        <pc:sldMkLst>
+          <pc:docMk/>
+          <pc:sldMk cId="1915982763" sldId="260"/>
+        </pc:sldMkLst>
+        <pc:spChg chg="mod">
+          <ac:chgData name="ayoade dare" userId="1c7e7bc2090c3d74" providerId="LiveId" clId="{9197C983-6F16-4D4F-AD95-479F5CC7F22A}" dt="2019-02-27T21:02:13.796" v="1041" actId="20577"/>
+          <ac:spMkLst>
+            <pc:docMk/>
+            <pc:sldMk cId="1915982763" sldId="260"/>
+            <ac:spMk id="2" creationId="{0F9427A7-8023-45ED-8265-E55740E66921}"/>
+          </ac:spMkLst>
+        </pc:spChg>
+        <pc:spChg chg="del">
+          <ac:chgData name="ayoade dare" userId="1c7e7bc2090c3d74" providerId="LiveId" clId="{9197C983-6F16-4D4F-AD95-479F5CC7F22A}" dt="2019-02-27T20:58:48.731" v="920"/>
+          <ac:spMkLst>
+            <pc:docMk/>
+            <pc:sldMk cId="1915982763" sldId="260"/>
+            <ac:spMk id="3" creationId="{FDC0D1DC-DC8F-4240-8CB1-485F38454B60}"/>
+          </ac:spMkLst>
+        </pc:spChg>
+        <pc:picChg chg="add mod">
+          <ac:chgData name="ayoade dare" userId="1c7e7bc2090c3d74" providerId="LiveId" clId="{9197C983-6F16-4D4F-AD95-479F5CC7F22A}" dt="2019-02-27T21:02:26.902" v="1046" actId="1076"/>
+          <ac:picMkLst>
+            <pc:docMk/>
+            <pc:sldMk cId="1915982763" sldId="260"/>
+            <ac:picMk id="4" creationId="{B05C0AB2-A04F-4C7B-928F-0F9F7A230523}"/>
+          </ac:picMkLst>
+        </pc:picChg>
+      </pc:sldChg>
+      <pc:sldChg chg="addSp delSp modSp ord">
+        <pc:chgData name="ayoade dare" userId="1c7e7bc2090c3d74" providerId="LiveId" clId="{9197C983-6F16-4D4F-AD95-479F5CC7F22A}" dt="2019-02-27T21:00:34.150" v="925" actId="478"/>
         <pc:sldMkLst>
           <pc:docMk/>
           <pc:sldMk cId="1068772232" sldId="261"/>
@@ -233,8 +289,8 @@
             <ac:graphicFrameMk id="4" creationId="{D2686EBF-6C8E-44FB-83E9-FA0D740256C9}"/>
           </ac:graphicFrameMkLst>
         </pc:graphicFrameChg>
-        <pc:graphicFrameChg chg="add mod">
-          <ac:chgData name="ayoade dare" userId="1c7e7bc2090c3d74" providerId="LiveId" clId="{9197C983-6F16-4D4F-AD95-479F5CC7F22A}" dt="2019-02-27T16:31:12.234" v="808" actId="14100"/>
+        <pc:graphicFrameChg chg="add del mod">
+          <ac:chgData name="ayoade dare" userId="1c7e7bc2090c3d74" providerId="LiveId" clId="{9197C983-6F16-4D4F-AD95-479F5CC7F22A}" dt="2019-02-27T21:00:34.150" v="925" actId="478"/>
           <ac:graphicFrameMkLst>
             <pc:docMk/>
             <pc:sldMk cId="1068772232" sldId="261"/>
@@ -737,7 +793,7 @@
         </pc:picChg>
       </pc:sldChg>
       <pc:sldChg chg="addSp delSp modSp add">
-        <pc:chgData name="ayoade dare" userId="1c7e7bc2090c3d74" providerId="LiveId" clId="{9197C983-6F16-4D4F-AD95-479F5CC7F22A}" dt="2019-02-27T16:50:12.583" v="856" actId="20577"/>
+        <pc:chgData name="ayoade dare" userId="1c7e7bc2090c3d74" providerId="LiveId" clId="{9197C983-6F16-4D4F-AD95-479F5CC7F22A}" dt="2019-02-27T21:04:56.238" v="1122" actId="14100"/>
         <pc:sldMkLst>
           <pc:docMk/>
           <pc:sldMk cId="2423320413" sldId="267"/>
@@ -807,7 +863,7 @@
           </ac:picMkLst>
         </pc:picChg>
         <pc:picChg chg="add mod">
-          <ac:chgData name="ayoade dare" userId="1c7e7bc2090c3d74" providerId="LiveId" clId="{9197C983-6F16-4D4F-AD95-479F5CC7F22A}" dt="2019-02-27T16:43:34.345" v="839"/>
+          <ac:chgData name="ayoade dare" userId="1c7e7bc2090c3d74" providerId="LiveId" clId="{9197C983-6F16-4D4F-AD95-479F5CC7F22A}" dt="2019-02-27T21:04:56.238" v="1122" actId="14100"/>
           <ac:picMkLst>
             <pc:docMk/>
             <pc:sldMk cId="2423320413" sldId="267"/>
@@ -816,7 +872,7 @@
         </pc:picChg>
       </pc:sldChg>
       <pc:sldChg chg="addSp delSp modSp add ord">
-        <pc:chgData name="ayoade dare" userId="1c7e7bc2090c3d74" providerId="LiveId" clId="{9197C983-6F16-4D4F-AD95-479F5CC7F22A}" dt="2019-02-27T16:50:51.446" v="901" actId="20577"/>
+        <pc:chgData name="ayoade dare" userId="1c7e7bc2090c3d74" providerId="LiveId" clId="{9197C983-6F16-4D4F-AD95-479F5CC7F22A}" dt="2019-02-27T21:04:40.032" v="1118" actId="1076"/>
         <pc:sldMkLst>
           <pc:docMk/>
           <pc:sldMk cId="909329800" sldId="268"/>
@@ -838,11 +894,73 @@
           </ac:spMkLst>
         </pc:spChg>
         <pc:picChg chg="add mod">
-          <ac:chgData name="ayoade dare" userId="1c7e7bc2090c3d74" providerId="LiveId" clId="{9197C983-6F16-4D4F-AD95-479F5CC7F22A}" dt="2019-02-27T16:43:53.004" v="841"/>
+          <ac:chgData name="ayoade dare" userId="1c7e7bc2090c3d74" providerId="LiveId" clId="{9197C983-6F16-4D4F-AD95-479F5CC7F22A}" dt="2019-02-27T21:04:40.032" v="1118" actId="1076"/>
           <ac:picMkLst>
             <pc:docMk/>
             <pc:sldMk cId="909329800" sldId="268"/>
             <ac:picMk id="5" creationId="{31620787-4E64-459B-B76D-9D620375F254}"/>
+          </ac:picMkLst>
+        </pc:picChg>
+      </pc:sldChg>
+      <pc:sldChg chg="addSp delSp modSp add">
+        <pc:chgData name="ayoade dare" userId="1c7e7bc2090c3d74" providerId="LiveId" clId="{9197C983-6F16-4D4F-AD95-479F5CC7F22A}" dt="2019-02-27T21:02:52.494" v="1074" actId="14100"/>
+        <pc:sldMkLst>
+          <pc:docMk/>
+          <pc:sldMk cId="2429492815" sldId="269"/>
+        </pc:sldMkLst>
+        <pc:spChg chg="mod">
+          <ac:chgData name="ayoade dare" userId="1c7e7bc2090c3d74" providerId="LiveId" clId="{9197C983-6F16-4D4F-AD95-479F5CC7F22A}" dt="2019-02-27T21:02:48.634" v="1073" actId="20577"/>
+          <ac:spMkLst>
+            <pc:docMk/>
+            <pc:sldMk cId="2429492815" sldId="269"/>
+            <ac:spMk id="2" creationId="{E4B3DB3B-B2AB-4A38-8C8B-02936BF3F5A5}"/>
+          </ac:spMkLst>
+        </pc:spChg>
+        <pc:spChg chg="del">
+          <ac:chgData name="ayoade dare" userId="1c7e7bc2090c3d74" providerId="LiveId" clId="{9197C983-6F16-4D4F-AD95-479F5CC7F22A}" dt="2019-02-27T20:53:19.356" v="910"/>
+          <ac:spMkLst>
+            <pc:docMk/>
+            <pc:sldMk cId="2429492815" sldId="269"/>
+            <ac:spMk id="3" creationId="{6D88087E-6B5E-414F-938E-A06B80E7CFB4}"/>
+          </ac:spMkLst>
+        </pc:spChg>
+        <pc:picChg chg="add mod">
+          <ac:chgData name="ayoade dare" userId="1c7e7bc2090c3d74" providerId="LiveId" clId="{9197C983-6F16-4D4F-AD95-479F5CC7F22A}" dt="2019-02-27T21:02:52.494" v="1074" actId="14100"/>
+          <ac:picMkLst>
+            <pc:docMk/>
+            <pc:sldMk cId="2429492815" sldId="269"/>
+            <ac:picMk id="4" creationId="{43B25065-39CA-4091-974B-313A408C02A3}"/>
+          </ac:picMkLst>
+        </pc:picChg>
+      </pc:sldChg>
+      <pc:sldChg chg="addSp delSp modSp add">
+        <pc:chgData name="ayoade dare" userId="1c7e7bc2090c3d74" providerId="LiveId" clId="{9197C983-6F16-4D4F-AD95-479F5CC7F22A}" dt="2019-02-27T21:03:33.769" v="1111" actId="14100"/>
+        <pc:sldMkLst>
+          <pc:docMk/>
+          <pc:sldMk cId="730624188" sldId="270"/>
+        </pc:sldMkLst>
+        <pc:spChg chg="mod">
+          <ac:chgData name="ayoade dare" userId="1c7e7bc2090c3d74" providerId="LiveId" clId="{9197C983-6F16-4D4F-AD95-479F5CC7F22A}" dt="2019-02-27T21:03:05.971" v="1104" actId="20577"/>
+          <ac:spMkLst>
+            <pc:docMk/>
+            <pc:sldMk cId="730624188" sldId="270"/>
+            <ac:spMk id="2" creationId="{6E75AD97-4409-4126-B4CA-F89338D54DD9}"/>
+          </ac:spMkLst>
+        </pc:spChg>
+        <pc:spChg chg="del">
+          <ac:chgData name="ayoade dare" userId="1c7e7bc2090c3d74" providerId="LiveId" clId="{9197C983-6F16-4D4F-AD95-479F5CC7F22A}" dt="2019-02-27T20:54:11.796" v="919"/>
+          <ac:spMkLst>
+            <pc:docMk/>
+            <pc:sldMk cId="730624188" sldId="270"/>
+            <ac:spMk id="3" creationId="{7A9F7B31-A418-4CEB-9A09-E6AF12ED64C1}"/>
+          </ac:spMkLst>
+        </pc:spChg>
+        <pc:picChg chg="add mod">
+          <ac:chgData name="ayoade dare" userId="1c7e7bc2090c3d74" providerId="LiveId" clId="{9197C983-6F16-4D4F-AD95-479F5CC7F22A}" dt="2019-02-27T21:03:33.769" v="1111" actId="14100"/>
+          <ac:picMkLst>
+            <pc:docMk/>
+            <pc:sldMk cId="730624188" sldId="270"/>
+            <ac:picMk id="4" creationId="{18DAE568-E662-4121-906B-80778C342151}"/>
           </ac:picMkLst>
         </pc:picChg>
       </pc:sldChg>
@@ -11343,7 +11461,7 @@
           <a:noFill/>
           <a:extLst>
             <a:ext uri="{909E8E84-426E-40dd-AFC4-6F175D3DCCD1}">
-              <a14:hiddenFill xmlns="" xmlns:a14="http://schemas.microsoft.com/office/drawing/2010/main">
+              <a14:hiddenFill xmlns:a14="http://schemas.microsoft.com/office/drawing/2010/main" xmlns="">
                 <a:solidFill>
                   <a:srgbClr val="FFFFFF"/>
                 </a:solidFill>
@@ -11402,7 +11520,7 @@
             </a:ln>
             <a:extLst>
               <a:ext uri="{91240B29-F687-4f45-9708-019B960494DF}">
-                <a14:hiddenLine xmlns="" xmlns:a14="http://schemas.microsoft.com/office/drawing/2010/main" w="9525">
+                <a14:hiddenLine xmlns:a14="http://schemas.microsoft.com/office/drawing/2010/main" xmlns="" w="9525">
                   <a:solidFill>
                     <a:srgbClr val="000000"/>
                   </a:solidFill>
@@ -11492,7 +11610,7 @@
             </a:ln>
             <a:extLst>
               <a:ext uri="{91240B29-F687-4f45-9708-019B960494DF}">
-                <a14:hiddenLine xmlns="" xmlns:a14="http://schemas.microsoft.com/office/drawing/2010/main" w="9525">
+                <a14:hiddenLine xmlns:a14="http://schemas.microsoft.com/office/drawing/2010/main" xmlns="" w="9525">
                   <a:solidFill>
                     <a:srgbClr val="000000"/>
                   </a:solidFill>
@@ -11582,7 +11700,7 @@
             </a:ln>
             <a:extLst>
               <a:ext uri="{91240B29-F687-4f45-9708-019B960494DF}">
-                <a14:hiddenLine xmlns="" xmlns:a14="http://schemas.microsoft.com/office/drawing/2010/main" w="9525">
+                <a14:hiddenLine xmlns:a14="http://schemas.microsoft.com/office/drawing/2010/main" xmlns="" w="9525">
                   <a:solidFill>
                     <a:srgbClr val="000000"/>
                   </a:solidFill>
@@ -11616,7 +11734,7 @@
             </a:ln>
             <a:extLst>
               <a:ext uri="{91240B29-F687-4f45-9708-019B960494DF}">
-                <a14:hiddenLine xmlns="" xmlns:a14="http://schemas.microsoft.com/office/drawing/2010/main" w="9525">
+                <a14:hiddenLine xmlns:a14="http://schemas.microsoft.com/office/drawing/2010/main" xmlns="" w="9525">
                   <a:solidFill>
                     <a:srgbClr val="000000"/>
                   </a:solidFill>
@@ -11706,7 +11824,7 @@
             </a:ln>
             <a:extLst>
               <a:ext uri="{91240B29-F687-4f45-9708-019B960494DF}">
-                <a14:hiddenLine xmlns="" xmlns:a14="http://schemas.microsoft.com/office/drawing/2010/main" w="9525">
+                <a14:hiddenLine xmlns:a14="http://schemas.microsoft.com/office/drawing/2010/main" xmlns="" w="9525">
                   <a:solidFill>
                     <a:srgbClr val="000000"/>
                   </a:solidFill>
@@ -11768,7 +11886,7 @@
             </a:ln>
             <a:extLst>
               <a:ext uri="{91240B29-F687-4f45-9708-019B960494DF}">
-                <a14:hiddenLine xmlns="" xmlns:a14="http://schemas.microsoft.com/office/drawing/2010/main" w="9525">
+                <a14:hiddenLine xmlns:a14="http://schemas.microsoft.com/office/drawing/2010/main" xmlns="" w="9525">
                   <a:solidFill>
                     <a:srgbClr val="000000"/>
                   </a:solidFill>
@@ -11830,7 +11948,7 @@
             </a:ln>
             <a:extLst>
               <a:ext uri="{91240B29-F687-4f45-9708-019B960494DF}">
-                <a14:hiddenLine xmlns="" xmlns:a14="http://schemas.microsoft.com/office/drawing/2010/main" w="9525">
+                <a14:hiddenLine xmlns:a14="http://schemas.microsoft.com/office/drawing/2010/main" xmlns="" w="9525">
                   <a:solidFill>
                     <a:srgbClr val="000000"/>
                   </a:solidFill>
@@ -11920,7 +12038,7 @@
             </a:ln>
             <a:extLst>
               <a:ext uri="{91240B29-F687-4f45-9708-019B960494DF}">
-                <a14:hiddenLine xmlns="" xmlns:a14="http://schemas.microsoft.com/office/drawing/2010/main" w="9525">
+                <a14:hiddenLine xmlns:a14="http://schemas.microsoft.com/office/drawing/2010/main" xmlns="" w="9525">
                   <a:solidFill>
                     <a:srgbClr val="000000"/>
                   </a:solidFill>
@@ -11982,7 +12100,7 @@
             </a:ln>
             <a:extLst>
               <a:ext uri="{91240B29-F687-4f45-9708-019B960494DF}">
-                <a14:hiddenLine xmlns="" xmlns:a14="http://schemas.microsoft.com/office/drawing/2010/main" w="9525">
+                <a14:hiddenLine xmlns:a14="http://schemas.microsoft.com/office/drawing/2010/main" xmlns="" w="9525">
                   <a:solidFill>
                     <a:srgbClr val="000000"/>
                   </a:solidFill>
@@ -12044,7 +12162,7 @@
             </a:ln>
             <a:extLst>
               <a:ext uri="{91240B29-F687-4f45-9708-019B960494DF}">
-                <a14:hiddenLine xmlns="" xmlns:a14="http://schemas.microsoft.com/office/drawing/2010/main" w="9525">
+                <a14:hiddenLine xmlns:a14="http://schemas.microsoft.com/office/drawing/2010/main" xmlns="" w="9525">
                   <a:solidFill>
                     <a:srgbClr val="000000"/>
                   </a:solidFill>
@@ -12134,7 +12252,7 @@
             </a:ln>
             <a:extLst>
               <a:ext uri="{91240B29-F687-4f45-9708-019B960494DF}">
-                <a14:hiddenLine xmlns="" xmlns:a14="http://schemas.microsoft.com/office/drawing/2010/main" w="9525">
+                <a14:hiddenLine xmlns:a14="http://schemas.microsoft.com/office/drawing/2010/main" xmlns="" w="9525">
                   <a:solidFill>
                     <a:srgbClr val="000000"/>
                   </a:solidFill>
@@ -12224,7 +12342,7 @@
             </a:ln>
             <a:extLst>
               <a:ext uri="{91240B29-F687-4f45-9708-019B960494DF}">
-                <a14:hiddenLine xmlns="" xmlns:a14="http://schemas.microsoft.com/office/drawing/2010/main" w="9525">
+                <a14:hiddenLine xmlns:a14="http://schemas.microsoft.com/office/drawing/2010/main" xmlns="" w="9525">
                   <a:solidFill>
                     <a:srgbClr val="000000"/>
                   </a:solidFill>
@@ -12286,7 +12404,7 @@
             </a:ln>
             <a:extLst>
               <a:ext uri="{91240B29-F687-4f45-9708-019B960494DF}">
-                <a14:hiddenLine xmlns="" xmlns:a14="http://schemas.microsoft.com/office/drawing/2010/main" w="9525">
+                <a14:hiddenLine xmlns:a14="http://schemas.microsoft.com/office/drawing/2010/main" xmlns="" w="9525">
                   <a:solidFill>
                     <a:srgbClr val="000000"/>
                   </a:solidFill>
@@ -12396,7 +12514,7 @@
             </a:ln>
             <a:extLst>
               <a:ext uri="{91240B29-F687-4f45-9708-019B960494DF}">
-                <a14:hiddenLine xmlns="" xmlns:a14="http://schemas.microsoft.com/office/drawing/2010/main" w="9525">
+                <a14:hiddenLine xmlns:a14="http://schemas.microsoft.com/office/drawing/2010/main" xmlns="" w="9525">
                   <a:solidFill>
                     <a:srgbClr val="000000"/>
                   </a:solidFill>
@@ -12458,7 +12576,7 @@
             </a:ln>
             <a:extLst>
               <a:ext uri="{91240B29-F687-4f45-9708-019B960494DF}">
-                <a14:hiddenLine xmlns="" xmlns:a14="http://schemas.microsoft.com/office/drawing/2010/main" w="9525">
+                <a14:hiddenLine xmlns:a14="http://schemas.microsoft.com/office/drawing/2010/main" xmlns="" w="9525">
                   <a:solidFill>
                     <a:srgbClr val="000000"/>
                   </a:solidFill>
@@ -12548,7 +12666,7 @@
             </a:ln>
             <a:extLst>
               <a:ext uri="{91240B29-F687-4f45-9708-019B960494DF}">
-                <a14:hiddenLine xmlns="" xmlns:a14="http://schemas.microsoft.com/office/drawing/2010/main" w="9525">
+                <a14:hiddenLine xmlns:a14="http://schemas.microsoft.com/office/drawing/2010/main" xmlns="" w="9525">
                   <a:solidFill>
                     <a:srgbClr val="000000"/>
                   </a:solidFill>
@@ -12638,7 +12756,7 @@
             </a:ln>
             <a:extLst>
               <a:ext uri="{91240B29-F687-4f45-9708-019B960494DF}">
-                <a14:hiddenLine xmlns="" xmlns:a14="http://schemas.microsoft.com/office/drawing/2010/main" w="9525">
+                <a14:hiddenLine xmlns:a14="http://schemas.microsoft.com/office/drawing/2010/main" xmlns="" w="9525">
                   <a:solidFill>
                     <a:srgbClr val="000000"/>
                   </a:solidFill>
@@ -12700,7 +12818,7 @@
             </a:ln>
             <a:extLst>
               <a:ext uri="{91240B29-F687-4f45-9708-019B960494DF}">
-                <a14:hiddenLine xmlns="" xmlns:a14="http://schemas.microsoft.com/office/drawing/2010/main" w="9525">
+                <a14:hiddenLine xmlns:a14="http://schemas.microsoft.com/office/drawing/2010/main" xmlns="" w="9525">
                   <a:solidFill>
                     <a:srgbClr val="000000"/>
                   </a:solidFill>
@@ -12790,7 +12908,7 @@
             </a:ln>
             <a:extLst>
               <a:ext uri="{91240B29-F687-4f45-9708-019B960494DF}">
-                <a14:hiddenLine xmlns="" xmlns:a14="http://schemas.microsoft.com/office/drawing/2010/main" w="9525">
+                <a14:hiddenLine xmlns:a14="http://schemas.microsoft.com/office/drawing/2010/main" xmlns="" w="9525">
                   <a:solidFill>
                     <a:srgbClr val="000000"/>
                   </a:solidFill>
@@ -12880,7 +12998,7 @@
             </a:ln>
             <a:extLst>
               <a:ext uri="{91240B29-F687-4f45-9708-019B960494DF}">
-                <a14:hiddenLine xmlns="" xmlns:a14="http://schemas.microsoft.com/office/drawing/2010/main" w="9525">
+                <a14:hiddenLine xmlns:a14="http://schemas.microsoft.com/office/drawing/2010/main" xmlns="" w="9525">
                   <a:solidFill>
                     <a:srgbClr val="000000"/>
                   </a:solidFill>
@@ -12936,7 +13054,7 @@
             </a:ln>
             <a:extLst>
               <a:ext uri="{91240B29-F687-4f45-9708-019B960494DF}">
-                <a14:hiddenLine xmlns="" xmlns:a14="http://schemas.microsoft.com/office/drawing/2010/main" w="9525">
+                <a14:hiddenLine xmlns:a14="http://schemas.microsoft.com/office/drawing/2010/main" xmlns="" w="9525">
                   <a:solidFill>
                     <a:srgbClr val="000000"/>
                   </a:solidFill>
@@ -13026,7 +13144,7 @@
             </a:ln>
             <a:extLst>
               <a:ext uri="{91240B29-F687-4f45-9708-019B960494DF}">
-                <a14:hiddenLine xmlns="" xmlns:a14="http://schemas.microsoft.com/office/drawing/2010/main" w="9525">
+                <a14:hiddenLine xmlns:a14="http://schemas.microsoft.com/office/drawing/2010/main" xmlns="" w="9525">
                   <a:solidFill>
                     <a:srgbClr val="000000"/>
                   </a:solidFill>
@@ -13082,7 +13200,7 @@
             </a:ln>
             <a:extLst>
               <a:ext uri="{91240B29-F687-4f45-9708-019B960494DF}">
-                <a14:hiddenLine xmlns="" xmlns:a14="http://schemas.microsoft.com/office/drawing/2010/main" w="9525">
+                <a14:hiddenLine xmlns:a14="http://schemas.microsoft.com/office/drawing/2010/main" xmlns="" w="9525">
                   <a:solidFill>
                     <a:srgbClr val="000000"/>
                   </a:solidFill>
@@ -13172,7 +13290,7 @@
             </a:ln>
             <a:extLst>
               <a:ext uri="{91240B29-F687-4f45-9708-019B960494DF}">
-                <a14:hiddenLine xmlns="" xmlns:a14="http://schemas.microsoft.com/office/drawing/2010/main" w="9525">
+                <a14:hiddenLine xmlns:a14="http://schemas.microsoft.com/office/drawing/2010/main" xmlns="" w="9525">
                   <a:solidFill>
                     <a:srgbClr val="000000"/>
                   </a:solidFill>
@@ -13240,7 +13358,7 @@
             </a:ln>
             <a:extLst>
               <a:ext uri="{91240B29-F687-4f45-9708-019B960494DF}">
-                <a14:hiddenLine xmlns="" xmlns:a14="http://schemas.microsoft.com/office/drawing/2010/main" w="9525">
+                <a14:hiddenLine xmlns:a14="http://schemas.microsoft.com/office/drawing/2010/main" xmlns="" w="9525">
                   <a:solidFill>
                     <a:srgbClr val="000000"/>
                   </a:solidFill>
@@ -13330,7 +13448,7 @@
             </a:ln>
             <a:extLst>
               <a:ext uri="{91240B29-F687-4f45-9708-019B960494DF}">
-                <a14:hiddenLine xmlns="" xmlns:a14="http://schemas.microsoft.com/office/drawing/2010/main" w="9525">
+                <a14:hiddenLine xmlns:a14="http://schemas.microsoft.com/office/drawing/2010/main" xmlns="" w="9525">
                   <a:solidFill>
                     <a:srgbClr val="000000"/>
                   </a:solidFill>
@@ -13398,7 +13516,7 @@
             </a:ln>
             <a:extLst>
               <a:ext uri="{91240B29-F687-4f45-9708-019B960494DF}">
-                <a14:hiddenLine xmlns="" xmlns:a14="http://schemas.microsoft.com/office/drawing/2010/main" w="9525">
+                <a14:hiddenLine xmlns:a14="http://schemas.microsoft.com/office/drawing/2010/main" xmlns="" w="9525">
                   <a:solidFill>
                     <a:srgbClr val="000000"/>
                   </a:solidFill>
@@ -13488,7 +13606,7 @@
             </a:ln>
             <a:extLst>
               <a:ext uri="{91240B29-F687-4f45-9708-019B960494DF}">
-                <a14:hiddenLine xmlns="" xmlns:a14="http://schemas.microsoft.com/office/drawing/2010/main" w="9525">
+                <a14:hiddenLine xmlns:a14="http://schemas.microsoft.com/office/drawing/2010/main" xmlns="" w="9525">
                   <a:solidFill>
                     <a:srgbClr val="000000"/>
                   </a:solidFill>
@@ -13522,7 +13640,7 @@
             </a:ln>
             <a:extLst>
               <a:ext uri="{91240B29-F687-4f45-9708-019B960494DF}">
-                <a14:hiddenLine xmlns="" xmlns:a14="http://schemas.microsoft.com/office/drawing/2010/main" w="9525">
+                <a14:hiddenLine xmlns:a14="http://schemas.microsoft.com/office/drawing/2010/main" xmlns="" w="9525">
                   <a:solidFill>
                     <a:srgbClr val="000000"/>
                   </a:solidFill>
@@ -13612,7 +13730,7 @@
             </a:ln>
             <a:extLst>
               <a:ext uri="{91240B29-F687-4f45-9708-019B960494DF}">
-                <a14:hiddenLine xmlns="" xmlns:a14="http://schemas.microsoft.com/office/drawing/2010/main" w="9525">
+                <a14:hiddenLine xmlns:a14="http://schemas.microsoft.com/office/drawing/2010/main" xmlns="" w="9525">
                   <a:solidFill>
                     <a:srgbClr val="000000"/>
                   </a:solidFill>
@@ -13674,7 +13792,7 @@
             </a:ln>
             <a:extLst>
               <a:ext uri="{91240B29-F687-4f45-9708-019B960494DF}">
-                <a14:hiddenLine xmlns="" xmlns:a14="http://schemas.microsoft.com/office/drawing/2010/main" w="9525">
+                <a14:hiddenLine xmlns:a14="http://schemas.microsoft.com/office/drawing/2010/main" xmlns="" w="9525">
                   <a:solidFill>
                     <a:srgbClr val="000000"/>
                   </a:solidFill>
@@ -13736,7 +13854,7 @@
             </a:ln>
             <a:extLst>
               <a:ext uri="{91240B29-F687-4f45-9708-019B960494DF}">
-                <a14:hiddenLine xmlns="" xmlns:a14="http://schemas.microsoft.com/office/drawing/2010/main" w="9525">
+                <a14:hiddenLine xmlns:a14="http://schemas.microsoft.com/office/drawing/2010/main" xmlns="" w="9525">
                   <a:solidFill>
                     <a:srgbClr val="000000"/>
                   </a:solidFill>
@@ -13826,7 +13944,7 @@
             </a:ln>
             <a:extLst>
               <a:ext uri="{91240B29-F687-4f45-9708-019B960494DF}">
-                <a14:hiddenLine xmlns="" xmlns:a14="http://schemas.microsoft.com/office/drawing/2010/main" w="9525">
+                <a14:hiddenLine xmlns:a14="http://schemas.microsoft.com/office/drawing/2010/main" xmlns="" w="9525">
                   <a:solidFill>
                     <a:srgbClr val="000000"/>
                   </a:solidFill>
@@ -13894,7 +14012,7 @@
             </a:ln>
             <a:extLst>
               <a:ext uri="{91240B29-F687-4f45-9708-019B960494DF}">
-                <a14:hiddenLine xmlns="" xmlns:a14="http://schemas.microsoft.com/office/drawing/2010/main" w="9525">
+                <a14:hiddenLine xmlns:a14="http://schemas.microsoft.com/office/drawing/2010/main" xmlns="" w="9525">
                   <a:solidFill>
                     <a:srgbClr val="000000"/>
                   </a:solidFill>
@@ -13956,7 +14074,7 @@
             </a:ln>
             <a:extLst>
               <a:ext uri="{91240B29-F687-4f45-9708-019B960494DF}">
-                <a14:hiddenLine xmlns="" xmlns:a14="http://schemas.microsoft.com/office/drawing/2010/main" w="9525">
+                <a14:hiddenLine xmlns:a14="http://schemas.microsoft.com/office/drawing/2010/main" xmlns="" w="9525">
                   <a:solidFill>
                     <a:srgbClr val="000000"/>
                   </a:solidFill>
@@ -14046,7 +14164,7 @@
             </a:ln>
             <a:extLst>
               <a:ext uri="{91240B29-F687-4f45-9708-019B960494DF}">
-                <a14:hiddenLine xmlns="" xmlns:a14="http://schemas.microsoft.com/office/drawing/2010/main" w="9525">
+                <a14:hiddenLine xmlns:a14="http://schemas.microsoft.com/office/drawing/2010/main" xmlns="" w="9525">
                   <a:solidFill>
                     <a:srgbClr val="000000"/>
                   </a:solidFill>
@@ -14108,7 +14226,7 @@
             </a:ln>
             <a:extLst>
               <a:ext uri="{91240B29-F687-4f45-9708-019B960494DF}">
-                <a14:hiddenLine xmlns="" xmlns:a14="http://schemas.microsoft.com/office/drawing/2010/main" w="9525">
+                <a14:hiddenLine xmlns:a14="http://schemas.microsoft.com/office/drawing/2010/main" xmlns="" w="9525">
                   <a:solidFill>
                     <a:srgbClr val="000000"/>
                   </a:solidFill>
@@ -14198,7 +14316,7 @@
             </a:ln>
             <a:extLst>
               <a:ext uri="{91240B29-F687-4f45-9708-019B960494DF}">
-                <a14:hiddenLine xmlns="" xmlns:a14="http://schemas.microsoft.com/office/drawing/2010/main" w="9525">
+                <a14:hiddenLine xmlns:a14="http://schemas.microsoft.com/office/drawing/2010/main" xmlns="" w="9525">
                   <a:solidFill>
                     <a:srgbClr val="000000"/>
                   </a:solidFill>
@@ -14260,7 +14378,7 @@
             </a:ln>
             <a:extLst>
               <a:ext uri="{91240B29-F687-4f45-9708-019B960494DF}">
-                <a14:hiddenLine xmlns="" xmlns:a14="http://schemas.microsoft.com/office/drawing/2010/main" w="9525">
+                <a14:hiddenLine xmlns:a14="http://schemas.microsoft.com/office/drawing/2010/main" xmlns="" w="9525">
                   <a:solidFill>
                     <a:srgbClr val="000000"/>
                   </a:solidFill>
@@ -14350,7 +14468,7 @@
             </a:ln>
             <a:extLst>
               <a:ext uri="{91240B29-F687-4f45-9708-019B960494DF}">
-                <a14:hiddenLine xmlns="" xmlns:a14="http://schemas.microsoft.com/office/drawing/2010/main" w="9525">
+                <a14:hiddenLine xmlns:a14="http://schemas.microsoft.com/office/drawing/2010/main" xmlns="" w="9525">
                   <a:solidFill>
                     <a:srgbClr val="000000"/>
                   </a:solidFill>
@@ -14384,7 +14502,7 @@
             </a:ln>
             <a:extLst>
               <a:ext uri="{91240B29-F687-4f45-9708-019B960494DF}">
-                <a14:hiddenLine xmlns="" xmlns:a14="http://schemas.microsoft.com/office/drawing/2010/main" w="9525">
+                <a14:hiddenLine xmlns:a14="http://schemas.microsoft.com/office/drawing/2010/main" xmlns="" w="9525">
                   <a:solidFill>
                     <a:srgbClr val="000000"/>
                   </a:solidFill>
@@ -14449,7 +14567,7 @@
             </a:ln>
             <a:extLst>
               <a:ext uri="{91240B29-F687-4f45-9708-019B960494DF}">
-                <a14:hiddenLine xmlns="" xmlns:a14="http://schemas.microsoft.com/office/drawing/2010/main" w="9525">
+                <a14:hiddenLine xmlns:a14="http://schemas.microsoft.com/office/drawing/2010/main" xmlns="" w="9525">
                   <a:solidFill>
                     <a:srgbClr val="000000"/>
                   </a:solidFill>
@@ -14539,7 +14657,7 @@
             </a:ln>
             <a:extLst>
               <a:ext uri="{91240B29-F687-4f45-9708-019B960494DF}">
-                <a14:hiddenLine xmlns="" xmlns:a14="http://schemas.microsoft.com/office/drawing/2010/main" w="9525">
+                <a14:hiddenLine xmlns:a14="http://schemas.microsoft.com/office/drawing/2010/main" xmlns="" w="9525">
                   <a:solidFill>
                     <a:srgbClr val="000000"/>
                   </a:solidFill>
@@ -14601,7 +14719,7 @@
             </a:ln>
             <a:extLst>
               <a:ext uri="{91240B29-F687-4f45-9708-019B960494DF}">
-                <a14:hiddenLine xmlns="" xmlns:a14="http://schemas.microsoft.com/office/drawing/2010/main" w="9525">
+                <a14:hiddenLine xmlns:a14="http://schemas.microsoft.com/office/drawing/2010/main" xmlns="" w="9525">
                   <a:solidFill>
                     <a:srgbClr val="000000"/>
                   </a:solidFill>
@@ -14691,7 +14809,7 @@
             </a:ln>
             <a:extLst>
               <a:ext uri="{91240B29-F687-4f45-9708-019B960494DF}">
-                <a14:hiddenLine xmlns="" xmlns:a14="http://schemas.microsoft.com/office/drawing/2010/main" w="9525">
+                <a14:hiddenLine xmlns:a14="http://schemas.microsoft.com/office/drawing/2010/main" xmlns="" w="9525">
                   <a:solidFill>
                     <a:srgbClr val="000000"/>
                   </a:solidFill>
@@ -14781,7 +14899,7 @@
             </a:ln>
             <a:extLst>
               <a:ext uri="{91240B29-F687-4f45-9708-019B960494DF}">
-                <a14:hiddenLine xmlns="" xmlns:a14="http://schemas.microsoft.com/office/drawing/2010/main" w="9525">
+                <a14:hiddenLine xmlns:a14="http://schemas.microsoft.com/office/drawing/2010/main" xmlns="" w="9525">
                   <a:solidFill>
                     <a:srgbClr val="000000"/>
                   </a:solidFill>
@@ -14846,7 +14964,7 @@
             </a:ln>
             <a:extLst>
               <a:ext uri="{91240B29-F687-4f45-9708-019B960494DF}">
-                <a14:hiddenLine xmlns="" xmlns:a14="http://schemas.microsoft.com/office/drawing/2010/main" w="9525">
+                <a14:hiddenLine xmlns:a14="http://schemas.microsoft.com/office/drawing/2010/main" xmlns="" w="9525">
                   <a:solidFill>
                     <a:srgbClr val="000000"/>
                   </a:solidFill>
@@ -14908,7 +15026,7 @@
             </a:ln>
             <a:extLst>
               <a:ext uri="{91240B29-F687-4f45-9708-019B960494DF}">
-                <a14:hiddenLine xmlns="" xmlns:a14="http://schemas.microsoft.com/office/drawing/2010/main" w="9525">
+                <a14:hiddenLine xmlns:a14="http://schemas.microsoft.com/office/drawing/2010/main" xmlns="" w="9525">
                   <a:solidFill>
                     <a:srgbClr val="000000"/>
                   </a:solidFill>
@@ -14998,7 +15116,7 @@
             </a:ln>
             <a:extLst>
               <a:ext uri="{91240B29-F687-4f45-9708-019B960494DF}">
-                <a14:hiddenLine xmlns="" xmlns:a14="http://schemas.microsoft.com/office/drawing/2010/main" w="9525">
+                <a14:hiddenLine xmlns:a14="http://schemas.microsoft.com/office/drawing/2010/main" xmlns="" w="9525">
                   <a:solidFill>
                     <a:srgbClr val="000000"/>
                   </a:solidFill>
@@ -15088,7 +15206,7 @@
             </a:ln>
             <a:extLst>
               <a:ext uri="{91240B29-F687-4f45-9708-019B960494DF}">
-                <a14:hiddenLine xmlns="" xmlns:a14="http://schemas.microsoft.com/office/drawing/2010/main" w="9525">
+                <a14:hiddenLine xmlns:a14="http://schemas.microsoft.com/office/drawing/2010/main" xmlns="" w="9525">
                   <a:solidFill>
                     <a:srgbClr val="000000"/>
                   </a:solidFill>
@@ -15150,7 +15268,7 @@
             </a:ln>
             <a:extLst>
               <a:ext uri="{91240B29-F687-4f45-9708-019B960494DF}">
-                <a14:hiddenLine xmlns="" xmlns:a14="http://schemas.microsoft.com/office/drawing/2010/main" w="9525">
+                <a14:hiddenLine xmlns:a14="http://schemas.microsoft.com/office/drawing/2010/main" xmlns="" w="9525">
                   <a:solidFill>
                     <a:srgbClr val="000000"/>
                   </a:solidFill>
@@ -15270,7 +15388,7 @@
             </a:ln>
             <a:extLst>
               <a:ext uri="{91240B29-F687-4f45-9708-019B960494DF}">
-                <a14:hiddenLine xmlns="" xmlns:a14="http://schemas.microsoft.com/office/drawing/2010/main" w="9525">
+                <a14:hiddenLine xmlns:a14="http://schemas.microsoft.com/office/drawing/2010/main" xmlns="" w="9525">
                   <a:solidFill>
                     <a:srgbClr val="000000"/>
                   </a:solidFill>
@@ -15338,7 +15456,7 @@
             </a:ln>
             <a:extLst>
               <a:ext uri="{91240B29-F687-4f45-9708-019B960494DF}">
-                <a14:hiddenLine xmlns="" xmlns:a14="http://schemas.microsoft.com/office/drawing/2010/main" w="9525">
+                <a14:hiddenLine xmlns:a14="http://schemas.microsoft.com/office/drawing/2010/main" xmlns="" w="9525">
                   <a:solidFill>
                     <a:srgbClr val="000000"/>
                   </a:solidFill>
@@ -15428,7 +15546,7 @@
             </a:ln>
             <a:extLst>
               <a:ext uri="{91240B29-F687-4f45-9708-019B960494DF}">
-                <a14:hiddenLine xmlns="" xmlns:a14="http://schemas.microsoft.com/office/drawing/2010/main" w="9525">
+                <a14:hiddenLine xmlns:a14="http://schemas.microsoft.com/office/drawing/2010/main" xmlns="" w="9525">
                   <a:solidFill>
                     <a:srgbClr val="000000"/>
                   </a:solidFill>
@@ -20242,7 +20360,7 @@
           <a:noFill/>
           <a:extLst>
             <a:ext uri="{909E8E84-426E-40dd-AFC4-6F175D3DCCD1}">
-              <a14:hiddenFill xmlns="" xmlns:a14="http://schemas.microsoft.com/office/drawing/2010/main">
+              <a14:hiddenFill xmlns:a14="http://schemas.microsoft.com/office/drawing/2010/main" xmlns="">
                 <a:solidFill>
                   <a:srgbClr val="FFFFFF"/>
                 </a:solidFill>
@@ -20316,7 +20434,7 @@
               </a:ln>
               <a:extLst>
                 <a:ext uri="{91240B29-F687-4f45-9708-019B960494DF}">
-                  <a14:hiddenLine xmlns="" xmlns:a14="http://schemas.microsoft.com/office/drawing/2010/main" w="9525">
+                  <a14:hiddenLine xmlns:a14="http://schemas.microsoft.com/office/drawing/2010/main" xmlns="" w="9525">
                     <a:solidFill>
                       <a:srgbClr val="000000"/>
                     </a:solidFill>
@@ -20406,7 +20524,7 @@
               </a:ln>
               <a:extLst>
                 <a:ext uri="{91240B29-F687-4f45-9708-019B960494DF}">
-                  <a14:hiddenLine xmlns="" xmlns:a14="http://schemas.microsoft.com/office/drawing/2010/main" w="9525">
+                  <a14:hiddenLine xmlns:a14="http://schemas.microsoft.com/office/drawing/2010/main" xmlns="" w="9525">
                     <a:solidFill>
                       <a:srgbClr val="000000"/>
                     </a:solidFill>
@@ -20496,7 +20614,7 @@
               </a:ln>
               <a:extLst>
                 <a:ext uri="{91240B29-F687-4f45-9708-019B960494DF}">
-                  <a14:hiddenLine xmlns="" xmlns:a14="http://schemas.microsoft.com/office/drawing/2010/main" w="9525">
+                  <a14:hiddenLine xmlns:a14="http://schemas.microsoft.com/office/drawing/2010/main" xmlns="" w="9525">
                     <a:solidFill>
                       <a:srgbClr val="000000"/>
                     </a:solidFill>
@@ -20558,7 +20676,7 @@
               </a:ln>
               <a:extLst>
                 <a:ext uri="{91240B29-F687-4f45-9708-019B960494DF}">
-                  <a14:hiddenLine xmlns="" xmlns:a14="http://schemas.microsoft.com/office/drawing/2010/main" w="9525">
+                  <a14:hiddenLine xmlns:a14="http://schemas.microsoft.com/office/drawing/2010/main" xmlns="" w="9525">
                     <a:solidFill>
                       <a:srgbClr val="000000"/>
                     </a:solidFill>
@@ -20648,7 +20766,7 @@
               </a:ln>
               <a:extLst>
                 <a:ext uri="{91240B29-F687-4f45-9708-019B960494DF}">
-                  <a14:hiddenLine xmlns="" xmlns:a14="http://schemas.microsoft.com/office/drawing/2010/main" w="9525">
+                  <a14:hiddenLine xmlns:a14="http://schemas.microsoft.com/office/drawing/2010/main" xmlns="" w="9525">
                     <a:solidFill>
                       <a:srgbClr val="000000"/>
                     </a:solidFill>
@@ -20710,7 +20828,7 @@
               </a:ln>
               <a:extLst>
                 <a:ext uri="{91240B29-F687-4f45-9708-019B960494DF}">
-                  <a14:hiddenLine xmlns="" xmlns:a14="http://schemas.microsoft.com/office/drawing/2010/main" w="9525">
+                  <a14:hiddenLine xmlns:a14="http://schemas.microsoft.com/office/drawing/2010/main" xmlns="" w="9525">
                     <a:solidFill>
                       <a:srgbClr val="000000"/>
                     </a:solidFill>
@@ -20772,7 +20890,7 @@
               </a:ln>
               <a:extLst>
                 <a:ext uri="{91240B29-F687-4f45-9708-019B960494DF}">
-                  <a14:hiddenLine xmlns="" xmlns:a14="http://schemas.microsoft.com/office/drawing/2010/main" w="9525">
+                  <a14:hiddenLine xmlns:a14="http://schemas.microsoft.com/office/drawing/2010/main" xmlns="" w="9525">
                     <a:solidFill>
                       <a:srgbClr val="000000"/>
                     </a:solidFill>
@@ -20862,7 +20980,7 @@
               </a:ln>
               <a:extLst>
                 <a:ext uri="{91240B29-F687-4f45-9708-019B960494DF}">
-                  <a14:hiddenLine xmlns="" xmlns:a14="http://schemas.microsoft.com/office/drawing/2010/main" w="9525">
+                  <a14:hiddenLine xmlns:a14="http://schemas.microsoft.com/office/drawing/2010/main" xmlns="" w="9525">
                     <a:solidFill>
                       <a:srgbClr val="000000"/>
                     </a:solidFill>
@@ -20952,7 +21070,7 @@
               </a:ln>
               <a:extLst>
                 <a:ext uri="{91240B29-F687-4f45-9708-019B960494DF}">
-                  <a14:hiddenLine xmlns="" xmlns:a14="http://schemas.microsoft.com/office/drawing/2010/main" w="9525">
+                  <a14:hiddenLine xmlns:a14="http://schemas.microsoft.com/office/drawing/2010/main" xmlns="" w="9525">
                     <a:solidFill>
                       <a:srgbClr val="000000"/>
                     </a:solidFill>
@@ -21014,7 +21132,7 @@
               </a:ln>
               <a:extLst>
                 <a:ext uri="{91240B29-F687-4f45-9708-019B960494DF}">
-                  <a14:hiddenLine xmlns="" xmlns:a14="http://schemas.microsoft.com/office/drawing/2010/main" w="9525">
+                  <a14:hiddenLine xmlns:a14="http://schemas.microsoft.com/office/drawing/2010/main" xmlns="" w="9525">
                     <a:solidFill>
                       <a:srgbClr val="000000"/>
                     </a:solidFill>
@@ -21124,7 +21242,7 @@
               </a:ln>
               <a:extLst>
                 <a:ext uri="{91240B29-F687-4f45-9708-019B960494DF}">
-                  <a14:hiddenLine xmlns="" xmlns:a14="http://schemas.microsoft.com/office/drawing/2010/main" w="9525">
+                  <a14:hiddenLine xmlns:a14="http://schemas.microsoft.com/office/drawing/2010/main" xmlns="" w="9525">
                     <a:solidFill>
                       <a:srgbClr val="000000"/>
                     </a:solidFill>
@@ -21208,7 +21326,7 @@
               </a:ln>
               <a:extLst>
                 <a:ext uri="{91240B29-F687-4f45-9708-019B960494DF}">
-                  <a14:hiddenLine xmlns="" xmlns:a14="http://schemas.microsoft.com/office/drawing/2010/main" w="9525">
+                  <a14:hiddenLine xmlns:a14="http://schemas.microsoft.com/office/drawing/2010/main" xmlns="" w="9525">
                     <a:solidFill>
                       <a:srgbClr val="000000"/>
                     </a:solidFill>
@@ -21270,7 +21388,7 @@
               </a:ln>
               <a:extLst>
                 <a:ext uri="{91240B29-F687-4f45-9708-019B960494DF}">
-                  <a14:hiddenLine xmlns="" xmlns:a14="http://schemas.microsoft.com/office/drawing/2010/main" w="9525">
+                  <a14:hiddenLine xmlns:a14="http://schemas.microsoft.com/office/drawing/2010/main" xmlns="" w="9525">
                     <a:solidFill>
                       <a:srgbClr val="000000"/>
                     </a:solidFill>
@@ -21332,7 +21450,7 @@
               </a:ln>
               <a:extLst>
                 <a:ext uri="{91240B29-F687-4f45-9708-019B960494DF}">
-                  <a14:hiddenLine xmlns="" xmlns:a14="http://schemas.microsoft.com/office/drawing/2010/main" w="9525">
+                  <a14:hiddenLine xmlns:a14="http://schemas.microsoft.com/office/drawing/2010/main" xmlns="" w="9525">
                     <a:solidFill>
                       <a:srgbClr val="000000"/>
                     </a:solidFill>
@@ -21422,7 +21540,7 @@
               </a:ln>
               <a:extLst>
                 <a:ext uri="{91240B29-F687-4f45-9708-019B960494DF}">
-                  <a14:hiddenLine xmlns="" xmlns:a14="http://schemas.microsoft.com/office/drawing/2010/main" w="9525">
+                  <a14:hiddenLine xmlns:a14="http://schemas.microsoft.com/office/drawing/2010/main" xmlns="" w="9525">
                     <a:solidFill>
                       <a:srgbClr val="000000"/>
                     </a:solidFill>
@@ -21456,7 +21574,7 @@
               </a:ln>
               <a:extLst>
                 <a:ext uri="{91240B29-F687-4f45-9708-019B960494DF}">
-                  <a14:hiddenLine xmlns="" xmlns:a14="http://schemas.microsoft.com/office/drawing/2010/main" w="9525">
+                  <a14:hiddenLine xmlns:a14="http://schemas.microsoft.com/office/drawing/2010/main" xmlns="" w="9525">
                     <a:solidFill>
                       <a:srgbClr val="000000"/>
                     </a:solidFill>
@@ -21521,7 +21639,7 @@
               </a:ln>
               <a:extLst>
                 <a:ext uri="{91240B29-F687-4f45-9708-019B960494DF}">
-                  <a14:hiddenLine xmlns="" xmlns:a14="http://schemas.microsoft.com/office/drawing/2010/main" w="9525">
+                  <a14:hiddenLine xmlns:a14="http://schemas.microsoft.com/office/drawing/2010/main" xmlns="" w="9525">
                     <a:solidFill>
                       <a:srgbClr val="000000"/>
                     </a:solidFill>
@@ -21611,7 +21729,7 @@
               </a:ln>
               <a:extLst>
                 <a:ext uri="{91240B29-F687-4f45-9708-019B960494DF}">
-                  <a14:hiddenLine xmlns="" xmlns:a14="http://schemas.microsoft.com/office/drawing/2010/main" w="9525">
+                  <a14:hiddenLine xmlns:a14="http://schemas.microsoft.com/office/drawing/2010/main" xmlns="" w="9525">
                     <a:solidFill>
                       <a:srgbClr val="000000"/>
                     </a:solidFill>
@@ -21673,7 +21791,7 @@
               </a:ln>
               <a:extLst>
                 <a:ext uri="{91240B29-F687-4f45-9708-019B960494DF}">
-                  <a14:hiddenLine xmlns="" xmlns:a14="http://schemas.microsoft.com/office/drawing/2010/main" w="9525">
+                  <a14:hiddenLine xmlns:a14="http://schemas.microsoft.com/office/drawing/2010/main" xmlns="" w="9525">
                     <a:solidFill>
                       <a:srgbClr val="000000"/>
                     </a:solidFill>
@@ -21763,7 +21881,7 @@
               </a:ln>
               <a:extLst>
                 <a:ext uri="{91240B29-F687-4f45-9708-019B960494DF}">
-                  <a14:hiddenLine xmlns="" xmlns:a14="http://schemas.microsoft.com/office/drawing/2010/main" w="9525">
+                  <a14:hiddenLine xmlns:a14="http://schemas.microsoft.com/office/drawing/2010/main" xmlns="" w="9525">
                     <a:solidFill>
                       <a:srgbClr val="000000"/>
                     </a:solidFill>
@@ -21828,7 +21946,7 @@
               </a:ln>
               <a:extLst>
                 <a:ext uri="{91240B29-F687-4f45-9708-019B960494DF}">
-                  <a14:hiddenLine xmlns="" xmlns:a14="http://schemas.microsoft.com/office/drawing/2010/main" w="9525">
+                  <a14:hiddenLine xmlns:a14="http://schemas.microsoft.com/office/drawing/2010/main" xmlns="" w="9525">
                     <a:solidFill>
                       <a:srgbClr val="000000"/>
                     </a:solidFill>
@@ -21890,7 +22008,7 @@
               </a:ln>
               <a:extLst>
                 <a:ext uri="{91240B29-F687-4f45-9708-019B960494DF}">
-                  <a14:hiddenLine xmlns="" xmlns:a14="http://schemas.microsoft.com/office/drawing/2010/main" w="9525">
+                  <a14:hiddenLine xmlns:a14="http://schemas.microsoft.com/office/drawing/2010/main" xmlns="" w="9525">
                     <a:solidFill>
                       <a:srgbClr val="000000"/>
                     </a:solidFill>
@@ -21980,7 +22098,7 @@
               </a:ln>
               <a:extLst>
                 <a:ext uri="{91240B29-F687-4f45-9708-019B960494DF}">
-                  <a14:hiddenLine xmlns="" xmlns:a14="http://schemas.microsoft.com/office/drawing/2010/main" w="9525">
+                  <a14:hiddenLine xmlns:a14="http://schemas.microsoft.com/office/drawing/2010/main" xmlns="" w="9525">
                     <a:solidFill>
                       <a:srgbClr val="000000"/>
                     </a:solidFill>
@@ -22070,7 +22188,7 @@
               </a:ln>
               <a:extLst>
                 <a:ext uri="{91240B29-F687-4f45-9708-019B960494DF}">
-                  <a14:hiddenLine xmlns="" xmlns:a14="http://schemas.microsoft.com/office/drawing/2010/main" w="9525">
+                  <a14:hiddenLine xmlns:a14="http://schemas.microsoft.com/office/drawing/2010/main" xmlns="" w="9525">
                     <a:solidFill>
                       <a:srgbClr val="000000"/>
                     </a:solidFill>
@@ -22135,7 +22253,7 @@
               </a:ln>
               <a:extLst>
                 <a:ext uri="{91240B29-F687-4f45-9708-019B960494DF}">
-                  <a14:hiddenLine xmlns="" xmlns:a14="http://schemas.microsoft.com/office/drawing/2010/main" w="9525">
+                  <a14:hiddenLine xmlns:a14="http://schemas.microsoft.com/office/drawing/2010/main" xmlns="" w="9525">
                     <a:solidFill>
                       <a:srgbClr val="000000"/>
                     </a:solidFill>
@@ -22255,7 +22373,7 @@
               </a:ln>
               <a:extLst>
                 <a:ext uri="{91240B29-F687-4f45-9708-019B960494DF}">
-                  <a14:hiddenLine xmlns="" xmlns:a14="http://schemas.microsoft.com/office/drawing/2010/main" w="9525">
+                  <a14:hiddenLine xmlns:a14="http://schemas.microsoft.com/office/drawing/2010/main" xmlns="" w="9525">
                     <a:solidFill>
                       <a:srgbClr val="000000"/>
                     </a:solidFill>
@@ -22336,7 +22454,7 @@
               </a:ln>
               <a:extLst>
                 <a:ext uri="{91240B29-F687-4f45-9708-019B960494DF}">
-                  <a14:hiddenLine xmlns="" xmlns:a14="http://schemas.microsoft.com/office/drawing/2010/main" w="9525">
+                  <a14:hiddenLine xmlns:a14="http://schemas.microsoft.com/office/drawing/2010/main" xmlns="" w="9525">
                     <a:solidFill>
                       <a:srgbClr val="000000"/>
                     </a:solidFill>
@@ -22451,7 +22569,7 @@
               </a:ln>
               <a:extLst>
                 <a:ext uri="{91240B29-F687-4f45-9708-019B960494DF}">
-                  <a14:hiddenLine xmlns="" xmlns:a14="http://schemas.microsoft.com/office/drawing/2010/main" w="9525">
+                  <a14:hiddenLine xmlns:a14="http://schemas.microsoft.com/office/drawing/2010/main" xmlns="" w="9525">
                     <a:solidFill>
                       <a:srgbClr val="000000"/>
                     </a:solidFill>
@@ -22541,7 +22659,7 @@
               </a:ln>
               <a:extLst>
                 <a:ext uri="{91240B29-F687-4f45-9708-019B960494DF}">
-                  <a14:hiddenLine xmlns="" xmlns:a14="http://schemas.microsoft.com/office/drawing/2010/main" w="9525">
+                  <a14:hiddenLine xmlns:a14="http://schemas.microsoft.com/office/drawing/2010/main" xmlns="" w="9525">
                     <a:solidFill>
                       <a:srgbClr val="000000"/>
                     </a:solidFill>
@@ -22606,7 +22724,7 @@
               </a:ln>
               <a:extLst>
                 <a:ext uri="{91240B29-F687-4f45-9708-019B960494DF}">
-                  <a14:hiddenLine xmlns="" xmlns:a14="http://schemas.microsoft.com/office/drawing/2010/main" w="9525">
+                  <a14:hiddenLine xmlns:a14="http://schemas.microsoft.com/office/drawing/2010/main" xmlns="" w="9525">
                     <a:solidFill>
                       <a:srgbClr val="000000"/>
                     </a:solidFill>
@@ -22696,7 +22814,7 @@
               </a:ln>
               <a:extLst>
                 <a:ext uri="{91240B29-F687-4f45-9708-019B960494DF}">
-                  <a14:hiddenLine xmlns="" xmlns:a14="http://schemas.microsoft.com/office/drawing/2010/main" w="9525">
+                  <a14:hiddenLine xmlns:a14="http://schemas.microsoft.com/office/drawing/2010/main" xmlns="" w="9525">
                     <a:solidFill>
                       <a:srgbClr val="000000"/>
                     </a:solidFill>
@@ -22764,7 +22882,7 @@
               </a:ln>
               <a:extLst>
                 <a:ext uri="{91240B29-F687-4f45-9708-019B960494DF}">
-                  <a14:hiddenLine xmlns="" xmlns:a14="http://schemas.microsoft.com/office/drawing/2010/main" w="9525">
+                  <a14:hiddenLine xmlns:a14="http://schemas.microsoft.com/office/drawing/2010/main" xmlns="" w="9525">
                     <a:solidFill>
                       <a:srgbClr val="000000"/>
                     </a:solidFill>
@@ -22854,7 +22972,7 @@
               </a:ln>
               <a:extLst>
                 <a:ext uri="{91240B29-F687-4f45-9708-019B960494DF}">
-                  <a14:hiddenLine xmlns="" xmlns:a14="http://schemas.microsoft.com/office/drawing/2010/main" w="9525">
+                  <a14:hiddenLine xmlns:a14="http://schemas.microsoft.com/office/drawing/2010/main" xmlns="" w="9525">
                     <a:solidFill>
                       <a:srgbClr val="000000"/>
                     </a:solidFill>
@@ -22922,7 +23040,7 @@
               </a:ln>
               <a:extLst>
                 <a:ext uri="{91240B29-F687-4f45-9708-019B960494DF}">
-                  <a14:hiddenLine xmlns="" xmlns:a14="http://schemas.microsoft.com/office/drawing/2010/main" w="9525">
+                  <a14:hiddenLine xmlns:a14="http://schemas.microsoft.com/office/drawing/2010/main" xmlns="" w="9525">
                     <a:solidFill>
                       <a:srgbClr val="000000"/>
                     </a:solidFill>
@@ -23012,7 +23130,7 @@
               </a:ln>
               <a:extLst>
                 <a:ext uri="{91240B29-F687-4f45-9708-019B960494DF}">
-                  <a14:hiddenLine xmlns="" xmlns:a14="http://schemas.microsoft.com/office/drawing/2010/main" w="9525">
+                  <a14:hiddenLine xmlns:a14="http://schemas.microsoft.com/office/drawing/2010/main" xmlns="" w="9525">
                     <a:solidFill>
                       <a:srgbClr val="000000"/>
                     </a:solidFill>
@@ -23046,7 +23164,7 @@
               </a:ln>
               <a:extLst>
                 <a:ext uri="{91240B29-F687-4f45-9708-019B960494DF}">
-                  <a14:hiddenLine xmlns="" xmlns:a14="http://schemas.microsoft.com/office/drawing/2010/main" w="9525">
+                  <a14:hiddenLine xmlns:a14="http://schemas.microsoft.com/office/drawing/2010/main" xmlns="" w="9525">
                     <a:solidFill>
                       <a:srgbClr val="000000"/>
                     </a:solidFill>
@@ -23777,6 +23895,203 @@
       </p:grpSpPr>
       <p:sp>
         <p:nvSpPr>
+          <p:cNvPr id="2" name="Title 1">
+            <a:extLst>
+              <a:ext uri="{FF2B5EF4-FFF2-40B4-BE49-F238E27FC236}">
+                <a16:creationId xmlns:a16="http://schemas.microsoft.com/office/drawing/2014/main" id="{47A035B7-AA91-47B2-875A-FCCE9CCE653D}"/>
+              </a:ext>
+            </a:extLst>
+          </p:cNvPr>
+          <p:cNvSpPr>
+            <a:spLocks noGrp="1"/>
+          </p:cNvSpPr>
+          <p:nvPr>
+            <p:ph type="title"/>
+          </p:nvPr>
+        </p:nvSpPr>
+        <p:spPr/>
+        <p:txBody>
+          <a:bodyPr/>
+          <a:lstStyle/>
+          <a:p>
+            <a:r>
+              <a:rPr lang="en-US" dirty="0"/>
+              <a:t>Variables </a:t>
+            </a:r>
+            <a:r>
+              <a:rPr lang="en-US"/>
+              <a:t>by importance</a:t>
+            </a:r>
+            <a:endParaRPr lang="en-US" dirty="0"/>
+          </a:p>
+        </p:txBody>
+      </p:sp>
+      <p:pic>
+        <p:nvPicPr>
+          <p:cNvPr id="5" name="Content Placeholder 4">
+            <a:extLst>
+              <a:ext uri="{FF2B5EF4-FFF2-40B4-BE49-F238E27FC236}">
+                <a16:creationId xmlns:a16="http://schemas.microsoft.com/office/drawing/2014/main" id="{31620787-4E64-459B-B76D-9D620375F254}"/>
+              </a:ext>
+            </a:extLst>
+          </p:cNvPr>
+          <p:cNvPicPr>
+            <a:picLocks noGrp="1" noChangeAspect="1"/>
+          </p:cNvPicPr>
+          <p:nvPr>
+            <p:ph idx="1"/>
+          </p:nvPr>
+        </p:nvPicPr>
+        <p:blipFill>
+          <a:blip r:embed="rId2">
+            <a:extLst>
+              <a:ext uri="{28A0092B-C50C-407E-A947-70E740481C1C}">
+                <a14:useLocalDpi xmlns:a14="http://schemas.microsoft.com/office/drawing/2010/main" val="0"/>
+              </a:ext>
+            </a:extLst>
+          </a:blip>
+          <a:stretch>
+            <a:fillRect/>
+          </a:stretch>
+        </p:blipFill>
+        <p:spPr>
+          <a:xfrm>
+            <a:off x="1261872" y="1700257"/>
+            <a:ext cx="7790688" cy="5071872"/>
+          </a:xfrm>
+        </p:spPr>
+      </p:pic>
+    </p:spTree>
+    <p:extLst>
+      <p:ext uri="{BB962C8B-B14F-4D97-AF65-F5344CB8AC3E}">
+        <p14:creationId xmlns:p14="http://schemas.microsoft.com/office/powerpoint/2010/main" val="909329800"/>
+      </p:ext>
+    </p:extLst>
+  </p:cSld>
+  <p:clrMapOvr>
+    <a:masterClrMapping/>
+  </p:clrMapOvr>
+</p:sld>
+</file>
+
+<file path=ppt/slides/slide11.xml><?xml version="1.0" encoding="utf-8"?>
+<p:sld xmlns:a="http://schemas.openxmlformats.org/drawingml/2006/main" xmlns:r="http://schemas.openxmlformats.org/officeDocument/2006/relationships" xmlns:p="http://schemas.openxmlformats.org/presentationml/2006/main">
+  <p:cSld>
+    <p:spTree>
+      <p:nvGrpSpPr>
+        <p:cNvPr id="1" name=""/>
+        <p:cNvGrpSpPr/>
+        <p:nvPr/>
+      </p:nvGrpSpPr>
+      <p:grpSpPr>
+        <a:xfrm>
+          <a:off x="0" y="0"/>
+          <a:ext cx="0" cy="0"/>
+          <a:chOff x="0" y="0"/>
+          <a:chExt cx="0" cy="0"/>
+        </a:xfrm>
+      </p:grpSpPr>
+      <p:graphicFrame>
+        <p:nvGraphicFramePr>
+          <p:cNvPr id="5" name="Object 4">
+            <a:extLst>
+              <a:ext uri="{FF2B5EF4-FFF2-40B4-BE49-F238E27FC236}">
+                <a16:creationId xmlns:a16="http://schemas.microsoft.com/office/drawing/2014/main" id="{E7591E42-1D4C-4E6A-AFDD-62C7CE348B08}"/>
+              </a:ext>
+            </a:extLst>
+          </p:cNvPr>
+          <p:cNvGraphicFramePr>
+            <a:graphicFrameLocks noChangeAspect="1"/>
+          </p:cNvGraphicFramePr>
+          <p:nvPr>
+            <p:extLst>
+              <p:ext uri="{D42A27DB-BD31-4B8C-83A1-F6EECF244321}">
+                <p14:modId xmlns:p14="http://schemas.microsoft.com/office/powerpoint/2010/main" val="1309017066"/>
+              </p:ext>
+            </p:extLst>
+          </p:nvPr>
+        </p:nvGraphicFramePr>
+        <p:xfrm>
+          <a:off x="1243584" y="0"/>
+          <a:ext cx="10040112" cy="6858000"/>
+        </p:xfrm>
+        <a:graphic>
+          <a:graphicData uri="http://schemas.openxmlformats.org/presentationml/2006/ole">
+            <mc:AlternateContent xmlns:mc="http://schemas.openxmlformats.org/markup-compatibility/2006">
+              <mc:Choice xmlns:v="urn:schemas-microsoft-com:vml" Requires="v">
+                <p:oleObj spid="_x0000_s1026" name="Acrobat Document" r:id="rId3" imgW="2914254" imgH="3771477" progId="AcroExch.Document.DC">
+                  <p:embed/>
+                </p:oleObj>
+              </mc:Choice>
+              <mc:Fallback>
+                <p:oleObj name="Acrobat Document" r:id="rId3" imgW="2914254" imgH="3771477" progId="AcroExch.Document.DC">
+                  <p:embed/>
+                  <p:pic>
+                    <p:nvPicPr>
+                      <p:cNvPr id="5" name="Object 4">
+                        <a:extLst>
+                          <a:ext uri="{FF2B5EF4-FFF2-40B4-BE49-F238E27FC236}">
+                            <a16:creationId xmlns:a16="http://schemas.microsoft.com/office/drawing/2014/main" id="{E7591E42-1D4C-4E6A-AFDD-62C7CE348B08}"/>
+                          </a:ext>
+                        </a:extLst>
+                      </p:cNvPr>
+                      <p:cNvPicPr/>
+                      <p:nvPr/>
+                    </p:nvPicPr>
+                    <p:blipFill>
+                      <a:blip r:embed="rId4"/>
+                      <a:stretch>
+                        <a:fillRect/>
+                      </a:stretch>
+                    </p:blipFill>
+                    <p:spPr>
+                      <a:xfrm>
+                        <a:off x="1243584" y="0"/>
+                        <a:ext cx="10040112" cy="6858000"/>
+                      </a:xfrm>
+                      <a:prstGeom prst="rect">
+                        <a:avLst/>
+                      </a:prstGeom>
+                    </p:spPr>
+                  </p:pic>
+                </p:oleObj>
+              </mc:Fallback>
+            </mc:AlternateContent>
+          </a:graphicData>
+        </a:graphic>
+      </p:graphicFrame>
+    </p:spTree>
+    <p:extLst>
+      <p:ext uri="{BB962C8B-B14F-4D97-AF65-F5344CB8AC3E}">
+        <p14:creationId xmlns:p14="http://schemas.microsoft.com/office/powerpoint/2010/main" val="1068772232"/>
+      </p:ext>
+    </p:extLst>
+  </p:cSld>
+  <p:clrMapOvr>
+    <a:masterClrMapping/>
+  </p:clrMapOvr>
+</p:sld>
+</file>
+
+<file path=ppt/slides/slide12.xml><?xml version="1.0" encoding="utf-8"?>
+<p:sld xmlns:a="http://schemas.openxmlformats.org/drawingml/2006/main" xmlns:r="http://schemas.openxmlformats.org/officeDocument/2006/relationships" xmlns:p="http://schemas.openxmlformats.org/presentationml/2006/main">
+  <p:cSld>
+    <p:spTree>
+      <p:nvGrpSpPr>
+        <p:cNvPr id="1" name=""/>
+        <p:cNvGrpSpPr/>
+        <p:nvPr/>
+      </p:nvGrpSpPr>
+      <p:grpSpPr>
+        <a:xfrm>
+          <a:off x="0" y="0"/>
+          <a:ext cx="0" cy="0"/>
+          <a:chOff x="0" y="0"/>
+          <a:chExt cx="0" cy="0"/>
+        </a:xfrm>
+      </p:grpSpPr>
+      <p:sp>
+        <p:nvSpPr>
           <p:cNvPr id="3" name="Title 2">
             <a:extLst>
               <a:ext uri="{FF2B5EF4-FFF2-40B4-BE49-F238E27FC236}">
@@ -23837,8 +24152,8 @@
         </p:blipFill>
         <p:spPr>
           <a:xfrm>
-            <a:off x="3880843" y="2249488"/>
-            <a:ext cx="4427139" cy="3541712"/>
+            <a:off x="1347216" y="1880698"/>
+            <a:ext cx="8631936" cy="4656068"/>
           </a:xfrm>
         </p:spPr>
       </p:pic>
@@ -23855,7 +24170,7 @@
 </p:sld>
 </file>
 
-<file path=ppt/slides/slide11.xml><?xml version="1.0" encoding="utf-8"?>
+<file path=ppt/slides/slide13.xml><?xml version="1.0" encoding="utf-8"?>
 <p:sld xmlns:a="http://schemas.openxmlformats.org/drawingml/2006/main" xmlns:r="http://schemas.openxmlformats.org/officeDocument/2006/relationships" xmlns:p="http://schemas.openxmlformats.org/presentationml/2006/main">
   <p:cSld>
     <p:spTree>
@@ -23938,7 +24253,7 @@
 </p:sld>
 </file>
 
-<file path=ppt/slides/slide12.xml><?xml version="1.0" encoding="utf-8"?>
+<file path=ppt/slides/slide14.xml><?xml version="1.0" encoding="utf-8"?>
 <p:sld xmlns:a="http://schemas.openxmlformats.org/drawingml/2006/main" xmlns:r="http://schemas.openxmlformats.org/officeDocument/2006/relationships" xmlns:p="http://schemas.openxmlformats.org/presentationml/2006/main">
   <p:cSld>
     <p:spTree>
@@ -24026,7 +24341,7 @@
 </p:sld>
 </file>
 
-<file path=ppt/slides/slide13.xml><?xml version="1.0" encoding="utf-8"?>
+<file path=ppt/slides/slide15.xml><?xml version="1.0" encoding="utf-8"?>
 <p:sld xmlns:a="http://schemas.openxmlformats.org/drawingml/2006/main" xmlns:r="http://schemas.openxmlformats.org/officeDocument/2006/relationships" xmlns:p="http://schemas.openxmlformats.org/presentationml/2006/main">
   <p:cSld>
     <p:spTree>
@@ -24295,7 +24610,7 @@
             <a:noFill/>
             <a:extLst>
               <a:ext uri="{909E8E84-426E-40dd-AFC4-6F175D3DCCD1}">
-                <a14:hiddenFill xmlns:p14="http://schemas.microsoft.com/office/powerpoint/2010/main" xmlns:a14="http://schemas.microsoft.com/office/drawing/2010/main" xmlns:a16="http://schemas.microsoft.com/office/drawing/2014/main" xmlns="">
+                <a14:hiddenFill xmlns="" xmlns:a16="http://schemas.microsoft.com/office/drawing/2014/main" xmlns:a14="http://schemas.microsoft.com/office/drawing/2010/main" xmlns:p14="http://schemas.microsoft.com/office/powerpoint/2010/main">
                   <a:solidFill>
                     <a:srgbClr val="FFFFFF"/>
                   </a:solidFill>
@@ -24510,7 +24825,7 @@
             </a:ln>
             <a:extLst>
               <a:ext uri="{91240B29-F687-4f45-9708-019B960494DF}">
-                <a14:hiddenLine xmlns:p14="http://schemas.microsoft.com/office/powerpoint/2010/main" xmlns:a14="http://schemas.microsoft.com/office/drawing/2010/main" xmlns:a16="http://schemas.microsoft.com/office/drawing/2014/main" xmlns="" w="9525">
+                <a14:hiddenLine xmlns="" xmlns:a16="http://schemas.microsoft.com/office/drawing/2014/main" xmlns:a14="http://schemas.microsoft.com/office/drawing/2010/main" xmlns:p14="http://schemas.microsoft.com/office/powerpoint/2010/main" w="9525">
                   <a:solidFill>
                     <a:srgbClr val="000000"/>
                   </a:solidFill>
@@ -24615,7 +24930,7 @@
             </a:ln>
             <a:extLst>
               <a:ext uri="{91240B29-F687-4f45-9708-019B960494DF}">
-                <a14:hiddenLine xmlns:p14="http://schemas.microsoft.com/office/powerpoint/2010/main" xmlns:a14="http://schemas.microsoft.com/office/drawing/2010/main" xmlns:a16="http://schemas.microsoft.com/office/drawing/2014/main" xmlns="" w="9525">
+                <a14:hiddenLine xmlns="" xmlns:a16="http://schemas.microsoft.com/office/drawing/2014/main" xmlns:a14="http://schemas.microsoft.com/office/drawing/2010/main" xmlns:p14="http://schemas.microsoft.com/office/powerpoint/2010/main" w="9525">
                   <a:solidFill>
                     <a:srgbClr val="000000"/>
                   </a:solidFill>
@@ -24720,7 +25035,7 @@
             </a:ln>
             <a:extLst>
               <a:ext uri="{91240B29-F687-4f45-9708-019B960494DF}">
-                <a14:hiddenLine xmlns:p14="http://schemas.microsoft.com/office/powerpoint/2010/main" xmlns:a14="http://schemas.microsoft.com/office/drawing/2010/main" xmlns:a16="http://schemas.microsoft.com/office/drawing/2014/main" xmlns="" w="9525">
+                <a14:hiddenLine xmlns="" xmlns:a16="http://schemas.microsoft.com/office/drawing/2014/main" xmlns:a14="http://schemas.microsoft.com/office/drawing/2010/main" xmlns:p14="http://schemas.microsoft.com/office/powerpoint/2010/main" w="9525">
                   <a:solidFill>
                     <a:srgbClr val="000000"/>
                   </a:solidFill>
@@ -24769,7 +25084,7 @@
             </a:ln>
             <a:extLst>
               <a:ext uri="{91240B29-F687-4f45-9708-019B960494DF}">
-                <a14:hiddenLine xmlns:p14="http://schemas.microsoft.com/office/powerpoint/2010/main" xmlns:a14="http://schemas.microsoft.com/office/drawing/2010/main" xmlns:a16="http://schemas.microsoft.com/office/drawing/2014/main" xmlns="" w="9525">
+                <a14:hiddenLine xmlns="" xmlns:a16="http://schemas.microsoft.com/office/drawing/2014/main" xmlns:a14="http://schemas.microsoft.com/office/drawing/2010/main" xmlns:p14="http://schemas.microsoft.com/office/powerpoint/2010/main" w="9525">
                   <a:solidFill>
                     <a:srgbClr val="000000"/>
                   </a:solidFill>
@@ -24874,7 +25189,7 @@
             </a:ln>
             <a:extLst>
               <a:ext uri="{91240B29-F687-4f45-9708-019B960494DF}">
-                <a14:hiddenLine xmlns:p14="http://schemas.microsoft.com/office/powerpoint/2010/main" xmlns:a14="http://schemas.microsoft.com/office/drawing/2010/main" xmlns:a16="http://schemas.microsoft.com/office/drawing/2014/main" xmlns="" w="9525">
+                <a14:hiddenLine xmlns="" xmlns:a16="http://schemas.microsoft.com/office/drawing/2014/main" xmlns:a14="http://schemas.microsoft.com/office/drawing/2010/main" xmlns:p14="http://schemas.microsoft.com/office/powerpoint/2010/main" w="9525">
                   <a:solidFill>
                     <a:srgbClr val="000000"/>
                   </a:solidFill>
@@ -24951,7 +25266,7 @@
             </a:ln>
             <a:extLst>
               <a:ext uri="{91240B29-F687-4f45-9708-019B960494DF}">
-                <a14:hiddenLine xmlns:p14="http://schemas.microsoft.com/office/powerpoint/2010/main" xmlns:a14="http://schemas.microsoft.com/office/drawing/2010/main" xmlns:a16="http://schemas.microsoft.com/office/drawing/2014/main" xmlns="" w="9525">
+                <a14:hiddenLine xmlns="" xmlns:a16="http://schemas.microsoft.com/office/drawing/2014/main" xmlns:a14="http://schemas.microsoft.com/office/drawing/2010/main" xmlns:p14="http://schemas.microsoft.com/office/powerpoint/2010/main" w="9525">
                   <a:solidFill>
                     <a:srgbClr val="000000"/>
                   </a:solidFill>
@@ -25028,7 +25343,7 @@
             </a:ln>
             <a:extLst>
               <a:ext uri="{91240B29-F687-4f45-9708-019B960494DF}">
-                <a14:hiddenLine xmlns:p14="http://schemas.microsoft.com/office/powerpoint/2010/main" xmlns:a14="http://schemas.microsoft.com/office/drawing/2010/main" xmlns:a16="http://schemas.microsoft.com/office/drawing/2014/main" xmlns="" w="9525">
+                <a14:hiddenLine xmlns="" xmlns:a16="http://schemas.microsoft.com/office/drawing/2014/main" xmlns:a14="http://schemas.microsoft.com/office/drawing/2010/main" xmlns:p14="http://schemas.microsoft.com/office/powerpoint/2010/main" w="9525">
                   <a:solidFill>
                     <a:srgbClr val="000000"/>
                   </a:solidFill>
@@ -25133,7 +25448,7 @@
             </a:ln>
             <a:extLst>
               <a:ext uri="{91240B29-F687-4f45-9708-019B960494DF}">
-                <a14:hiddenLine xmlns:p14="http://schemas.microsoft.com/office/powerpoint/2010/main" xmlns:a14="http://schemas.microsoft.com/office/drawing/2010/main" xmlns:a16="http://schemas.microsoft.com/office/drawing/2014/main" xmlns="" w="9525">
+                <a14:hiddenLine xmlns="" xmlns:a16="http://schemas.microsoft.com/office/drawing/2014/main" xmlns:a14="http://schemas.microsoft.com/office/drawing/2010/main" xmlns:p14="http://schemas.microsoft.com/office/powerpoint/2010/main" w="9525">
                   <a:solidFill>
                     <a:srgbClr val="000000"/>
                   </a:solidFill>
@@ -25210,7 +25525,7 @@
             </a:ln>
             <a:extLst>
               <a:ext uri="{91240B29-F687-4f45-9708-019B960494DF}">
-                <a14:hiddenLine xmlns:p14="http://schemas.microsoft.com/office/powerpoint/2010/main" xmlns:a14="http://schemas.microsoft.com/office/drawing/2010/main" xmlns:a16="http://schemas.microsoft.com/office/drawing/2014/main" xmlns="" w="9525">
+                <a14:hiddenLine xmlns="" xmlns:a16="http://schemas.microsoft.com/office/drawing/2014/main" xmlns:a14="http://schemas.microsoft.com/office/drawing/2010/main" xmlns:p14="http://schemas.microsoft.com/office/powerpoint/2010/main" w="9525">
                   <a:solidFill>
                     <a:srgbClr val="000000"/>
                   </a:solidFill>
@@ -25287,7 +25602,7 @@
             </a:ln>
             <a:extLst>
               <a:ext uri="{91240B29-F687-4f45-9708-019B960494DF}">
-                <a14:hiddenLine xmlns:p14="http://schemas.microsoft.com/office/powerpoint/2010/main" xmlns:a14="http://schemas.microsoft.com/office/drawing/2010/main" xmlns:a16="http://schemas.microsoft.com/office/drawing/2014/main" xmlns="" w="9525">
+                <a14:hiddenLine xmlns="" xmlns:a16="http://schemas.microsoft.com/office/drawing/2014/main" xmlns:a14="http://schemas.microsoft.com/office/drawing/2010/main" xmlns:p14="http://schemas.microsoft.com/office/powerpoint/2010/main" w="9525">
                   <a:solidFill>
                     <a:srgbClr val="000000"/>
                   </a:solidFill>
@@ -25392,7 +25707,7 @@
             </a:ln>
             <a:extLst>
               <a:ext uri="{91240B29-F687-4f45-9708-019B960494DF}">
-                <a14:hiddenLine xmlns:p14="http://schemas.microsoft.com/office/powerpoint/2010/main" xmlns:a14="http://schemas.microsoft.com/office/drawing/2010/main" xmlns:a16="http://schemas.microsoft.com/office/drawing/2014/main" xmlns="" w="9525">
+                <a14:hiddenLine xmlns="" xmlns:a16="http://schemas.microsoft.com/office/drawing/2014/main" xmlns:a14="http://schemas.microsoft.com/office/drawing/2010/main" xmlns:p14="http://schemas.microsoft.com/office/powerpoint/2010/main" w="9525">
                   <a:solidFill>
                     <a:srgbClr val="000000"/>
                   </a:solidFill>
@@ -25497,7 +25812,7 @@
             </a:ln>
             <a:extLst>
               <a:ext uri="{91240B29-F687-4f45-9708-019B960494DF}">
-                <a14:hiddenLine xmlns:p14="http://schemas.microsoft.com/office/powerpoint/2010/main" xmlns:a14="http://schemas.microsoft.com/office/drawing/2010/main" xmlns:a16="http://schemas.microsoft.com/office/drawing/2014/main" xmlns="" w="9525">
+                <a14:hiddenLine xmlns="" xmlns:a16="http://schemas.microsoft.com/office/drawing/2014/main" xmlns:a14="http://schemas.microsoft.com/office/drawing/2010/main" xmlns:p14="http://schemas.microsoft.com/office/powerpoint/2010/main" w="9525">
                   <a:solidFill>
                     <a:srgbClr val="000000"/>
                   </a:solidFill>
@@ -25574,7 +25889,7 @@
             </a:ln>
             <a:extLst>
               <a:ext uri="{91240B29-F687-4f45-9708-019B960494DF}">
-                <a14:hiddenLine xmlns:p14="http://schemas.microsoft.com/office/powerpoint/2010/main" xmlns:a14="http://schemas.microsoft.com/office/drawing/2010/main" xmlns:a16="http://schemas.microsoft.com/office/drawing/2014/main" xmlns="" w="9525">
+                <a14:hiddenLine xmlns="" xmlns:a16="http://schemas.microsoft.com/office/drawing/2014/main" xmlns:a14="http://schemas.microsoft.com/office/drawing/2010/main" xmlns:p14="http://schemas.microsoft.com/office/powerpoint/2010/main" w="9525">
                   <a:solidFill>
                     <a:srgbClr val="000000"/>
                   </a:solidFill>
@@ -25699,7 +26014,7 @@
             </a:ln>
             <a:extLst>
               <a:ext uri="{91240B29-F687-4f45-9708-019B960494DF}">
-                <a14:hiddenLine xmlns:p14="http://schemas.microsoft.com/office/powerpoint/2010/main" xmlns:a14="http://schemas.microsoft.com/office/drawing/2010/main" xmlns:a16="http://schemas.microsoft.com/office/drawing/2014/main" xmlns="" w="9525">
+                <a14:hiddenLine xmlns="" xmlns:a16="http://schemas.microsoft.com/office/drawing/2014/main" xmlns:a14="http://schemas.microsoft.com/office/drawing/2010/main" xmlns:p14="http://schemas.microsoft.com/office/powerpoint/2010/main" w="9525">
                   <a:solidFill>
                     <a:srgbClr val="000000"/>
                   </a:solidFill>
@@ -25776,7 +26091,7 @@
             </a:ln>
             <a:extLst>
               <a:ext uri="{91240B29-F687-4f45-9708-019B960494DF}">
-                <a14:hiddenLine xmlns:p14="http://schemas.microsoft.com/office/powerpoint/2010/main" xmlns:a14="http://schemas.microsoft.com/office/drawing/2010/main" xmlns:a16="http://schemas.microsoft.com/office/drawing/2014/main" xmlns="" w="9525">
+                <a14:hiddenLine xmlns="" xmlns:a16="http://schemas.microsoft.com/office/drawing/2014/main" xmlns:a14="http://schemas.microsoft.com/office/drawing/2010/main" xmlns:p14="http://schemas.microsoft.com/office/powerpoint/2010/main" w="9525">
                   <a:solidFill>
                     <a:srgbClr val="000000"/>
                   </a:solidFill>
@@ -25881,7 +26196,7 @@
             </a:ln>
             <a:extLst>
               <a:ext uri="{91240B29-F687-4f45-9708-019B960494DF}">
-                <a14:hiddenLine xmlns:p14="http://schemas.microsoft.com/office/powerpoint/2010/main" xmlns:a14="http://schemas.microsoft.com/office/drawing/2010/main" xmlns:a16="http://schemas.microsoft.com/office/drawing/2014/main" xmlns="" w="9525">
+                <a14:hiddenLine xmlns="" xmlns:a16="http://schemas.microsoft.com/office/drawing/2014/main" xmlns:a14="http://schemas.microsoft.com/office/drawing/2010/main" xmlns:p14="http://schemas.microsoft.com/office/powerpoint/2010/main" w="9525">
                   <a:solidFill>
                     <a:srgbClr val="000000"/>
                   </a:solidFill>
@@ -25986,7 +26301,7 @@
             </a:ln>
             <a:extLst>
               <a:ext uri="{91240B29-F687-4f45-9708-019B960494DF}">
-                <a14:hiddenLine xmlns:p14="http://schemas.microsoft.com/office/powerpoint/2010/main" xmlns:a14="http://schemas.microsoft.com/office/drawing/2010/main" xmlns:a16="http://schemas.microsoft.com/office/drawing/2014/main" xmlns="" w="9525">
+                <a14:hiddenLine xmlns="" xmlns:a16="http://schemas.microsoft.com/office/drawing/2014/main" xmlns:a14="http://schemas.microsoft.com/office/drawing/2010/main" xmlns:p14="http://schemas.microsoft.com/office/powerpoint/2010/main" w="9525">
                   <a:solidFill>
                     <a:srgbClr val="000000"/>
                   </a:solidFill>
@@ -26063,7 +26378,7 @@
             </a:ln>
             <a:extLst>
               <a:ext uri="{91240B29-F687-4f45-9708-019B960494DF}">
-                <a14:hiddenLine xmlns:p14="http://schemas.microsoft.com/office/powerpoint/2010/main" xmlns:a14="http://schemas.microsoft.com/office/drawing/2010/main" xmlns:a16="http://schemas.microsoft.com/office/drawing/2014/main" xmlns="" w="9525">
+                <a14:hiddenLine xmlns="" xmlns:a16="http://schemas.microsoft.com/office/drawing/2014/main" xmlns:a14="http://schemas.microsoft.com/office/drawing/2010/main" xmlns:p14="http://schemas.microsoft.com/office/powerpoint/2010/main" w="9525">
                   <a:solidFill>
                     <a:srgbClr val="000000"/>
                   </a:solidFill>
@@ -26168,7 +26483,7 @@
             </a:ln>
             <a:extLst>
               <a:ext uri="{91240B29-F687-4f45-9708-019B960494DF}">
-                <a14:hiddenLine xmlns:p14="http://schemas.microsoft.com/office/powerpoint/2010/main" xmlns:a14="http://schemas.microsoft.com/office/drawing/2010/main" xmlns:a16="http://schemas.microsoft.com/office/drawing/2014/main" xmlns="" w="9525">
+                <a14:hiddenLine xmlns="" xmlns:a16="http://schemas.microsoft.com/office/drawing/2014/main" xmlns:a14="http://schemas.microsoft.com/office/drawing/2010/main" xmlns:p14="http://schemas.microsoft.com/office/powerpoint/2010/main" w="9525">
                   <a:solidFill>
                     <a:srgbClr val="000000"/>
                   </a:solidFill>
@@ -26273,7 +26588,7 @@
             </a:ln>
             <a:extLst>
               <a:ext uri="{91240B29-F687-4f45-9708-019B960494DF}">
-                <a14:hiddenLine xmlns:p14="http://schemas.microsoft.com/office/powerpoint/2010/main" xmlns:a14="http://schemas.microsoft.com/office/drawing/2010/main" xmlns:a16="http://schemas.microsoft.com/office/drawing/2014/main" xmlns="" w="9525">
+                <a14:hiddenLine xmlns="" xmlns:a16="http://schemas.microsoft.com/office/drawing/2014/main" xmlns:a14="http://schemas.microsoft.com/office/drawing/2010/main" xmlns:p14="http://schemas.microsoft.com/office/powerpoint/2010/main" w="9525">
                   <a:solidFill>
                     <a:srgbClr val="000000"/>
                   </a:solidFill>
@@ -26344,7 +26659,7 @@
             </a:ln>
             <a:extLst>
               <a:ext uri="{91240B29-F687-4f45-9708-019B960494DF}">
-                <a14:hiddenLine xmlns:p14="http://schemas.microsoft.com/office/powerpoint/2010/main" xmlns:a14="http://schemas.microsoft.com/office/drawing/2010/main" xmlns:a16="http://schemas.microsoft.com/office/drawing/2014/main" xmlns="" w="9525">
+                <a14:hiddenLine xmlns="" xmlns:a16="http://schemas.microsoft.com/office/drawing/2014/main" xmlns:a14="http://schemas.microsoft.com/office/drawing/2010/main" xmlns:p14="http://schemas.microsoft.com/office/powerpoint/2010/main" w="9525">
                   <a:solidFill>
                     <a:srgbClr val="000000"/>
                   </a:solidFill>
@@ -26449,7 +26764,7 @@
             </a:ln>
             <a:extLst>
               <a:ext uri="{91240B29-F687-4f45-9708-019B960494DF}">
-                <a14:hiddenLine xmlns:p14="http://schemas.microsoft.com/office/powerpoint/2010/main" xmlns:a14="http://schemas.microsoft.com/office/drawing/2010/main" xmlns:a16="http://schemas.microsoft.com/office/drawing/2014/main" xmlns="" w="9525">
+                <a14:hiddenLine xmlns="" xmlns:a16="http://schemas.microsoft.com/office/drawing/2014/main" xmlns:a14="http://schemas.microsoft.com/office/drawing/2010/main" xmlns:p14="http://schemas.microsoft.com/office/powerpoint/2010/main" w="9525">
                   <a:solidFill>
                     <a:srgbClr val="000000"/>
                   </a:solidFill>
@@ -26520,7 +26835,7 @@
             </a:ln>
             <a:extLst>
               <a:ext uri="{91240B29-F687-4f45-9708-019B960494DF}">
-                <a14:hiddenLine xmlns:p14="http://schemas.microsoft.com/office/powerpoint/2010/main" xmlns:a14="http://schemas.microsoft.com/office/drawing/2010/main" xmlns:a16="http://schemas.microsoft.com/office/drawing/2014/main" xmlns="" w="9525">
+                <a14:hiddenLine xmlns="" xmlns:a16="http://schemas.microsoft.com/office/drawing/2014/main" xmlns:a14="http://schemas.microsoft.com/office/drawing/2010/main" xmlns:p14="http://schemas.microsoft.com/office/powerpoint/2010/main" w="9525">
                   <a:solidFill>
                     <a:srgbClr val="000000"/>
                   </a:solidFill>
@@ -26625,7 +26940,7 @@
             </a:ln>
             <a:extLst>
               <a:ext uri="{91240B29-F687-4f45-9708-019B960494DF}">
-                <a14:hiddenLine xmlns:p14="http://schemas.microsoft.com/office/powerpoint/2010/main" xmlns:a14="http://schemas.microsoft.com/office/drawing/2010/main" xmlns:a16="http://schemas.microsoft.com/office/drawing/2014/main" xmlns="" w="9525">
+                <a14:hiddenLine xmlns="" xmlns:a16="http://schemas.microsoft.com/office/drawing/2014/main" xmlns:a14="http://schemas.microsoft.com/office/drawing/2010/main" xmlns:p14="http://schemas.microsoft.com/office/powerpoint/2010/main" w="9525">
                   <a:solidFill>
                     <a:srgbClr val="000000"/>
                   </a:solidFill>
@@ -26708,7 +27023,7 @@
             </a:ln>
             <a:extLst>
               <a:ext uri="{91240B29-F687-4f45-9708-019B960494DF}">
-                <a14:hiddenLine xmlns:p14="http://schemas.microsoft.com/office/powerpoint/2010/main" xmlns:a14="http://schemas.microsoft.com/office/drawing/2010/main" xmlns:a16="http://schemas.microsoft.com/office/drawing/2014/main" xmlns="" w="9525">
+                <a14:hiddenLine xmlns="" xmlns:a16="http://schemas.microsoft.com/office/drawing/2014/main" xmlns:a14="http://schemas.microsoft.com/office/drawing/2010/main" xmlns:p14="http://schemas.microsoft.com/office/powerpoint/2010/main" w="9525">
                   <a:solidFill>
                     <a:srgbClr val="000000"/>
                   </a:solidFill>
@@ -26813,7 +27128,7 @@
             </a:ln>
             <a:extLst>
               <a:ext uri="{91240B29-F687-4f45-9708-019B960494DF}">
-                <a14:hiddenLine xmlns:p14="http://schemas.microsoft.com/office/powerpoint/2010/main" xmlns:a14="http://schemas.microsoft.com/office/drawing/2010/main" xmlns:a16="http://schemas.microsoft.com/office/drawing/2014/main" xmlns="" w="9525">
+                <a14:hiddenLine xmlns="" xmlns:a16="http://schemas.microsoft.com/office/drawing/2014/main" xmlns:a14="http://schemas.microsoft.com/office/drawing/2010/main" xmlns:p14="http://schemas.microsoft.com/office/powerpoint/2010/main" w="9525">
                   <a:solidFill>
                     <a:srgbClr val="000000"/>
                   </a:solidFill>
@@ -26896,7 +27211,7 @@
             </a:ln>
             <a:extLst>
               <a:ext uri="{91240B29-F687-4f45-9708-019B960494DF}">
-                <a14:hiddenLine xmlns:p14="http://schemas.microsoft.com/office/powerpoint/2010/main" xmlns:a14="http://schemas.microsoft.com/office/drawing/2010/main" xmlns:a16="http://schemas.microsoft.com/office/drawing/2014/main" xmlns="" w="9525">
+                <a14:hiddenLine xmlns="" xmlns:a16="http://schemas.microsoft.com/office/drawing/2014/main" xmlns:a14="http://schemas.microsoft.com/office/drawing/2010/main" xmlns:p14="http://schemas.microsoft.com/office/powerpoint/2010/main" w="9525">
                   <a:solidFill>
                     <a:srgbClr val="000000"/>
                   </a:solidFill>
@@ -27001,7 +27316,7 @@
             </a:ln>
             <a:extLst>
               <a:ext uri="{91240B29-F687-4f45-9708-019B960494DF}">
-                <a14:hiddenLine xmlns:p14="http://schemas.microsoft.com/office/powerpoint/2010/main" xmlns:a14="http://schemas.microsoft.com/office/drawing/2010/main" xmlns:a16="http://schemas.microsoft.com/office/drawing/2014/main" xmlns="" w="9525">
+                <a14:hiddenLine xmlns="" xmlns:a16="http://schemas.microsoft.com/office/drawing/2014/main" xmlns:a14="http://schemas.microsoft.com/office/drawing/2010/main" xmlns:p14="http://schemas.microsoft.com/office/powerpoint/2010/main" w="9525">
                   <a:solidFill>
                     <a:srgbClr val="000000"/>
                   </a:solidFill>
@@ -27050,7 +27365,7 @@
             </a:ln>
             <a:extLst>
               <a:ext uri="{91240B29-F687-4f45-9708-019B960494DF}">
-                <a14:hiddenLine xmlns:p14="http://schemas.microsoft.com/office/powerpoint/2010/main" xmlns:a14="http://schemas.microsoft.com/office/drawing/2010/main" xmlns:a16="http://schemas.microsoft.com/office/drawing/2014/main" xmlns="" w="9525">
+                <a14:hiddenLine xmlns="" xmlns:a16="http://schemas.microsoft.com/office/drawing/2014/main" xmlns:a14="http://schemas.microsoft.com/office/drawing/2010/main" xmlns:p14="http://schemas.microsoft.com/office/powerpoint/2010/main" w="9525">
                   <a:solidFill>
                     <a:srgbClr val="000000"/>
                   </a:solidFill>
@@ -27155,7 +27470,7 @@
             </a:ln>
             <a:extLst>
               <a:ext uri="{91240B29-F687-4f45-9708-019B960494DF}">
-                <a14:hiddenLine xmlns:p14="http://schemas.microsoft.com/office/powerpoint/2010/main" xmlns:a14="http://schemas.microsoft.com/office/drawing/2010/main" xmlns:a16="http://schemas.microsoft.com/office/drawing/2014/main" xmlns="" w="9525">
+                <a14:hiddenLine xmlns="" xmlns:a16="http://schemas.microsoft.com/office/drawing/2014/main" xmlns:a14="http://schemas.microsoft.com/office/drawing/2010/main" xmlns:p14="http://schemas.microsoft.com/office/powerpoint/2010/main" w="9525">
                   <a:solidFill>
                     <a:srgbClr val="000000"/>
                   </a:solidFill>
@@ -27232,7 +27547,7 @@
             </a:ln>
             <a:extLst>
               <a:ext uri="{91240B29-F687-4f45-9708-019B960494DF}">
-                <a14:hiddenLine xmlns:p14="http://schemas.microsoft.com/office/powerpoint/2010/main" xmlns:a14="http://schemas.microsoft.com/office/drawing/2010/main" xmlns:a16="http://schemas.microsoft.com/office/drawing/2014/main" xmlns="" w="9525">
+                <a14:hiddenLine xmlns="" xmlns:a16="http://schemas.microsoft.com/office/drawing/2014/main" xmlns:a14="http://schemas.microsoft.com/office/drawing/2010/main" xmlns:p14="http://schemas.microsoft.com/office/powerpoint/2010/main" w="9525">
                   <a:solidFill>
                     <a:srgbClr val="000000"/>
                   </a:solidFill>
@@ -27309,7 +27624,7 @@
             </a:ln>
             <a:extLst>
               <a:ext uri="{91240B29-F687-4f45-9708-019B960494DF}">
-                <a14:hiddenLine xmlns:p14="http://schemas.microsoft.com/office/powerpoint/2010/main" xmlns:a14="http://schemas.microsoft.com/office/drawing/2010/main" xmlns:a16="http://schemas.microsoft.com/office/drawing/2014/main" xmlns="" w="9525">
+                <a14:hiddenLine xmlns="" xmlns:a16="http://schemas.microsoft.com/office/drawing/2014/main" xmlns:a14="http://schemas.microsoft.com/office/drawing/2010/main" xmlns:p14="http://schemas.microsoft.com/office/powerpoint/2010/main" w="9525">
                   <a:solidFill>
                     <a:srgbClr val="000000"/>
                   </a:solidFill>
@@ -27414,7 +27729,7 @@
             </a:ln>
             <a:extLst>
               <a:ext uri="{91240B29-F687-4f45-9708-019B960494DF}">
-                <a14:hiddenLine xmlns:p14="http://schemas.microsoft.com/office/powerpoint/2010/main" xmlns:a14="http://schemas.microsoft.com/office/drawing/2010/main" xmlns:a16="http://schemas.microsoft.com/office/drawing/2014/main" xmlns="" w="9525">
+                <a14:hiddenLine xmlns="" xmlns:a16="http://schemas.microsoft.com/office/drawing/2014/main" xmlns:a14="http://schemas.microsoft.com/office/drawing/2010/main" xmlns:p14="http://schemas.microsoft.com/office/powerpoint/2010/main" w="9525">
                   <a:solidFill>
                     <a:srgbClr val="000000"/>
                   </a:solidFill>
@@ -27497,7 +27812,7 @@
             </a:ln>
             <a:extLst>
               <a:ext uri="{91240B29-F687-4f45-9708-019B960494DF}">
-                <a14:hiddenLine xmlns:p14="http://schemas.microsoft.com/office/powerpoint/2010/main" xmlns:a14="http://schemas.microsoft.com/office/drawing/2010/main" xmlns:a16="http://schemas.microsoft.com/office/drawing/2014/main" xmlns="" w="9525">
+                <a14:hiddenLine xmlns="" xmlns:a16="http://schemas.microsoft.com/office/drawing/2014/main" xmlns:a14="http://schemas.microsoft.com/office/drawing/2010/main" xmlns:p14="http://schemas.microsoft.com/office/powerpoint/2010/main" w="9525">
                   <a:solidFill>
                     <a:srgbClr val="000000"/>
                   </a:solidFill>
@@ -27574,7 +27889,7 @@
             </a:ln>
             <a:extLst>
               <a:ext uri="{91240B29-F687-4f45-9708-019B960494DF}">
-                <a14:hiddenLine xmlns:p14="http://schemas.microsoft.com/office/powerpoint/2010/main" xmlns:a14="http://schemas.microsoft.com/office/drawing/2010/main" xmlns:a16="http://schemas.microsoft.com/office/drawing/2014/main" xmlns="" w="9525">
+                <a14:hiddenLine xmlns="" xmlns:a16="http://schemas.microsoft.com/office/drawing/2014/main" xmlns:a14="http://schemas.microsoft.com/office/drawing/2010/main" xmlns:p14="http://schemas.microsoft.com/office/powerpoint/2010/main" w="9525">
                   <a:solidFill>
                     <a:srgbClr val="000000"/>
                   </a:solidFill>
@@ -27679,7 +27994,7 @@
             </a:ln>
             <a:extLst>
               <a:ext uri="{91240B29-F687-4f45-9708-019B960494DF}">
-                <a14:hiddenLine xmlns:p14="http://schemas.microsoft.com/office/powerpoint/2010/main" xmlns:a14="http://schemas.microsoft.com/office/drawing/2010/main" xmlns:a16="http://schemas.microsoft.com/office/drawing/2014/main" xmlns="" w="9525">
+                <a14:hiddenLine xmlns="" xmlns:a16="http://schemas.microsoft.com/office/drawing/2014/main" xmlns:a14="http://schemas.microsoft.com/office/drawing/2010/main" xmlns:p14="http://schemas.microsoft.com/office/powerpoint/2010/main" w="9525">
                   <a:solidFill>
                     <a:srgbClr val="000000"/>
                   </a:solidFill>
@@ -27756,7 +28071,7 @@
             </a:ln>
             <a:extLst>
               <a:ext uri="{91240B29-F687-4f45-9708-019B960494DF}">
-                <a14:hiddenLine xmlns:p14="http://schemas.microsoft.com/office/powerpoint/2010/main" xmlns:a14="http://schemas.microsoft.com/office/drawing/2010/main" xmlns:a16="http://schemas.microsoft.com/office/drawing/2014/main" xmlns="" w="9525">
+                <a14:hiddenLine xmlns="" xmlns:a16="http://schemas.microsoft.com/office/drawing/2014/main" xmlns:a14="http://schemas.microsoft.com/office/drawing/2010/main" xmlns:p14="http://schemas.microsoft.com/office/powerpoint/2010/main" w="9525">
                   <a:solidFill>
                     <a:srgbClr val="000000"/>
                   </a:solidFill>
@@ -27861,7 +28176,7 @@
             </a:ln>
             <a:extLst>
               <a:ext uri="{91240B29-F687-4f45-9708-019B960494DF}">
-                <a14:hiddenLine xmlns:p14="http://schemas.microsoft.com/office/powerpoint/2010/main" xmlns:a14="http://schemas.microsoft.com/office/drawing/2010/main" xmlns:a16="http://schemas.microsoft.com/office/drawing/2014/main" xmlns="" w="9525">
+                <a14:hiddenLine xmlns="" xmlns:a16="http://schemas.microsoft.com/office/drawing/2014/main" xmlns:a14="http://schemas.microsoft.com/office/drawing/2010/main" xmlns:p14="http://schemas.microsoft.com/office/powerpoint/2010/main" w="9525">
                   <a:solidFill>
                     <a:srgbClr val="000000"/>
                   </a:solidFill>
@@ -27938,7 +28253,7 @@
             </a:ln>
             <a:extLst>
               <a:ext uri="{91240B29-F687-4f45-9708-019B960494DF}">
-                <a14:hiddenLine xmlns:p14="http://schemas.microsoft.com/office/powerpoint/2010/main" xmlns:a14="http://schemas.microsoft.com/office/drawing/2010/main" xmlns:a16="http://schemas.microsoft.com/office/drawing/2014/main" xmlns="" w="9525">
+                <a14:hiddenLine xmlns="" xmlns:a16="http://schemas.microsoft.com/office/drawing/2014/main" xmlns:a14="http://schemas.microsoft.com/office/drawing/2010/main" xmlns:p14="http://schemas.microsoft.com/office/powerpoint/2010/main" w="9525">
                   <a:solidFill>
                     <a:srgbClr val="000000"/>
                   </a:solidFill>
@@ -28043,7 +28358,7 @@
             </a:ln>
             <a:extLst>
               <a:ext uri="{91240B29-F687-4f45-9708-019B960494DF}">
-                <a14:hiddenLine xmlns:p14="http://schemas.microsoft.com/office/powerpoint/2010/main" xmlns:a14="http://schemas.microsoft.com/office/drawing/2010/main" xmlns:a16="http://schemas.microsoft.com/office/drawing/2014/main" xmlns="" w="9525">
+                <a14:hiddenLine xmlns="" xmlns:a16="http://schemas.microsoft.com/office/drawing/2014/main" xmlns:a14="http://schemas.microsoft.com/office/drawing/2010/main" xmlns:p14="http://schemas.microsoft.com/office/powerpoint/2010/main" w="9525">
                   <a:solidFill>
                     <a:srgbClr val="000000"/>
                   </a:solidFill>
@@ -28092,7 +28407,7 @@
             </a:ln>
             <a:extLst>
               <a:ext uri="{91240B29-F687-4f45-9708-019B960494DF}">
-                <a14:hiddenLine xmlns:p14="http://schemas.microsoft.com/office/powerpoint/2010/main" xmlns:a14="http://schemas.microsoft.com/office/drawing/2010/main" xmlns:a16="http://schemas.microsoft.com/office/drawing/2014/main" xmlns="" w="9525">
+                <a14:hiddenLine xmlns="" xmlns:a16="http://schemas.microsoft.com/office/drawing/2014/main" xmlns:a14="http://schemas.microsoft.com/office/drawing/2010/main" xmlns:p14="http://schemas.microsoft.com/office/powerpoint/2010/main" w="9525">
                   <a:solidFill>
                     <a:srgbClr val="000000"/>
                   </a:solidFill>
@@ -28172,7 +28487,7 @@
             </a:ln>
             <a:extLst>
               <a:ext uri="{91240B29-F687-4f45-9708-019B960494DF}">
-                <a14:hiddenLine xmlns:p14="http://schemas.microsoft.com/office/powerpoint/2010/main" xmlns:a14="http://schemas.microsoft.com/office/drawing/2010/main" xmlns:a16="http://schemas.microsoft.com/office/drawing/2014/main" xmlns="" w="9525">
+                <a14:hiddenLine xmlns="" xmlns:a16="http://schemas.microsoft.com/office/drawing/2014/main" xmlns:a14="http://schemas.microsoft.com/office/drawing/2010/main" xmlns:p14="http://schemas.microsoft.com/office/powerpoint/2010/main" w="9525">
                   <a:solidFill>
                     <a:srgbClr val="000000"/>
                   </a:solidFill>
@@ -28277,7 +28592,7 @@
             </a:ln>
             <a:extLst>
               <a:ext uri="{91240B29-F687-4f45-9708-019B960494DF}">
-                <a14:hiddenLine xmlns:p14="http://schemas.microsoft.com/office/powerpoint/2010/main" xmlns:a14="http://schemas.microsoft.com/office/drawing/2010/main" xmlns:a16="http://schemas.microsoft.com/office/drawing/2014/main" xmlns="" w="9525">
+                <a14:hiddenLine xmlns="" xmlns:a16="http://schemas.microsoft.com/office/drawing/2014/main" xmlns:a14="http://schemas.microsoft.com/office/drawing/2010/main" xmlns:p14="http://schemas.microsoft.com/office/powerpoint/2010/main" w="9525">
                   <a:solidFill>
                     <a:srgbClr val="000000"/>
                   </a:solidFill>
@@ -28354,7 +28669,7 @@
             </a:ln>
             <a:extLst>
               <a:ext uri="{91240B29-F687-4f45-9708-019B960494DF}">
-                <a14:hiddenLine xmlns:p14="http://schemas.microsoft.com/office/powerpoint/2010/main" xmlns:a14="http://schemas.microsoft.com/office/drawing/2010/main" xmlns:a16="http://schemas.microsoft.com/office/drawing/2014/main" xmlns="" w="9525">
+                <a14:hiddenLine xmlns="" xmlns:a16="http://schemas.microsoft.com/office/drawing/2014/main" xmlns:a14="http://schemas.microsoft.com/office/drawing/2010/main" xmlns:p14="http://schemas.microsoft.com/office/powerpoint/2010/main" w="9525">
                   <a:solidFill>
                     <a:srgbClr val="000000"/>
                   </a:solidFill>
@@ -28459,7 +28774,7 @@
             </a:ln>
             <a:extLst>
               <a:ext uri="{91240B29-F687-4f45-9708-019B960494DF}">
-                <a14:hiddenLine xmlns:p14="http://schemas.microsoft.com/office/powerpoint/2010/main" xmlns:a14="http://schemas.microsoft.com/office/drawing/2010/main" xmlns:a16="http://schemas.microsoft.com/office/drawing/2014/main" xmlns="" w="9525">
+                <a14:hiddenLine xmlns="" xmlns:a16="http://schemas.microsoft.com/office/drawing/2014/main" xmlns:a14="http://schemas.microsoft.com/office/drawing/2010/main" xmlns:p14="http://schemas.microsoft.com/office/powerpoint/2010/main" w="9525">
                   <a:solidFill>
                     <a:srgbClr val="000000"/>
                   </a:solidFill>
@@ -28564,7 +28879,7 @@
             </a:ln>
             <a:extLst>
               <a:ext uri="{91240B29-F687-4f45-9708-019B960494DF}">
-                <a14:hiddenLine xmlns:p14="http://schemas.microsoft.com/office/powerpoint/2010/main" xmlns:a14="http://schemas.microsoft.com/office/drawing/2010/main" xmlns:a16="http://schemas.microsoft.com/office/drawing/2014/main" xmlns="" w="9525">
+                <a14:hiddenLine xmlns="" xmlns:a16="http://schemas.microsoft.com/office/drawing/2014/main" xmlns:a14="http://schemas.microsoft.com/office/drawing/2010/main" xmlns:p14="http://schemas.microsoft.com/office/powerpoint/2010/main" w="9525">
                   <a:solidFill>
                     <a:srgbClr val="000000"/>
                   </a:solidFill>
@@ -28644,7 +28959,7 @@
             </a:ln>
             <a:extLst>
               <a:ext uri="{91240B29-F687-4f45-9708-019B960494DF}">
-                <a14:hiddenLine xmlns:p14="http://schemas.microsoft.com/office/powerpoint/2010/main" xmlns:a14="http://schemas.microsoft.com/office/drawing/2010/main" xmlns:a16="http://schemas.microsoft.com/office/drawing/2014/main" xmlns="" w="9525">
+                <a14:hiddenLine xmlns="" xmlns:a16="http://schemas.microsoft.com/office/drawing/2014/main" xmlns:a14="http://schemas.microsoft.com/office/drawing/2010/main" xmlns:p14="http://schemas.microsoft.com/office/powerpoint/2010/main" w="9525">
                   <a:solidFill>
                     <a:srgbClr val="000000"/>
                   </a:solidFill>
@@ -28721,7 +29036,7 @@
             </a:ln>
             <a:extLst>
               <a:ext uri="{91240B29-F687-4f45-9708-019B960494DF}">
-                <a14:hiddenLine xmlns:p14="http://schemas.microsoft.com/office/powerpoint/2010/main" xmlns:a14="http://schemas.microsoft.com/office/drawing/2010/main" xmlns:a16="http://schemas.microsoft.com/office/drawing/2014/main" xmlns="" w="9525">
+                <a14:hiddenLine xmlns="" xmlns:a16="http://schemas.microsoft.com/office/drawing/2014/main" xmlns:a14="http://schemas.microsoft.com/office/drawing/2010/main" xmlns:p14="http://schemas.microsoft.com/office/powerpoint/2010/main" w="9525">
                   <a:solidFill>
                     <a:srgbClr val="000000"/>
                   </a:solidFill>
@@ -28826,7 +29141,7 @@
             </a:ln>
             <a:extLst>
               <a:ext uri="{91240B29-F687-4f45-9708-019B960494DF}">
-                <a14:hiddenLine xmlns:p14="http://schemas.microsoft.com/office/powerpoint/2010/main" xmlns:a14="http://schemas.microsoft.com/office/drawing/2010/main" xmlns:a16="http://schemas.microsoft.com/office/drawing/2014/main" xmlns="" w="9525">
+                <a14:hiddenLine xmlns="" xmlns:a16="http://schemas.microsoft.com/office/drawing/2014/main" xmlns:a14="http://schemas.microsoft.com/office/drawing/2010/main" xmlns:p14="http://schemas.microsoft.com/office/powerpoint/2010/main" w="9525">
                   <a:solidFill>
                     <a:srgbClr val="000000"/>
                   </a:solidFill>
@@ -28931,7 +29246,7 @@
             </a:ln>
             <a:extLst>
               <a:ext uri="{91240B29-F687-4f45-9708-019B960494DF}">
-                <a14:hiddenLine xmlns:p14="http://schemas.microsoft.com/office/powerpoint/2010/main" xmlns:a14="http://schemas.microsoft.com/office/drawing/2010/main" xmlns:a16="http://schemas.microsoft.com/office/drawing/2014/main" xmlns="" w="9525">
+                <a14:hiddenLine xmlns="" xmlns:a16="http://schemas.microsoft.com/office/drawing/2014/main" xmlns:a14="http://schemas.microsoft.com/office/drawing/2010/main" xmlns:p14="http://schemas.microsoft.com/office/powerpoint/2010/main" w="9525">
                   <a:solidFill>
                     <a:srgbClr val="000000"/>
                   </a:solidFill>
@@ -29008,7 +29323,7 @@
             </a:ln>
             <a:extLst>
               <a:ext uri="{91240B29-F687-4f45-9708-019B960494DF}">
-                <a14:hiddenLine xmlns:p14="http://schemas.microsoft.com/office/powerpoint/2010/main" xmlns:a14="http://schemas.microsoft.com/office/drawing/2010/main" xmlns:a16="http://schemas.microsoft.com/office/drawing/2014/main" xmlns="" w="9525">
+                <a14:hiddenLine xmlns="" xmlns:a16="http://schemas.microsoft.com/office/drawing/2014/main" xmlns:a14="http://schemas.microsoft.com/office/drawing/2010/main" xmlns:p14="http://schemas.microsoft.com/office/powerpoint/2010/main" w="9525">
                   <a:solidFill>
                     <a:srgbClr val="000000"/>
                   </a:solidFill>
@@ -29143,7 +29458,7 @@
             </a:ln>
             <a:extLst>
               <a:ext uri="{91240B29-F687-4f45-9708-019B960494DF}">
-                <a14:hiddenLine xmlns:p14="http://schemas.microsoft.com/office/powerpoint/2010/main" xmlns:a14="http://schemas.microsoft.com/office/drawing/2010/main" xmlns:a16="http://schemas.microsoft.com/office/drawing/2014/main" xmlns="" w="9525">
+                <a14:hiddenLine xmlns="" xmlns:a16="http://schemas.microsoft.com/office/drawing/2014/main" xmlns:a14="http://schemas.microsoft.com/office/drawing/2010/main" xmlns:p14="http://schemas.microsoft.com/office/powerpoint/2010/main" w="9525">
                   <a:solidFill>
                     <a:srgbClr val="000000"/>
                   </a:solidFill>
@@ -29226,7 +29541,7 @@
             </a:ln>
             <a:extLst>
               <a:ext uri="{91240B29-F687-4f45-9708-019B960494DF}">
-                <a14:hiddenLine xmlns:p14="http://schemas.microsoft.com/office/powerpoint/2010/main" xmlns:a14="http://schemas.microsoft.com/office/drawing/2010/main" xmlns:a16="http://schemas.microsoft.com/office/drawing/2014/main" xmlns="" w="9525">
+                <a14:hiddenLine xmlns="" xmlns:a16="http://schemas.microsoft.com/office/drawing/2014/main" xmlns:a14="http://schemas.microsoft.com/office/drawing/2010/main" xmlns:p14="http://schemas.microsoft.com/office/powerpoint/2010/main" w="9525">
                   <a:solidFill>
                     <a:srgbClr val="000000"/>
                   </a:solidFill>
@@ -29331,7 +29646,7 @@
             </a:ln>
             <a:extLst>
               <a:ext uri="{91240B29-F687-4f45-9708-019B960494DF}">
-                <a14:hiddenLine xmlns:p14="http://schemas.microsoft.com/office/powerpoint/2010/main" xmlns:a14="http://schemas.microsoft.com/office/drawing/2010/main" xmlns:a16="http://schemas.microsoft.com/office/drawing/2014/main" xmlns="" w="9525">
+                <a14:hiddenLine xmlns="" xmlns:a16="http://schemas.microsoft.com/office/drawing/2014/main" xmlns:a14="http://schemas.microsoft.com/office/drawing/2010/main" xmlns:p14="http://schemas.microsoft.com/office/powerpoint/2010/main" w="9525">
                   <a:solidFill>
                     <a:srgbClr val="000000"/>
                   </a:solidFill>
@@ -29461,7 +29776,7 @@
             </a:ln>
             <a:extLst>
               <a:ext uri="{91240B29-F687-4f45-9708-019B960494DF}">
-                <a14:hiddenLine xmlns:p14="http://schemas.microsoft.com/office/powerpoint/2010/main" xmlns:a14="http://schemas.microsoft.com/office/drawing/2010/main" xmlns:a16="http://schemas.microsoft.com/office/drawing/2014/main" xmlns="" w="9525">
+                <a14:hiddenLine xmlns="" xmlns:a16="http://schemas.microsoft.com/office/drawing/2014/main" xmlns:a14="http://schemas.microsoft.com/office/drawing/2010/main" xmlns:p14="http://schemas.microsoft.com/office/powerpoint/2010/main" w="9525">
                   <a:solidFill>
                     <a:srgbClr val="000000"/>
                   </a:solidFill>
@@ -29591,7 +29906,7 @@
             </a:ln>
             <a:extLst>
               <a:ext uri="{91240B29-F687-4f45-9708-019B960494DF}">
-                <a14:hiddenLine xmlns:p14="http://schemas.microsoft.com/office/powerpoint/2010/main" xmlns:a14="http://schemas.microsoft.com/office/drawing/2010/main" xmlns:a16="http://schemas.microsoft.com/office/drawing/2014/main" xmlns="" w="9525">
+                <a14:hiddenLine xmlns="" xmlns:a16="http://schemas.microsoft.com/office/drawing/2014/main" xmlns:a14="http://schemas.microsoft.com/office/drawing/2010/main" xmlns:p14="http://schemas.microsoft.com/office/powerpoint/2010/main" w="9525">
                   <a:solidFill>
                     <a:srgbClr val="000000"/>
                   </a:solidFill>
@@ -29696,7 +30011,7 @@
             </a:ln>
             <a:extLst>
               <a:ext uri="{91240B29-F687-4f45-9708-019B960494DF}">
-                <a14:hiddenLine xmlns:p14="http://schemas.microsoft.com/office/powerpoint/2010/main" xmlns:a14="http://schemas.microsoft.com/office/drawing/2010/main" xmlns:a16="http://schemas.microsoft.com/office/drawing/2014/main" xmlns="" w="9525">
+                <a14:hiddenLine xmlns="" xmlns:a16="http://schemas.microsoft.com/office/drawing/2014/main" xmlns:a14="http://schemas.microsoft.com/office/drawing/2010/main" xmlns:p14="http://schemas.microsoft.com/office/powerpoint/2010/main" w="9525">
                   <a:solidFill>
                     <a:srgbClr val="000000"/>
                   </a:solidFill>
@@ -29776,7 +30091,7 @@
             </a:ln>
             <a:extLst>
               <a:ext uri="{91240B29-F687-4f45-9708-019B960494DF}">
-                <a14:hiddenLine xmlns:p14="http://schemas.microsoft.com/office/powerpoint/2010/main" xmlns:a14="http://schemas.microsoft.com/office/drawing/2010/main" xmlns:a16="http://schemas.microsoft.com/office/drawing/2014/main" xmlns="" w="9525">
+                <a14:hiddenLine xmlns="" xmlns:a16="http://schemas.microsoft.com/office/drawing/2014/main" xmlns:a14="http://schemas.microsoft.com/office/drawing/2010/main" xmlns:p14="http://schemas.microsoft.com/office/powerpoint/2010/main" w="9525">
                   <a:solidFill>
                     <a:srgbClr val="000000"/>
                   </a:solidFill>
@@ -29881,7 +30196,7 @@
             </a:ln>
             <a:extLst>
               <a:ext uri="{91240B29-F687-4f45-9708-019B960494DF}">
-                <a14:hiddenLine xmlns:p14="http://schemas.microsoft.com/office/powerpoint/2010/main" xmlns:a14="http://schemas.microsoft.com/office/drawing/2010/main" xmlns:a16="http://schemas.microsoft.com/office/drawing/2014/main" xmlns="" w="9525">
+                <a14:hiddenLine xmlns="" xmlns:a16="http://schemas.microsoft.com/office/drawing/2014/main" xmlns:a14="http://schemas.microsoft.com/office/drawing/2010/main" xmlns:p14="http://schemas.microsoft.com/office/powerpoint/2010/main" w="9525">
                   <a:solidFill>
                     <a:srgbClr val="000000"/>
                   </a:solidFill>
@@ -29964,7 +30279,7 @@
             </a:ln>
             <a:extLst>
               <a:ext uri="{91240B29-F687-4f45-9708-019B960494DF}">
-                <a14:hiddenLine xmlns:p14="http://schemas.microsoft.com/office/powerpoint/2010/main" xmlns:a14="http://schemas.microsoft.com/office/drawing/2010/main" xmlns:a16="http://schemas.microsoft.com/office/drawing/2014/main" xmlns="" w="9525">
+                <a14:hiddenLine xmlns="" xmlns:a16="http://schemas.microsoft.com/office/drawing/2014/main" xmlns:a14="http://schemas.microsoft.com/office/drawing/2010/main" xmlns:p14="http://schemas.microsoft.com/office/powerpoint/2010/main" w="9525">
                   <a:solidFill>
                     <a:srgbClr val="000000"/>
                   </a:solidFill>
@@ -30069,7 +30384,7 @@
             </a:ln>
             <a:extLst>
               <a:ext uri="{91240B29-F687-4f45-9708-019B960494DF}">
-                <a14:hiddenLine xmlns:p14="http://schemas.microsoft.com/office/powerpoint/2010/main" xmlns:a14="http://schemas.microsoft.com/office/drawing/2010/main" xmlns:a16="http://schemas.microsoft.com/office/drawing/2014/main" xmlns="" w="9525">
+                <a14:hiddenLine xmlns="" xmlns:a16="http://schemas.microsoft.com/office/drawing/2014/main" xmlns:a14="http://schemas.microsoft.com/office/drawing/2010/main" xmlns:p14="http://schemas.microsoft.com/office/powerpoint/2010/main" w="9525">
                   <a:solidFill>
                     <a:srgbClr val="000000"/>
                   </a:solidFill>
@@ -30152,7 +30467,7 @@
             </a:ln>
             <a:extLst>
               <a:ext uri="{91240B29-F687-4f45-9708-019B960494DF}">
-                <a14:hiddenLine xmlns:p14="http://schemas.microsoft.com/office/powerpoint/2010/main" xmlns:a14="http://schemas.microsoft.com/office/drawing/2010/main" xmlns:a16="http://schemas.microsoft.com/office/drawing/2014/main" xmlns="" w="9525">
+                <a14:hiddenLine xmlns="" xmlns:a16="http://schemas.microsoft.com/office/drawing/2014/main" xmlns:a14="http://schemas.microsoft.com/office/drawing/2010/main" xmlns:p14="http://schemas.microsoft.com/office/powerpoint/2010/main" w="9525">
                   <a:solidFill>
                     <a:srgbClr val="000000"/>
                   </a:solidFill>
@@ -30257,7 +30572,7 @@
             </a:ln>
             <a:extLst>
               <a:ext uri="{91240B29-F687-4f45-9708-019B960494DF}">
-                <a14:hiddenLine xmlns:p14="http://schemas.microsoft.com/office/powerpoint/2010/main" xmlns:a14="http://schemas.microsoft.com/office/drawing/2010/main" xmlns:a16="http://schemas.microsoft.com/office/drawing/2014/main" xmlns="" w="9525">
+                <a14:hiddenLine xmlns="" xmlns:a16="http://schemas.microsoft.com/office/drawing/2014/main" xmlns:a14="http://schemas.microsoft.com/office/drawing/2010/main" xmlns:p14="http://schemas.microsoft.com/office/powerpoint/2010/main" w="9525">
                   <a:solidFill>
                     <a:srgbClr val="000000"/>
                   </a:solidFill>
@@ -30306,7 +30621,7 @@
             </a:ln>
             <a:extLst>
               <a:ext uri="{91240B29-F687-4f45-9708-019B960494DF}">
-                <a14:hiddenLine xmlns:p14="http://schemas.microsoft.com/office/powerpoint/2010/main" xmlns:a14="http://schemas.microsoft.com/office/drawing/2010/main" xmlns:a16="http://schemas.microsoft.com/office/drawing/2014/main" xmlns="" w="9525">
+                <a14:hiddenLine xmlns="" xmlns:a16="http://schemas.microsoft.com/office/drawing/2014/main" xmlns:a14="http://schemas.microsoft.com/office/drawing/2010/main" xmlns:p14="http://schemas.microsoft.com/office/powerpoint/2010/main" w="9525">
                   <a:solidFill>
                     <a:srgbClr val="000000"/>
                   </a:solidFill>
@@ -30717,7 +31032,7 @@
           <p:cNvPr id="2" name="Title 1">
             <a:extLst>
               <a:ext uri="{FF2B5EF4-FFF2-40B4-BE49-F238E27FC236}">
-                <a16:creationId xmlns:a16="http://schemas.microsoft.com/office/drawing/2014/main" id="{55820EE6-6D5F-4C0D-8770-0CC1440B0117}"/>
+                <a16:creationId xmlns:a16="http://schemas.microsoft.com/office/drawing/2014/main" id="{0F9427A7-8023-45ED-8265-E55740E66921}"/>
               </a:ext>
             </a:extLst>
           </p:cNvPr>
@@ -30735,40 +31050,47 @@
           <a:p>
             <a:r>
               <a:rPr lang="en-US" dirty="0"/>
-              <a:t>EXPLORATORY DATA ANALYSIS</a:t>
+              <a:t>Exploratory data analysis</a:t>
             </a:r>
           </a:p>
         </p:txBody>
       </p:sp>
-      <p:sp>
-        <p:nvSpPr>
-          <p:cNvPr id="3" name="Content Placeholder 2">
+      <p:pic>
+        <p:nvPicPr>
+          <p:cNvPr id="4" name="Content Placeholder 3">
             <a:extLst>
               <a:ext uri="{FF2B5EF4-FFF2-40B4-BE49-F238E27FC236}">
-                <a16:creationId xmlns:a16="http://schemas.microsoft.com/office/drawing/2014/main" id="{3C70AF10-ED1F-44E8-8703-0BA8C1E61740}"/>
+                <a16:creationId xmlns:a16="http://schemas.microsoft.com/office/drawing/2014/main" id="{B05C0AB2-A04F-4C7B-928F-0F9F7A230523}"/>
               </a:ext>
             </a:extLst>
           </p:cNvPr>
-          <p:cNvSpPr>
-            <a:spLocks noGrp="1"/>
-          </p:cNvSpPr>
+          <p:cNvPicPr>
+            <a:picLocks noGrp="1" noChangeAspect="1"/>
+          </p:cNvPicPr>
           <p:nvPr>
             <p:ph idx="1"/>
           </p:nvPr>
-        </p:nvSpPr>
-        <p:spPr/>
-        <p:txBody>
-          <a:bodyPr/>
-          <a:lstStyle/>
-          <a:p>
-            <a:endParaRPr lang="en-US"/>
-          </a:p>
-        </p:txBody>
-      </p:sp>
+        </p:nvPicPr>
+        <p:blipFill>
+          <a:blip r:embed="rId2"/>
+          <a:stretch>
+            <a:fillRect/>
+          </a:stretch>
+        </p:blipFill>
+        <p:spPr>
+          <a:xfrm>
+            <a:off x="1335024" y="1772038"/>
+            <a:ext cx="7522464" cy="4642435"/>
+          </a:xfrm>
+          <a:prstGeom prst="rect">
+            <a:avLst/>
+          </a:prstGeom>
+        </p:spPr>
+      </p:pic>
     </p:spTree>
     <p:extLst>
       <p:ext uri="{BB962C8B-B14F-4D97-AF65-F5344CB8AC3E}">
-        <p14:creationId xmlns:p14="http://schemas.microsoft.com/office/powerpoint/2010/main" val="2133803405"/>
+        <p14:creationId xmlns:p14="http://schemas.microsoft.com/office/powerpoint/2010/main" val="1915982763"/>
       </p:ext>
     </p:extLst>
   </p:cSld>
@@ -30800,7 +31122,7 @@
           <p:cNvPr id="2" name="Title 1">
             <a:extLst>
               <a:ext uri="{FF2B5EF4-FFF2-40B4-BE49-F238E27FC236}">
-                <a16:creationId xmlns:a16="http://schemas.microsoft.com/office/drawing/2014/main" id="{0F9427A7-8023-45ED-8265-E55740E66921}"/>
+                <a16:creationId xmlns:a16="http://schemas.microsoft.com/office/drawing/2014/main" id="{55820EE6-6D5F-4C0D-8770-0CC1440B0117}"/>
               </a:ext>
             </a:extLst>
           </p:cNvPr>
@@ -30818,40 +31140,47 @@
           <a:p>
             <a:r>
               <a:rPr lang="en-US" dirty="0"/>
-              <a:t>CODE</a:t>
+              <a:t>EXPLORATORY DATA ANALYSIS</a:t>
             </a:r>
           </a:p>
         </p:txBody>
       </p:sp>
-      <p:sp>
-        <p:nvSpPr>
-          <p:cNvPr id="3" name="Content Placeholder 2">
+      <p:pic>
+        <p:nvPicPr>
+          <p:cNvPr id="4" name="Content Placeholder 3">
             <a:extLst>
               <a:ext uri="{FF2B5EF4-FFF2-40B4-BE49-F238E27FC236}">
-                <a16:creationId xmlns:a16="http://schemas.microsoft.com/office/drawing/2014/main" id="{FDC0D1DC-DC8F-4240-8CB1-485F38454B60}"/>
+                <a16:creationId xmlns:a16="http://schemas.microsoft.com/office/drawing/2014/main" id="{2EFE59C8-26E7-4DAB-9256-51FDBB3D724F}"/>
               </a:ext>
             </a:extLst>
           </p:cNvPr>
-          <p:cNvSpPr>
-            <a:spLocks noGrp="1"/>
-          </p:cNvSpPr>
+          <p:cNvPicPr>
+            <a:picLocks noGrp="1" noChangeAspect="1"/>
+          </p:cNvPicPr>
           <p:nvPr>
             <p:ph idx="1"/>
           </p:nvPr>
-        </p:nvSpPr>
-        <p:spPr/>
-        <p:txBody>
-          <a:bodyPr/>
-          <a:lstStyle/>
-          <a:p>
-            <a:endParaRPr lang="en-US"/>
-          </a:p>
-        </p:txBody>
-      </p:sp>
+        </p:nvPicPr>
+        <p:blipFill>
+          <a:blip r:embed="rId2"/>
+          <a:stretch>
+            <a:fillRect/>
+          </a:stretch>
+        </p:blipFill>
+        <p:spPr>
+          <a:xfrm>
+            <a:off x="1141414" y="1769322"/>
+            <a:ext cx="8569514" cy="4948289"/>
+          </a:xfrm>
+          <a:prstGeom prst="rect">
+            <a:avLst/>
+          </a:prstGeom>
+        </p:spPr>
+      </p:pic>
     </p:spTree>
     <p:extLst>
       <p:ext uri="{BB962C8B-B14F-4D97-AF65-F5344CB8AC3E}">
-        <p14:creationId xmlns:p14="http://schemas.microsoft.com/office/powerpoint/2010/main" val="1915982763"/>
+        <p14:creationId xmlns:p14="http://schemas.microsoft.com/office/powerpoint/2010/main" val="2133803405"/>
       </p:ext>
     </p:extLst>
   </p:cSld>
@@ -30878,79 +31207,70 @@
           <a:chExt cx="0" cy="0"/>
         </a:xfrm>
       </p:grpSpPr>
-      <p:graphicFrame>
-        <p:nvGraphicFramePr>
-          <p:cNvPr id="5" name="Object 4">
+      <p:sp>
+        <p:nvSpPr>
+          <p:cNvPr id="2" name="Title 1">
             <a:extLst>
               <a:ext uri="{FF2B5EF4-FFF2-40B4-BE49-F238E27FC236}">
-                <a16:creationId xmlns:a16="http://schemas.microsoft.com/office/drawing/2014/main" id="{E7591E42-1D4C-4E6A-AFDD-62C7CE348B08}"/>
+                <a16:creationId xmlns:a16="http://schemas.microsoft.com/office/drawing/2014/main" id="{E4B3DB3B-B2AB-4A38-8C8B-02936BF3F5A5}"/>
               </a:ext>
             </a:extLst>
           </p:cNvPr>
-          <p:cNvGraphicFramePr>
-            <a:graphicFrameLocks noChangeAspect="1"/>
-          </p:cNvGraphicFramePr>
+          <p:cNvSpPr>
+            <a:spLocks noGrp="1"/>
+          </p:cNvSpPr>
           <p:nvPr>
-            <p:extLst>
-              <p:ext uri="{D42A27DB-BD31-4B8C-83A1-F6EECF244321}">
-                <p14:modId xmlns:p14="http://schemas.microsoft.com/office/powerpoint/2010/main" val="1309017066"/>
-              </p:ext>
-            </p:extLst>
+            <p:ph type="title"/>
           </p:nvPr>
-        </p:nvGraphicFramePr>
-        <p:xfrm>
-          <a:off x="1243584" y="0"/>
-          <a:ext cx="10040112" cy="6858000"/>
-        </p:xfrm>
-        <a:graphic>
-          <a:graphicData uri="http://schemas.openxmlformats.org/presentationml/2006/ole">
-            <mc:AlternateContent xmlns:mc="http://schemas.openxmlformats.org/markup-compatibility/2006">
-              <mc:Choice xmlns:v="urn:schemas-microsoft-com:vml" Requires="v">
-                <p:oleObj spid="_x0000_s1026" name="Acrobat Document" r:id="rId3" imgW="2914254" imgH="3771477" progId="AcroExch.Document.DC">
-                  <p:embed/>
-                </p:oleObj>
-              </mc:Choice>
-              <mc:Fallback>
-                <p:oleObj name="Acrobat Document" r:id="rId3" imgW="2914254" imgH="3771477" progId="AcroExch.Document.DC">
-                  <p:embed/>
-                  <p:pic>
-                    <p:nvPicPr>
-                      <p:cNvPr id="5" name="Object 4">
-                        <a:extLst>
-                          <a:ext uri="{FF2B5EF4-FFF2-40B4-BE49-F238E27FC236}">
-                            <a16:creationId xmlns:a16="http://schemas.microsoft.com/office/drawing/2014/main" id="{E7591E42-1D4C-4E6A-AFDD-62C7CE348B08}"/>
-                          </a:ext>
-                        </a:extLst>
-                      </p:cNvPr>
-                      <p:cNvPicPr/>
-                      <p:nvPr/>
-                    </p:nvPicPr>
-                    <p:blipFill>
-                      <a:blip r:embed="rId4"/>
-                      <a:stretch>
-                        <a:fillRect/>
-                      </a:stretch>
-                    </p:blipFill>
-                    <p:spPr>
-                      <a:xfrm>
-                        <a:off x="1243584" y="0"/>
-                        <a:ext cx="10040112" cy="6858000"/>
-                      </a:xfrm>
-                      <a:prstGeom prst="rect">
-                        <a:avLst/>
-                      </a:prstGeom>
-                    </p:spPr>
-                  </p:pic>
-                </p:oleObj>
-              </mc:Fallback>
-            </mc:AlternateContent>
-          </a:graphicData>
-        </a:graphic>
-      </p:graphicFrame>
+        </p:nvSpPr>
+        <p:spPr/>
+        <p:txBody>
+          <a:bodyPr/>
+          <a:lstStyle/>
+          <a:p>
+            <a:r>
+              <a:rPr lang="en-US" dirty="0"/>
+              <a:t>Exploratory data analysis</a:t>
+            </a:r>
+          </a:p>
+        </p:txBody>
+      </p:sp>
+      <p:pic>
+        <p:nvPicPr>
+          <p:cNvPr id="4" name="Content Placeholder 3">
+            <a:extLst>
+              <a:ext uri="{FF2B5EF4-FFF2-40B4-BE49-F238E27FC236}">
+                <a16:creationId xmlns:a16="http://schemas.microsoft.com/office/drawing/2014/main" id="{43B25065-39CA-4091-974B-313A408C02A3}"/>
+              </a:ext>
+            </a:extLst>
+          </p:cNvPr>
+          <p:cNvPicPr>
+            <a:picLocks noGrp="1" noChangeAspect="1"/>
+          </p:cNvPicPr>
+          <p:nvPr>
+            <p:ph idx="1"/>
+          </p:nvPr>
+        </p:nvPicPr>
+        <p:blipFill>
+          <a:blip r:embed="rId2"/>
+          <a:stretch>
+            <a:fillRect/>
+          </a:stretch>
+        </p:blipFill>
+        <p:spPr>
+          <a:xfrm>
+            <a:off x="1214652" y="2317300"/>
+            <a:ext cx="8727924" cy="4036005"/>
+          </a:xfrm>
+          <a:prstGeom prst="rect">
+            <a:avLst/>
+          </a:prstGeom>
+        </p:spPr>
+      </p:pic>
     </p:spTree>
     <p:extLst>
       <p:ext uri="{BB962C8B-B14F-4D97-AF65-F5344CB8AC3E}">
-        <p14:creationId xmlns:p14="http://schemas.microsoft.com/office/powerpoint/2010/main" val="1068772232"/>
+        <p14:creationId xmlns:p14="http://schemas.microsoft.com/office/powerpoint/2010/main" val="2429492815"/>
       </p:ext>
     </p:extLst>
   </p:cSld>
@@ -30982,7 +31302,7 @@
           <p:cNvPr id="2" name="Title 1">
             <a:extLst>
               <a:ext uri="{FF2B5EF4-FFF2-40B4-BE49-F238E27FC236}">
-                <a16:creationId xmlns:a16="http://schemas.microsoft.com/office/drawing/2014/main" id="{47A035B7-AA91-47B2-875A-FCCE9CCE653D}"/>
+                <a16:creationId xmlns:a16="http://schemas.microsoft.com/office/drawing/2014/main" id="{6E75AD97-4409-4126-B4CA-F89338D54DD9}"/>
               </a:ext>
             </a:extLst>
           </p:cNvPr>
@@ -31000,22 +31320,17 @@
           <a:p>
             <a:r>
               <a:rPr lang="en-US" dirty="0"/>
-              <a:t>Variables </a:t>
+              <a:t>Exploratory data analysis</a:t>
             </a:r>
-            <a:r>
-              <a:rPr lang="en-US"/>
-              <a:t>by importance</a:t>
-            </a:r>
-            <a:endParaRPr lang="en-US" dirty="0"/>
           </a:p>
         </p:txBody>
       </p:sp>
       <p:pic>
         <p:nvPicPr>
-          <p:cNvPr id="5" name="Content Placeholder 4">
+          <p:cNvPr id="4" name="Content Placeholder 3">
             <a:extLst>
               <a:ext uri="{FF2B5EF4-FFF2-40B4-BE49-F238E27FC236}">
-                <a16:creationId xmlns:a16="http://schemas.microsoft.com/office/drawing/2014/main" id="{31620787-4E64-459B-B76D-9D620375F254}"/>
+                <a16:creationId xmlns:a16="http://schemas.microsoft.com/office/drawing/2014/main" id="{18DAE568-E662-4121-906B-80778C342151}"/>
               </a:ext>
             </a:extLst>
           </p:cNvPr>
@@ -31027,28 +31342,25 @@
           </p:nvPr>
         </p:nvPicPr>
         <p:blipFill>
-          <a:blip r:embed="rId2">
-            <a:extLst>
-              <a:ext uri="{28A0092B-C50C-407E-A947-70E740481C1C}">
-                <a14:useLocalDpi xmlns:a14="http://schemas.microsoft.com/office/drawing/2010/main" val="0"/>
-              </a:ext>
-            </a:extLst>
-          </a:blip>
+          <a:blip r:embed="rId2"/>
           <a:stretch>
             <a:fillRect/>
           </a:stretch>
         </p:blipFill>
         <p:spPr>
           <a:xfrm>
-            <a:off x="3880843" y="2249488"/>
-            <a:ext cx="4427139" cy="3541712"/>
+            <a:off x="1141413" y="1859280"/>
+            <a:ext cx="10203243" cy="4579276"/>
           </a:xfrm>
+          <a:prstGeom prst="rect">
+            <a:avLst/>
+          </a:prstGeom>
         </p:spPr>
       </p:pic>
     </p:spTree>
     <p:extLst>
       <p:ext uri="{BB962C8B-B14F-4D97-AF65-F5344CB8AC3E}">
-        <p14:creationId xmlns:p14="http://schemas.microsoft.com/office/powerpoint/2010/main" val="909329800"/>
+        <p14:creationId xmlns:p14="http://schemas.microsoft.com/office/powerpoint/2010/main" val="730624188"/>
       </p:ext>
     </p:extLst>
   </p:cSld>

</xml_diff>

<commit_message>
final cleanup, ready to present
</commit_message>
<xml_diff>
--- a/Presentation & Dashboard/DDS401_TeamNI_Case_Study_2.pptx
+++ b/Presentation & Dashboard/DDS401_TeamNI_Case_Study_2.pptx
@@ -10655,7 +10655,7 @@
           <a:noFill/>
           <a:extLst>
             <a:ext uri="{909E8E84-426E-40dd-AFC4-6F175D3DCCD1}">
-              <a14:hiddenFill xmlns:a14="http://schemas.microsoft.com/office/drawing/2010/main" xmlns="">
+              <a14:hiddenFill xmlns="" xmlns:a14="http://schemas.microsoft.com/office/drawing/2010/main">
                 <a:solidFill>
                   <a:srgbClr val="FFFFFF"/>
                 </a:solidFill>
@@ -10714,7 +10714,7 @@
             </a:ln>
             <a:extLst>
               <a:ext uri="{91240B29-F687-4f45-9708-019B960494DF}">
-                <a14:hiddenLine xmlns:a14="http://schemas.microsoft.com/office/drawing/2010/main" xmlns="" w="9525">
+                <a14:hiddenLine xmlns="" xmlns:a14="http://schemas.microsoft.com/office/drawing/2010/main" w="9525">
                   <a:solidFill>
                     <a:srgbClr val="000000"/>
                   </a:solidFill>
@@ -10804,7 +10804,7 @@
             </a:ln>
             <a:extLst>
               <a:ext uri="{91240B29-F687-4f45-9708-019B960494DF}">
-                <a14:hiddenLine xmlns:a14="http://schemas.microsoft.com/office/drawing/2010/main" xmlns="" w="9525">
+                <a14:hiddenLine xmlns="" xmlns:a14="http://schemas.microsoft.com/office/drawing/2010/main" w="9525">
                   <a:solidFill>
                     <a:srgbClr val="000000"/>
                   </a:solidFill>
@@ -10894,7 +10894,7 @@
             </a:ln>
             <a:extLst>
               <a:ext uri="{91240B29-F687-4f45-9708-019B960494DF}">
-                <a14:hiddenLine xmlns:a14="http://schemas.microsoft.com/office/drawing/2010/main" xmlns="" w="9525">
+                <a14:hiddenLine xmlns="" xmlns:a14="http://schemas.microsoft.com/office/drawing/2010/main" w="9525">
                   <a:solidFill>
                     <a:srgbClr val="000000"/>
                   </a:solidFill>
@@ -10928,7 +10928,7 @@
             </a:ln>
             <a:extLst>
               <a:ext uri="{91240B29-F687-4f45-9708-019B960494DF}">
-                <a14:hiddenLine xmlns:a14="http://schemas.microsoft.com/office/drawing/2010/main" xmlns="" w="9525">
+                <a14:hiddenLine xmlns="" xmlns:a14="http://schemas.microsoft.com/office/drawing/2010/main" w="9525">
                   <a:solidFill>
                     <a:srgbClr val="000000"/>
                   </a:solidFill>
@@ -11018,7 +11018,7 @@
             </a:ln>
             <a:extLst>
               <a:ext uri="{91240B29-F687-4f45-9708-019B960494DF}">
-                <a14:hiddenLine xmlns:a14="http://schemas.microsoft.com/office/drawing/2010/main" xmlns="" w="9525">
+                <a14:hiddenLine xmlns="" xmlns:a14="http://schemas.microsoft.com/office/drawing/2010/main" w="9525">
                   <a:solidFill>
                     <a:srgbClr val="000000"/>
                   </a:solidFill>
@@ -11080,7 +11080,7 @@
             </a:ln>
             <a:extLst>
               <a:ext uri="{91240B29-F687-4f45-9708-019B960494DF}">
-                <a14:hiddenLine xmlns:a14="http://schemas.microsoft.com/office/drawing/2010/main" xmlns="" w="9525">
+                <a14:hiddenLine xmlns="" xmlns:a14="http://schemas.microsoft.com/office/drawing/2010/main" w="9525">
                   <a:solidFill>
                     <a:srgbClr val="000000"/>
                   </a:solidFill>
@@ -11142,7 +11142,7 @@
             </a:ln>
             <a:extLst>
               <a:ext uri="{91240B29-F687-4f45-9708-019B960494DF}">
-                <a14:hiddenLine xmlns:a14="http://schemas.microsoft.com/office/drawing/2010/main" xmlns="" w="9525">
+                <a14:hiddenLine xmlns="" xmlns:a14="http://schemas.microsoft.com/office/drawing/2010/main" w="9525">
                   <a:solidFill>
                     <a:srgbClr val="000000"/>
                   </a:solidFill>
@@ -11232,7 +11232,7 @@
             </a:ln>
             <a:extLst>
               <a:ext uri="{91240B29-F687-4f45-9708-019B960494DF}">
-                <a14:hiddenLine xmlns:a14="http://schemas.microsoft.com/office/drawing/2010/main" xmlns="" w="9525">
+                <a14:hiddenLine xmlns="" xmlns:a14="http://schemas.microsoft.com/office/drawing/2010/main" w="9525">
                   <a:solidFill>
                     <a:srgbClr val="000000"/>
                   </a:solidFill>
@@ -11294,7 +11294,7 @@
             </a:ln>
             <a:extLst>
               <a:ext uri="{91240B29-F687-4f45-9708-019B960494DF}">
-                <a14:hiddenLine xmlns:a14="http://schemas.microsoft.com/office/drawing/2010/main" xmlns="" w="9525">
+                <a14:hiddenLine xmlns="" xmlns:a14="http://schemas.microsoft.com/office/drawing/2010/main" w="9525">
                   <a:solidFill>
                     <a:srgbClr val="000000"/>
                   </a:solidFill>
@@ -11356,7 +11356,7 @@
             </a:ln>
             <a:extLst>
               <a:ext uri="{91240B29-F687-4f45-9708-019B960494DF}">
-                <a14:hiddenLine xmlns:a14="http://schemas.microsoft.com/office/drawing/2010/main" xmlns="" w="9525">
+                <a14:hiddenLine xmlns="" xmlns:a14="http://schemas.microsoft.com/office/drawing/2010/main" w="9525">
                   <a:solidFill>
                     <a:srgbClr val="000000"/>
                   </a:solidFill>
@@ -11446,7 +11446,7 @@
             </a:ln>
             <a:extLst>
               <a:ext uri="{91240B29-F687-4f45-9708-019B960494DF}">
-                <a14:hiddenLine xmlns:a14="http://schemas.microsoft.com/office/drawing/2010/main" xmlns="" w="9525">
+                <a14:hiddenLine xmlns="" xmlns:a14="http://schemas.microsoft.com/office/drawing/2010/main" w="9525">
                   <a:solidFill>
                     <a:srgbClr val="000000"/>
                   </a:solidFill>
@@ -11536,7 +11536,7 @@
             </a:ln>
             <a:extLst>
               <a:ext uri="{91240B29-F687-4f45-9708-019B960494DF}">
-                <a14:hiddenLine xmlns:a14="http://schemas.microsoft.com/office/drawing/2010/main" xmlns="" w="9525">
+                <a14:hiddenLine xmlns="" xmlns:a14="http://schemas.microsoft.com/office/drawing/2010/main" w="9525">
                   <a:solidFill>
                     <a:srgbClr val="000000"/>
                   </a:solidFill>
@@ -11598,7 +11598,7 @@
             </a:ln>
             <a:extLst>
               <a:ext uri="{91240B29-F687-4f45-9708-019B960494DF}">
-                <a14:hiddenLine xmlns:a14="http://schemas.microsoft.com/office/drawing/2010/main" xmlns="" w="9525">
+                <a14:hiddenLine xmlns="" xmlns:a14="http://schemas.microsoft.com/office/drawing/2010/main" w="9525">
                   <a:solidFill>
                     <a:srgbClr val="000000"/>
                   </a:solidFill>
@@ -11708,7 +11708,7 @@
             </a:ln>
             <a:extLst>
               <a:ext uri="{91240B29-F687-4f45-9708-019B960494DF}">
-                <a14:hiddenLine xmlns:a14="http://schemas.microsoft.com/office/drawing/2010/main" xmlns="" w="9525">
+                <a14:hiddenLine xmlns="" xmlns:a14="http://schemas.microsoft.com/office/drawing/2010/main" w="9525">
                   <a:solidFill>
                     <a:srgbClr val="000000"/>
                   </a:solidFill>
@@ -11770,7 +11770,7 @@
             </a:ln>
             <a:extLst>
               <a:ext uri="{91240B29-F687-4f45-9708-019B960494DF}">
-                <a14:hiddenLine xmlns:a14="http://schemas.microsoft.com/office/drawing/2010/main" xmlns="" w="9525">
+                <a14:hiddenLine xmlns="" xmlns:a14="http://schemas.microsoft.com/office/drawing/2010/main" w="9525">
                   <a:solidFill>
                     <a:srgbClr val="000000"/>
                   </a:solidFill>
@@ -11860,7 +11860,7 @@
             </a:ln>
             <a:extLst>
               <a:ext uri="{91240B29-F687-4f45-9708-019B960494DF}">
-                <a14:hiddenLine xmlns:a14="http://schemas.microsoft.com/office/drawing/2010/main" xmlns="" w="9525">
+                <a14:hiddenLine xmlns="" xmlns:a14="http://schemas.microsoft.com/office/drawing/2010/main" w="9525">
                   <a:solidFill>
                     <a:srgbClr val="000000"/>
                   </a:solidFill>
@@ -11950,7 +11950,7 @@
             </a:ln>
             <a:extLst>
               <a:ext uri="{91240B29-F687-4f45-9708-019B960494DF}">
-                <a14:hiddenLine xmlns:a14="http://schemas.microsoft.com/office/drawing/2010/main" xmlns="" w="9525">
+                <a14:hiddenLine xmlns="" xmlns:a14="http://schemas.microsoft.com/office/drawing/2010/main" w="9525">
                   <a:solidFill>
                     <a:srgbClr val="000000"/>
                   </a:solidFill>
@@ -12012,7 +12012,7 @@
             </a:ln>
             <a:extLst>
               <a:ext uri="{91240B29-F687-4f45-9708-019B960494DF}">
-                <a14:hiddenLine xmlns:a14="http://schemas.microsoft.com/office/drawing/2010/main" xmlns="" w="9525">
+                <a14:hiddenLine xmlns="" xmlns:a14="http://schemas.microsoft.com/office/drawing/2010/main" w="9525">
                   <a:solidFill>
                     <a:srgbClr val="000000"/>
                   </a:solidFill>
@@ -12102,7 +12102,7 @@
             </a:ln>
             <a:extLst>
               <a:ext uri="{91240B29-F687-4f45-9708-019B960494DF}">
-                <a14:hiddenLine xmlns:a14="http://schemas.microsoft.com/office/drawing/2010/main" xmlns="" w="9525">
+                <a14:hiddenLine xmlns="" xmlns:a14="http://schemas.microsoft.com/office/drawing/2010/main" w="9525">
                   <a:solidFill>
                     <a:srgbClr val="000000"/>
                   </a:solidFill>
@@ -12192,7 +12192,7 @@
             </a:ln>
             <a:extLst>
               <a:ext uri="{91240B29-F687-4f45-9708-019B960494DF}">
-                <a14:hiddenLine xmlns:a14="http://schemas.microsoft.com/office/drawing/2010/main" xmlns="" w="9525">
+                <a14:hiddenLine xmlns="" xmlns:a14="http://schemas.microsoft.com/office/drawing/2010/main" w="9525">
                   <a:solidFill>
                     <a:srgbClr val="000000"/>
                   </a:solidFill>
@@ -12248,7 +12248,7 @@
             </a:ln>
             <a:extLst>
               <a:ext uri="{91240B29-F687-4f45-9708-019B960494DF}">
-                <a14:hiddenLine xmlns:a14="http://schemas.microsoft.com/office/drawing/2010/main" xmlns="" w="9525">
+                <a14:hiddenLine xmlns="" xmlns:a14="http://schemas.microsoft.com/office/drawing/2010/main" w="9525">
                   <a:solidFill>
                     <a:srgbClr val="000000"/>
                   </a:solidFill>
@@ -12338,7 +12338,7 @@
             </a:ln>
             <a:extLst>
               <a:ext uri="{91240B29-F687-4f45-9708-019B960494DF}">
-                <a14:hiddenLine xmlns:a14="http://schemas.microsoft.com/office/drawing/2010/main" xmlns="" w="9525">
+                <a14:hiddenLine xmlns="" xmlns:a14="http://schemas.microsoft.com/office/drawing/2010/main" w="9525">
                   <a:solidFill>
                     <a:srgbClr val="000000"/>
                   </a:solidFill>
@@ -12394,7 +12394,7 @@
             </a:ln>
             <a:extLst>
               <a:ext uri="{91240B29-F687-4f45-9708-019B960494DF}">
-                <a14:hiddenLine xmlns:a14="http://schemas.microsoft.com/office/drawing/2010/main" xmlns="" w="9525">
+                <a14:hiddenLine xmlns="" xmlns:a14="http://schemas.microsoft.com/office/drawing/2010/main" w="9525">
                   <a:solidFill>
                     <a:srgbClr val="000000"/>
                   </a:solidFill>
@@ -12484,7 +12484,7 @@
             </a:ln>
             <a:extLst>
               <a:ext uri="{91240B29-F687-4f45-9708-019B960494DF}">
-                <a14:hiddenLine xmlns:a14="http://schemas.microsoft.com/office/drawing/2010/main" xmlns="" w="9525">
+                <a14:hiddenLine xmlns="" xmlns:a14="http://schemas.microsoft.com/office/drawing/2010/main" w="9525">
                   <a:solidFill>
                     <a:srgbClr val="000000"/>
                   </a:solidFill>
@@ -12552,7 +12552,7 @@
             </a:ln>
             <a:extLst>
               <a:ext uri="{91240B29-F687-4f45-9708-019B960494DF}">
-                <a14:hiddenLine xmlns:a14="http://schemas.microsoft.com/office/drawing/2010/main" xmlns="" w="9525">
+                <a14:hiddenLine xmlns="" xmlns:a14="http://schemas.microsoft.com/office/drawing/2010/main" w="9525">
                   <a:solidFill>
                     <a:srgbClr val="000000"/>
                   </a:solidFill>
@@ -12642,7 +12642,7 @@
             </a:ln>
             <a:extLst>
               <a:ext uri="{91240B29-F687-4f45-9708-019B960494DF}">
-                <a14:hiddenLine xmlns:a14="http://schemas.microsoft.com/office/drawing/2010/main" xmlns="" w="9525">
+                <a14:hiddenLine xmlns="" xmlns:a14="http://schemas.microsoft.com/office/drawing/2010/main" w="9525">
                   <a:solidFill>
                     <a:srgbClr val="000000"/>
                   </a:solidFill>
@@ -12710,7 +12710,7 @@
             </a:ln>
             <a:extLst>
               <a:ext uri="{91240B29-F687-4f45-9708-019B960494DF}">
-                <a14:hiddenLine xmlns:a14="http://schemas.microsoft.com/office/drawing/2010/main" xmlns="" w="9525">
+                <a14:hiddenLine xmlns="" xmlns:a14="http://schemas.microsoft.com/office/drawing/2010/main" w="9525">
                   <a:solidFill>
                     <a:srgbClr val="000000"/>
                   </a:solidFill>
@@ -12800,7 +12800,7 @@
             </a:ln>
             <a:extLst>
               <a:ext uri="{91240B29-F687-4f45-9708-019B960494DF}">
-                <a14:hiddenLine xmlns:a14="http://schemas.microsoft.com/office/drawing/2010/main" xmlns="" w="9525">
+                <a14:hiddenLine xmlns="" xmlns:a14="http://schemas.microsoft.com/office/drawing/2010/main" w="9525">
                   <a:solidFill>
                     <a:srgbClr val="000000"/>
                   </a:solidFill>
@@ -12834,7 +12834,7 @@
             </a:ln>
             <a:extLst>
               <a:ext uri="{91240B29-F687-4f45-9708-019B960494DF}">
-                <a14:hiddenLine xmlns:a14="http://schemas.microsoft.com/office/drawing/2010/main" xmlns="" w="9525">
+                <a14:hiddenLine xmlns="" xmlns:a14="http://schemas.microsoft.com/office/drawing/2010/main" w="9525">
                   <a:solidFill>
                     <a:srgbClr val="000000"/>
                   </a:solidFill>
@@ -12924,7 +12924,7 @@
             </a:ln>
             <a:extLst>
               <a:ext uri="{91240B29-F687-4f45-9708-019B960494DF}">
-                <a14:hiddenLine xmlns:a14="http://schemas.microsoft.com/office/drawing/2010/main" xmlns="" w="9525">
+                <a14:hiddenLine xmlns="" xmlns:a14="http://schemas.microsoft.com/office/drawing/2010/main" w="9525">
                   <a:solidFill>
                     <a:srgbClr val="000000"/>
                   </a:solidFill>
@@ -12986,7 +12986,7 @@
             </a:ln>
             <a:extLst>
               <a:ext uri="{91240B29-F687-4f45-9708-019B960494DF}">
-                <a14:hiddenLine xmlns:a14="http://schemas.microsoft.com/office/drawing/2010/main" xmlns="" w="9525">
+                <a14:hiddenLine xmlns="" xmlns:a14="http://schemas.microsoft.com/office/drawing/2010/main" w="9525">
                   <a:solidFill>
                     <a:srgbClr val="000000"/>
                   </a:solidFill>
@@ -13048,7 +13048,7 @@
             </a:ln>
             <a:extLst>
               <a:ext uri="{91240B29-F687-4f45-9708-019B960494DF}">
-                <a14:hiddenLine xmlns:a14="http://schemas.microsoft.com/office/drawing/2010/main" xmlns="" w="9525">
+                <a14:hiddenLine xmlns="" xmlns:a14="http://schemas.microsoft.com/office/drawing/2010/main" w="9525">
                   <a:solidFill>
                     <a:srgbClr val="000000"/>
                   </a:solidFill>
@@ -13138,7 +13138,7 @@
             </a:ln>
             <a:extLst>
               <a:ext uri="{91240B29-F687-4f45-9708-019B960494DF}">
-                <a14:hiddenLine xmlns:a14="http://schemas.microsoft.com/office/drawing/2010/main" xmlns="" w="9525">
+                <a14:hiddenLine xmlns="" xmlns:a14="http://schemas.microsoft.com/office/drawing/2010/main" w="9525">
                   <a:solidFill>
                     <a:srgbClr val="000000"/>
                   </a:solidFill>
@@ -13206,7 +13206,7 @@
             </a:ln>
             <a:extLst>
               <a:ext uri="{91240B29-F687-4f45-9708-019B960494DF}">
-                <a14:hiddenLine xmlns:a14="http://schemas.microsoft.com/office/drawing/2010/main" xmlns="" w="9525">
+                <a14:hiddenLine xmlns="" xmlns:a14="http://schemas.microsoft.com/office/drawing/2010/main" w="9525">
                   <a:solidFill>
                     <a:srgbClr val="000000"/>
                   </a:solidFill>
@@ -13268,7 +13268,7 @@
             </a:ln>
             <a:extLst>
               <a:ext uri="{91240B29-F687-4f45-9708-019B960494DF}">
-                <a14:hiddenLine xmlns:a14="http://schemas.microsoft.com/office/drawing/2010/main" xmlns="" w="9525">
+                <a14:hiddenLine xmlns="" xmlns:a14="http://schemas.microsoft.com/office/drawing/2010/main" w="9525">
                   <a:solidFill>
                     <a:srgbClr val="000000"/>
                   </a:solidFill>
@@ -13358,7 +13358,7 @@
             </a:ln>
             <a:extLst>
               <a:ext uri="{91240B29-F687-4f45-9708-019B960494DF}">
-                <a14:hiddenLine xmlns:a14="http://schemas.microsoft.com/office/drawing/2010/main" xmlns="" w="9525">
+                <a14:hiddenLine xmlns="" xmlns:a14="http://schemas.microsoft.com/office/drawing/2010/main" w="9525">
                   <a:solidFill>
                     <a:srgbClr val="000000"/>
                   </a:solidFill>
@@ -13420,7 +13420,7 @@
             </a:ln>
             <a:extLst>
               <a:ext uri="{91240B29-F687-4f45-9708-019B960494DF}">
-                <a14:hiddenLine xmlns:a14="http://schemas.microsoft.com/office/drawing/2010/main" xmlns="" w="9525">
+                <a14:hiddenLine xmlns="" xmlns:a14="http://schemas.microsoft.com/office/drawing/2010/main" w="9525">
                   <a:solidFill>
                     <a:srgbClr val="000000"/>
                   </a:solidFill>
@@ -13510,7 +13510,7 @@
             </a:ln>
             <a:extLst>
               <a:ext uri="{91240B29-F687-4f45-9708-019B960494DF}">
-                <a14:hiddenLine xmlns:a14="http://schemas.microsoft.com/office/drawing/2010/main" xmlns="" w="9525">
+                <a14:hiddenLine xmlns="" xmlns:a14="http://schemas.microsoft.com/office/drawing/2010/main" w="9525">
                   <a:solidFill>
                     <a:srgbClr val="000000"/>
                   </a:solidFill>
@@ -13572,7 +13572,7 @@
             </a:ln>
             <a:extLst>
               <a:ext uri="{91240B29-F687-4f45-9708-019B960494DF}">
-                <a14:hiddenLine xmlns:a14="http://schemas.microsoft.com/office/drawing/2010/main" xmlns="" w="9525">
+                <a14:hiddenLine xmlns="" xmlns:a14="http://schemas.microsoft.com/office/drawing/2010/main" w="9525">
                   <a:solidFill>
                     <a:srgbClr val="000000"/>
                   </a:solidFill>
@@ -13662,7 +13662,7 @@
             </a:ln>
             <a:extLst>
               <a:ext uri="{91240B29-F687-4f45-9708-019B960494DF}">
-                <a14:hiddenLine xmlns:a14="http://schemas.microsoft.com/office/drawing/2010/main" xmlns="" w="9525">
+                <a14:hiddenLine xmlns="" xmlns:a14="http://schemas.microsoft.com/office/drawing/2010/main" w="9525">
                   <a:solidFill>
                     <a:srgbClr val="000000"/>
                   </a:solidFill>
@@ -13696,7 +13696,7 @@
             </a:ln>
             <a:extLst>
               <a:ext uri="{91240B29-F687-4f45-9708-019B960494DF}">
-                <a14:hiddenLine xmlns:a14="http://schemas.microsoft.com/office/drawing/2010/main" xmlns="" w="9525">
+                <a14:hiddenLine xmlns="" xmlns:a14="http://schemas.microsoft.com/office/drawing/2010/main" w="9525">
                   <a:solidFill>
                     <a:srgbClr val="000000"/>
                   </a:solidFill>
@@ -13761,7 +13761,7 @@
             </a:ln>
             <a:extLst>
               <a:ext uri="{91240B29-F687-4f45-9708-019B960494DF}">
-                <a14:hiddenLine xmlns:a14="http://schemas.microsoft.com/office/drawing/2010/main" xmlns="" w="9525">
+                <a14:hiddenLine xmlns="" xmlns:a14="http://schemas.microsoft.com/office/drawing/2010/main" w="9525">
                   <a:solidFill>
                     <a:srgbClr val="000000"/>
                   </a:solidFill>
@@ -13851,7 +13851,7 @@
             </a:ln>
             <a:extLst>
               <a:ext uri="{91240B29-F687-4f45-9708-019B960494DF}">
-                <a14:hiddenLine xmlns:a14="http://schemas.microsoft.com/office/drawing/2010/main" xmlns="" w="9525">
+                <a14:hiddenLine xmlns="" xmlns:a14="http://schemas.microsoft.com/office/drawing/2010/main" w="9525">
                   <a:solidFill>
                     <a:srgbClr val="000000"/>
                   </a:solidFill>
@@ -13913,7 +13913,7 @@
             </a:ln>
             <a:extLst>
               <a:ext uri="{91240B29-F687-4f45-9708-019B960494DF}">
-                <a14:hiddenLine xmlns:a14="http://schemas.microsoft.com/office/drawing/2010/main" xmlns="" w="9525">
+                <a14:hiddenLine xmlns="" xmlns:a14="http://schemas.microsoft.com/office/drawing/2010/main" w="9525">
                   <a:solidFill>
                     <a:srgbClr val="000000"/>
                   </a:solidFill>
@@ -14003,7 +14003,7 @@
             </a:ln>
             <a:extLst>
               <a:ext uri="{91240B29-F687-4f45-9708-019B960494DF}">
-                <a14:hiddenLine xmlns:a14="http://schemas.microsoft.com/office/drawing/2010/main" xmlns="" w="9525">
+                <a14:hiddenLine xmlns="" xmlns:a14="http://schemas.microsoft.com/office/drawing/2010/main" w="9525">
                   <a:solidFill>
                     <a:srgbClr val="000000"/>
                   </a:solidFill>
@@ -14093,7 +14093,7 @@
             </a:ln>
             <a:extLst>
               <a:ext uri="{91240B29-F687-4f45-9708-019B960494DF}">
-                <a14:hiddenLine xmlns:a14="http://schemas.microsoft.com/office/drawing/2010/main" xmlns="" w="9525">
+                <a14:hiddenLine xmlns="" xmlns:a14="http://schemas.microsoft.com/office/drawing/2010/main" w="9525">
                   <a:solidFill>
                     <a:srgbClr val="000000"/>
                   </a:solidFill>
@@ -14158,7 +14158,7 @@
             </a:ln>
             <a:extLst>
               <a:ext uri="{91240B29-F687-4f45-9708-019B960494DF}">
-                <a14:hiddenLine xmlns:a14="http://schemas.microsoft.com/office/drawing/2010/main" xmlns="" w="9525">
+                <a14:hiddenLine xmlns="" xmlns:a14="http://schemas.microsoft.com/office/drawing/2010/main" w="9525">
                   <a:solidFill>
                     <a:srgbClr val="000000"/>
                   </a:solidFill>
@@ -14220,7 +14220,7 @@
             </a:ln>
             <a:extLst>
               <a:ext uri="{91240B29-F687-4f45-9708-019B960494DF}">
-                <a14:hiddenLine xmlns:a14="http://schemas.microsoft.com/office/drawing/2010/main" xmlns="" w="9525">
+                <a14:hiddenLine xmlns="" xmlns:a14="http://schemas.microsoft.com/office/drawing/2010/main" w="9525">
                   <a:solidFill>
                     <a:srgbClr val="000000"/>
                   </a:solidFill>
@@ -14310,7 +14310,7 @@
             </a:ln>
             <a:extLst>
               <a:ext uri="{91240B29-F687-4f45-9708-019B960494DF}">
-                <a14:hiddenLine xmlns:a14="http://schemas.microsoft.com/office/drawing/2010/main" xmlns="" w="9525">
+                <a14:hiddenLine xmlns="" xmlns:a14="http://schemas.microsoft.com/office/drawing/2010/main" w="9525">
                   <a:solidFill>
                     <a:srgbClr val="000000"/>
                   </a:solidFill>
@@ -14400,7 +14400,7 @@
             </a:ln>
             <a:extLst>
               <a:ext uri="{91240B29-F687-4f45-9708-019B960494DF}">
-                <a14:hiddenLine xmlns:a14="http://schemas.microsoft.com/office/drawing/2010/main" xmlns="" w="9525">
+                <a14:hiddenLine xmlns="" xmlns:a14="http://schemas.microsoft.com/office/drawing/2010/main" w="9525">
                   <a:solidFill>
                     <a:srgbClr val="000000"/>
                   </a:solidFill>
@@ -14462,7 +14462,7 @@
             </a:ln>
             <a:extLst>
               <a:ext uri="{91240B29-F687-4f45-9708-019B960494DF}">
-                <a14:hiddenLine xmlns:a14="http://schemas.microsoft.com/office/drawing/2010/main" xmlns="" w="9525">
+                <a14:hiddenLine xmlns="" xmlns:a14="http://schemas.microsoft.com/office/drawing/2010/main" w="9525">
                   <a:solidFill>
                     <a:srgbClr val="000000"/>
                   </a:solidFill>
@@ -14582,7 +14582,7 @@
             </a:ln>
             <a:extLst>
               <a:ext uri="{91240B29-F687-4f45-9708-019B960494DF}">
-                <a14:hiddenLine xmlns:a14="http://schemas.microsoft.com/office/drawing/2010/main" xmlns="" w="9525">
+                <a14:hiddenLine xmlns="" xmlns:a14="http://schemas.microsoft.com/office/drawing/2010/main" w="9525">
                   <a:solidFill>
                     <a:srgbClr val="000000"/>
                   </a:solidFill>
@@ -14650,7 +14650,7 @@
             </a:ln>
             <a:extLst>
               <a:ext uri="{91240B29-F687-4f45-9708-019B960494DF}">
-                <a14:hiddenLine xmlns:a14="http://schemas.microsoft.com/office/drawing/2010/main" xmlns="" w="9525">
+                <a14:hiddenLine xmlns="" xmlns:a14="http://schemas.microsoft.com/office/drawing/2010/main" w="9525">
                   <a:solidFill>
                     <a:srgbClr val="000000"/>
                   </a:solidFill>
@@ -14740,7 +14740,7 @@
             </a:ln>
             <a:extLst>
               <a:ext uri="{91240B29-F687-4f45-9708-019B960494DF}">
-                <a14:hiddenLine xmlns:a14="http://schemas.microsoft.com/office/drawing/2010/main" xmlns="" w="9525">
+                <a14:hiddenLine xmlns="" xmlns:a14="http://schemas.microsoft.com/office/drawing/2010/main" w="9525">
                   <a:solidFill>
                     <a:srgbClr val="000000"/>
                   </a:solidFill>
@@ -19554,7 +19554,7 @@
           <a:noFill/>
           <a:extLst>
             <a:ext uri="{909E8E84-426E-40dd-AFC4-6F175D3DCCD1}">
-              <a14:hiddenFill xmlns:a14="http://schemas.microsoft.com/office/drawing/2010/main" xmlns="">
+              <a14:hiddenFill xmlns="" xmlns:a14="http://schemas.microsoft.com/office/drawing/2010/main">
                 <a:solidFill>
                   <a:srgbClr val="FFFFFF"/>
                 </a:solidFill>
@@ -19628,7 +19628,7 @@
               </a:ln>
               <a:extLst>
                 <a:ext uri="{91240B29-F687-4f45-9708-019B960494DF}">
-                  <a14:hiddenLine xmlns:a14="http://schemas.microsoft.com/office/drawing/2010/main" xmlns="" w="9525">
+                  <a14:hiddenLine xmlns="" xmlns:a14="http://schemas.microsoft.com/office/drawing/2010/main" w="9525">
                     <a:solidFill>
                       <a:srgbClr val="000000"/>
                     </a:solidFill>
@@ -19718,7 +19718,7 @@
               </a:ln>
               <a:extLst>
                 <a:ext uri="{91240B29-F687-4f45-9708-019B960494DF}">
-                  <a14:hiddenLine xmlns:a14="http://schemas.microsoft.com/office/drawing/2010/main" xmlns="" w="9525">
+                  <a14:hiddenLine xmlns="" xmlns:a14="http://schemas.microsoft.com/office/drawing/2010/main" w="9525">
                     <a:solidFill>
                       <a:srgbClr val="000000"/>
                     </a:solidFill>
@@ -19808,7 +19808,7 @@
               </a:ln>
               <a:extLst>
                 <a:ext uri="{91240B29-F687-4f45-9708-019B960494DF}">
-                  <a14:hiddenLine xmlns:a14="http://schemas.microsoft.com/office/drawing/2010/main" xmlns="" w="9525">
+                  <a14:hiddenLine xmlns="" xmlns:a14="http://schemas.microsoft.com/office/drawing/2010/main" w="9525">
                     <a:solidFill>
                       <a:srgbClr val="000000"/>
                     </a:solidFill>
@@ -19870,7 +19870,7 @@
               </a:ln>
               <a:extLst>
                 <a:ext uri="{91240B29-F687-4f45-9708-019B960494DF}">
-                  <a14:hiddenLine xmlns:a14="http://schemas.microsoft.com/office/drawing/2010/main" xmlns="" w="9525">
+                  <a14:hiddenLine xmlns="" xmlns:a14="http://schemas.microsoft.com/office/drawing/2010/main" w="9525">
                     <a:solidFill>
                       <a:srgbClr val="000000"/>
                     </a:solidFill>
@@ -19960,7 +19960,7 @@
               </a:ln>
               <a:extLst>
                 <a:ext uri="{91240B29-F687-4f45-9708-019B960494DF}">
-                  <a14:hiddenLine xmlns:a14="http://schemas.microsoft.com/office/drawing/2010/main" xmlns="" w="9525">
+                  <a14:hiddenLine xmlns="" xmlns:a14="http://schemas.microsoft.com/office/drawing/2010/main" w="9525">
                     <a:solidFill>
                       <a:srgbClr val="000000"/>
                     </a:solidFill>
@@ -20022,7 +20022,7 @@
               </a:ln>
               <a:extLst>
                 <a:ext uri="{91240B29-F687-4f45-9708-019B960494DF}">
-                  <a14:hiddenLine xmlns:a14="http://schemas.microsoft.com/office/drawing/2010/main" xmlns="" w="9525">
+                  <a14:hiddenLine xmlns="" xmlns:a14="http://schemas.microsoft.com/office/drawing/2010/main" w="9525">
                     <a:solidFill>
                       <a:srgbClr val="000000"/>
                     </a:solidFill>
@@ -20084,7 +20084,7 @@
               </a:ln>
               <a:extLst>
                 <a:ext uri="{91240B29-F687-4f45-9708-019B960494DF}">
-                  <a14:hiddenLine xmlns:a14="http://schemas.microsoft.com/office/drawing/2010/main" xmlns="" w="9525">
+                  <a14:hiddenLine xmlns="" xmlns:a14="http://schemas.microsoft.com/office/drawing/2010/main" w="9525">
                     <a:solidFill>
                       <a:srgbClr val="000000"/>
                     </a:solidFill>
@@ -20174,7 +20174,7 @@
               </a:ln>
               <a:extLst>
                 <a:ext uri="{91240B29-F687-4f45-9708-019B960494DF}">
-                  <a14:hiddenLine xmlns:a14="http://schemas.microsoft.com/office/drawing/2010/main" xmlns="" w="9525">
+                  <a14:hiddenLine xmlns="" xmlns:a14="http://schemas.microsoft.com/office/drawing/2010/main" w="9525">
                     <a:solidFill>
                       <a:srgbClr val="000000"/>
                     </a:solidFill>
@@ -20264,7 +20264,7 @@
               </a:ln>
               <a:extLst>
                 <a:ext uri="{91240B29-F687-4f45-9708-019B960494DF}">
-                  <a14:hiddenLine xmlns:a14="http://schemas.microsoft.com/office/drawing/2010/main" xmlns="" w="9525">
+                  <a14:hiddenLine xmlns="" xmlns:a14="http://schemas.microsoft.com/office/drawing/2010/main" w="9525">
                     <a:solidFill>
                       <a:srgbClr val="000000"/>
                     </a:solidFill>
@@ -20326,7 +20326,7 @@
               </a:ln>
               <a:extLst>
                 <a:ext uri="{91240B29-F687-4f45-9708-019B960494DF}">
-                  <a14:hiddenLine xmlns:a14="http://schemas.microsoft.com/office/drawing/2010/main" xmlns="" w="9525">
+                  <a14:hiddenLine xmlns="" xmlns:a14="http://schemas.microsoft.com/office/drawing/2010/main" w="9525">
                     <a:solidFill>
                       <a:srgbClr val="000000"/>
                     </a:solidFill>
@@ -20436,7 +20436,7 @@
               </a:ln>
               <a:extLst>
                 <a:ext uri="{91240B29-F687-4f45-9708-019B960494DF}">
-                  <a14:hiddenLine xmlns:a14="http://schemas.microsoft.com/office/drawing/2010/main" xmlns="" w="9525">
+                  <a14:hiddenLine xmlns="" xmlns:a14="http://schemas.microsoft.com/office/drawing/2010/main" w="9525">
                     <a:solidFill>
                       <a:srgbClr val="000000"/>
                     </a:solidFill>
@@ -20520,7 +20520,7 @@
               </a:ln>
               <a:extLst>
                 <a:ext uri="{91240B29-F687-4f45-9708-019B960494DF}">
-                  <a14:hiddenLine xmlns:a14="http://schemas.microsoft.com/office/drawing/2010/main" xmlns="" w="9525">
+                  <a14:hiddenLine xmlns="" xmlns:a14="http://schemas.microsoft.com/office/drawing/2010/main" w="9525">
                     <a:solidFill>
                       <a:srgbClr val="000000"/>
                     </a:solidFill>
@@ -20582,7 +20582,7 @@
               </a:ln>
               <a:extLst>
                 <a:ext uri="{91240B29-F687-4f45-9708-019B960494DF}">
-                  <a14:hiddenLine xmlns:a14="http://schemas.microsoft.com/office/drawing/2010/main" xmlns="" w="9525">
+                  <a14:hiddenLine xmlns="" xmlns:a14="http://schemas.microsoft.com/office/drawing/2010/main" w="9525">
                     <a:solidFill>
                       <a:srgbClr val="000000"/>
                     </a:solidFill>
@@ -20644,7 +20644,7 @@
               </a:ln>
               <a:extLst>
                 <a:ext uri="{91240B29-F687-4f45-9708-019B960494DF}">
-                  <a14:hiddenLine xmlns:a14="http://schemas.microsoft.com/office/drawing/2010/main" xmlns="" w="9525">
+                  <a14:hiddenLine xmlns="" xmlns:a14="http://schemas.microsoft.com/office/drawing/2010/main" w="9525">
                     <a:solidFill>
                       <a:srgbClr val="000000"/>
                     </a:solidFill>
@@ -20734,7 +20734,7 @@
               </a:ln>
               <a:extLst>
                 <a:ext uri="{91240B29-F687-4f45-9708-019B960494DF}">
-                  <a14:hiddenLine xmlns:a14="http://schemas.microsoft.com/office/drawing/2010/main" xmlns="" w="9525">
+                  <a14:hiddenLine xmlns="" xmlns:a14="http://schemas.microsoft.com/office/drawing/2010/main" w="9525">
                     <a:solidFill>
                       <a:srgbClr val="000000"/>
                     </a:solidFill>
@@ -20768,7 +20768,7 @@
               </a:ln>
               <a:extLst>
                 <a:ext uri="{91240B29-F687-4f45-9708-019B960494DF}">
-                  <a14:hiddenLine xmlns:a14="http://schemas.microsoft.com/office/drawing/2010/main" xmlns="" w="9525">
+                  <a14:hiddenLine xmlns="" xmlns:a14="http://schemas.microsoft.com/office/drawing/2010/main" w="9525">
                     <a:solidFill>
                       <a:srgbClr val="000000"/>
                     </a:solidFill>
@@ -20833,7 +20833,7 @@
               </a:ln>
               <a:extLst>
                 <a:ext uri="{91240B29-F687-4f45-9708-019B960494DF}">
-                  <a14:hiddenLine xmlns:a14="http://schemas.microsoft.com/office/drawing/2010/main" xmlns="" w="9525">
+                  <a14:hiddenLine xmlns="" xmlns:a14="http://schemas.microsoft.com/office/drawing/2010/main" w="9525">
                     <a:solidFill>
                       <a:srgbClr val="000000"/>
                     </a:solidFill>
@@ -20923,7 +20923,7 @@
               </a:ln>
               <a:extLst>
                 <a:ext uri="{91240B29-F687-4f45-9708-019B960494DF}">
-                  <a14:hiddenLine xmlns:a14="http://schemas.microsoft.com/office/drawing/2010/main" xmlns="" w="9525">
+                  <a14:hiddenLine xmlns="" xmlns:a14="http://schemas.microsoft.com/office/drawing/2010/main" w="9525">
                     <a:solidFill>
                       <a:srgbClr val="000000"/>
                     </a:solidFill>
@@ -20985,7 +20985,7 @@
               </a:ln>
               <a:extLst>
                 <a:ext uri="{91240B29-F687-4f45-9708-019B960494DF}">
-                  <a14:hiddenLine xmlns:a14="http://schemas.microsoft.com/office/drawing/2010/main" xmlns="" w="9525">
+                  <a14:hiddenLine xmlns="" xmlns:a14="http://schemas.microsoft.com/office/drawing/2010/main" w="9525">
                     <a:solidFill>
                       <a:srgbClr val="000000"/>
                     </a:solidFill>
@@ -21075,7 +21075,7 @@
               </a:ln>
               <a:extLst>
                 <a:ext uri="{91240B29-F687-4f45-9708-019B960494DF}">
-                  <a14:hiddenLine xmlns:a14="http://schemas.microsoft.com/office/drawing/2010/main" xmlns="" w="9525">
+                  <a14:hiddenLine xmlns="" xmlns:a14="http://schemas.microsoft.com/office/drawing/2010/main" w="9525">
                     <a:solidFill>
                       <a:srgbClr val="000000"/>
                     </a:solidFill>
@@ -21140,7 +21140,7 @@
               </a:ln>
               <a:extLst>
                 <a:ext uri="{91240B29-F687-4f45-9708-019B960494DF}">
-                  <a14:hiddenLine xmlns:a14="http://schemas.microsoft.com/office/drawing/2010/main" xmlns="" w="9525">
+                  <a14:hiddenLine xmlns="" xmlns:a14="http://schemas.microsoft.com/office/drawing/2010/main" w="9525">
                     <a:solidFill>
                       <a:srgbClr val="000000"/>
                     </a:solidFill>
@@ -21202,7 +21202,7 @@
               </a:ln>
               <a:extLst>
                 <a:ext uri="{91240B29-F687-4f45-9708-019B960494DF}">
-                  <a14:hiddenLine xmlns:a14="http://schemas.microsoft.com/office/drawing/2010/main" xmlns="" w="9525">
+                  <a14:hiddenLine xmlns="" xmlns:a14="http://schemas.microsoft.com/office/drawing/2010/main" w="9525">
                     <a:solidFill>
                       <a:srgbClr val="000000"/>
                     </a:solidFill>
@@ -21292,7 +21292,7 @@
               </a:ln>
               <a:extLst>
                 <a:ext uri="{91240B29-F687-4f45-9708-019B960494DF}">
-                  <a14:hiddenLine xmlns:a14="http://schemas.microsoft.com/office/drawing/2010/main" xmlns="" w="9525">
+                  <a14:hiddenLine xmlns="" xmlns:a14="http://schemas.microsoft.com/office/drawing/2010/main" w="9525">
                     <a:solidFill>
                       <a:srgbClr val="000000"/>
                     </a:solidFill>
@@ -21382,7 +21382,7 @@
               </a:ln>
               <a:extLst>
                 <a:ext uri="{91240B29-F687-4f45-9708-019B960494DF}">
-                  <a14:hiddenLine xmlns:a14="http://schemas.microsoft.com/office/drawing/2010/main" xmlns="" w="9525">
+                  <a14:hiddenLine xmlns="" xmlns:a14="http://schemas.microsoft.com/office/drawing/2010/main" w="9525">
                     <a:solidFill>
                       <a:srgbClr val="000000"/>
                     </a:solidFill>
@@ -21447,7 +21447,7 @@
               </a:ln>
               <a:extLst>
                 <a:ext uri="{91240B29-F687-4f45-9708-019B960494DF}">
-                  <a14:hiddenLine xmlns:a14="http://schemas.microsoft.com/office/drawing/2010/main" xmlns="" w="9525">
+                  <a14:hiddenLine xmlns="" xmlns:a14="http://schemas.microsoft.com/office/drawing/2010/main" w="9525">
                     <a:solidFill>
                       <a:srgbClr val="000000"/>
                     </a:solidFill>
@@ -21567,7 +21567,7 @@
               </a:ln>
               <a:extLst>
                 <a:ext uri="{91240B29-F687-4f45-9708-019B960494DF}">
-                  <a14:hiddenLine xmlns:a14="http://schemas.microsoft.com/office/drawing/2010/main" xmlns="" w="9525">
+                  <a14:hiddenLine xmlns="" xmlns:a14="http://schemas.microsoft.com/office/drawing/2010/main" w="9525">
                     <a:solidFill>
                       <a:srgbClr val="000000"/>
                     </a:solidFill>
@@ -21648,7 +21648,7 @@
               </a:ln>
               <a:extLst>
                 <a:ext uri="{91240B29-F687-4f45-9708-019B960494DF}">
-                  <a14:hiddenLine xmlns:a14="http://schemas.microsoft.com/office/drawing/2010/main" xmlns="" w="9525">
+                  <a14:hiddenLine xmlns="" xmlns:a14="http://schemas.microsoft.com/office/drawing/2010/main" w="9525">
                     <a:solidFill>
                       <a:srgbClr val="000000"/>
                     </a:solidFill>
@@ -21763,7 +21763,7 @@
               </a:ln>
               <a:extLst>
                 <a:ext uri="{91240B29-F687-4f45-9708-019B960494DF}">
-                  <a14:hiddenLine xmlns:a14="http://schemas.microsoft.com/office/drawing/2010/main" xmlns="" w="9525">
+                  <a14:hiddenLine xmlns="" xmlns:a14="http://schemas.microsoft.com/office/drawing/2010/main" w="9525">
                     <a:solidFill>
                       <a:srgbClr val="000000"/>
                     </a:solidFill>
@@ -21853,7 +21853,7 @@
               </a:ln>
               <a:extLst>
                 <a:ext uri="{91240B29-F687-4f45-9708-019B960494DF}">
-                  <a14:hiddenLine xmlns:a14="http://schemas.microsoft.com/office/drawing/2010/main" xmlns="" w="9525">
+                  <a14:hiddenLine xmlns="" xmlns:a14="http://schemas.microsoft.com/office/drawing/2010/main" w="9525">
                     <a:solidFill>
                       <a:srgbClr val="000000"/>
                     </a:solidFill>
@@ -21918,7 +21918,7 @@
               </a:ln>
               <a:extLst>
                 <a:ext uri="{91240B29-F687-4f45-9708-019B960494DF}">
-                  <a14:hiddenLine xmlns:a14="http://schemas.microsoft.com/office/drawing/2010/main" xmlns="" w="9525">
+                  <a14:hiddenLine xmlns="" xmlns:a14="http://schemas.microsoft.com/office/drawing/2010/main" w="9525">
                     <a:solidFill>
                       <a:srgbClr val="000000"/>
                     </a:solidFill>
@@ -22008,7 +22008,7 @@
               </a:ln>
               <a:extLst>
                 <a:ext uri="{91240B29-F687-4f45-9708-019B960494DF}">
-                  <a14:hiddenLine xmlns:a14="http://schemas.microsoft.com/office/drawing/2010/main" xmlns="" w="9525">
+                  <a14:hiddenLine xmlns="" xmlns:a14="http://schemas.microsoft.com/office/drawing/2010/main" w="9525">
                     <a:solidFill>
                       <a:srgbClr val="000000"/>
                     </a:solidFill>
@@ -22076,7 +22076,7 @@
               </a:ln>
               <a:extLst>
                 <a:ext uri="{91240B29-F687-4f45-9708-019B960494DF}">
-                  <a14:hiddenLine xmlns:a14="http://schemas.microsoft.com/office/drawing/2010/main" xmlns="" w="9525">
+                  <a14:hiddenLine xmlns="" xmlns:a14="http://schemas.microsoft.com/office/drawing/2010/main" w="9525">
                     <a:solidFill>
                       <a:srgbClr val="000000"/>
                     </a:solidFill>
@@ -22166,7 +22166,7 @@
               </a:ln>
               <a:extLst>
                 <a:ext uri="{91240B29-F687-4f45-9708-019B960494DF}">
-                  <a14:hiddenLine xmlns:a14="http://schemas.microsoft.com/office/drawing/2010/main" xmlns="" w="9525">
+                  <a14:hiddenLine xmlns="" xmlns:a14="http://schemas.microsoft.com/office/drawing/2010/main" w="9525">
                     <a:solidFill>
                       <a:srgbClr val="000000"/>
                     </a:solidFill>
@@ -22234,7 +22234,7 @@
               </a:ln>
               <a:extLst>
                 <a:ext uri="{91240B29-F687-4f45-9708-019B960494DF}">
-                  <a14:hiddenLine xmlns:a14="http://schemas.microsoft.com/office/drawing/2010/main" xmlns="" w="9525">
+                  <a14:hiddenLine xmlns="" xmlns:a14="http://schemas.microsoft.com/office/drawing/2010/main" w="9525">
                     <a:solidFill>
                       <a:srgbClr val="000000"/>
                     </a:solidFill>
@@ -22324,7 +22324,7 @@
               </a:ln>
               <a:extLst>
                 <a:ext uri="{91240B29-F687-4f45-9708-019B960494DF}">
-                  <a14:hiddenLine xmlns:a14="http://schemas.microsoft.com/office/drawing/2010/main" xmlns="" w="9525">
+                  <a14:hiddenLine xmlns="" xmlns:a14="http://schemas.microsoft.com/office/drawing/2010/main" w="9525">
                     <a:solidFill>
                       <a:srgbClr val="000000"/>
                     </a:solidFill>
@@ -22358,7 +22358,7 @@
               </a:ln>
               <a:extLst>
                 <a:ext uri="{91240B29-F687-4f45-9708-019B960494DF}">
-                  <a14:hiddenLine xmlns:a14="http://schemas.microsoft.com/office/drawing/2010/main" xmlns="" w="9525">
+                  <a14:hiddenLine xmlns="" xmlns:a14="http://schemas.microsoft.com/office/drawing/2010/main" w="9525">
                     <a:solidFill>
                       <a:srgbClr val="000000"/>
                     </a:solidFill>
@@ -31238,13 +31238,8 @@
           <a:p>
             <a:r>
               <a:rPr lang="en-US" dirty="0"/>
-              <a:t>CONCLUSION/</a:t>
+              <a:t>CONCLUSION/recommendations</a:t>
             </a:r>
-            <a:r>
-              <a:rPr lang="en-US" dirty="0" err="1"/>
-              <a:t>rECOMMENDATIONS</a:t>
-            </a:r>
-            <a:endParaRPr lang="en-US" dirty="0"/>
           </a:p>
         </p:txBody>
       </p:sp>
@@ -31581,7 +31576,7 @@
             <a:noFill/>
             <a:extLst>
               <a:ext uri="{909E8E84-426E-40dd-AFC4-6F175D3DCCD1}">
-                <a14:hiddenFill xmlns="" xmlns:a16="http://schemas.microsoft.com/office/drawing/2014/main" xmlns:a14="http://schemas.microsoft.com/office/drawing/2010/main" xmlns:p14="http://schemas.microsoft.com/office/powerpoint/2010/main">
+                <a14:hiddenFill xmlns:p14="http://schemas.microsoft.com/office/powerpoint/2010/main" xmlns:a14="http://schemas.microsoft.com/office/drawing/2010/main" xmlns:a16="http://schemas.microsoft.com/office/drawing/2014/main" xmlns="">
                   <a:solidFill>
                     <a:srgbClr val="FFFFFF"/>
                   </a:solidFill>
@@ -31796,7 +31791,7 @@
             </a:ln>
             <a:extLst>
               <a:ext uri="{91240B29-F687-4f45-9708-019B960494DF}">
-                <a14:hiddenLine xmlns="" xmlns:a16="http://schemas.microsoft.com/office/drawing/2014/main" xmlns:a14="http://schemas.microsoft.com/office/drawing/2010/main" xmlns:p14="http://schemas.microsoft.com/office/powerpoint/2010/main" w="9525">
+                <a14:hiddenLine xmlns:p14="http://schemas.microsoft.com/office/powerpoint/2010/main" xmlns:a14="http://schemas.microsoft.com/office/drawing/2010/main" xmlns:a16="http://schemas.microsoft.com/office/drawing/2014/main" xmlns="" w="9525">
                   <a:solidFill>
                     <a:srgbClr val="000000"/>
                   </a:solidFill>
@@ -31901,7 +31896,7 @@
             </a:ln>
             <a:extLst>
               <a:ext uri="{91240B29-F687-4f45-9708-019B960494DF}">
-                <a14:hiddenLine xmlns="" xmlns:a16="http://schemas.microsoft.com/office/drawing/2014/main" xmlns:a14="http://schemas.microsoft.com/office/drawing/2010/main" xmlns:p14="http://schemas.microsoft.com/office/powerpoint/2010/main" w="9525">
+                <a14:hiddenLine xmlns:p14="http://schemas.microsoft.com/office/powerpoint/2010/main" xmlns:a14="http://schemas.microsoft.com/office/drawing/2010/main" xmlns:a16="http://schemas.microsoft.com/office/drawing/2014/main" xmlns="" w="9525">
                   <a:solidFill>
                     <a:srgbClr val="000000"/>
                   </a:solidFill>
@@ -32006,7 +32001,7 @@
             </a:ln>
             <a:extLst>
               <a:ext uri="{91240B29-F687-4f45-9708-019B960494DF}">
-                <a14:hiddenLine xmlns="" xmlns:a16="http://schemas.microsoft.com/office/drawing/2014/main" xmlns:a14="http://schemas.microsoft.com/office/drawing/2010/main" xmlns:p14="http://schemas.microsoft.com/office/powerpoint/2010/main" w="9525">
+                <a14:hiddenLine xmlns:p14="http://schemas.microsoft.com/office/powerpoint/2010/main" xmlns:a14="http://schemas.microsoft.com/office/drawing/2010/main" xmlns:a16="http://schemas.microsoft.com/office/drawing/2014/main" xmlns="" w="9525">
                   <a:solidFill>
                     <a:srgbClr val="000000"/>
                   </a:solidFill>
@@ -32055,7 +32050,7 @@
             </a:ln>
             <a:extLst>
               <a:ext uri="{91240B29-F687-4f45-9708-019B960494DF}">
-                <a14:hiddenLine xmlns="" xmlns:a16="http://schemas.microsoft.com/office/drawing/2014/main" xmlns:a14="http://schemas.microsoft.com/office/drawing/2010/main" xmlns:p14="http://schemas.microsoft.com/office/powerpoint/2010/main" w="9525">
+                <a14:hiddenLine xmlns:p14="http://schemas.microsoft.com/office/powerpoint/2010/main" xmlns:a14="http://schemas.microsoft.com/office/drawing/2010/main" xmlns:a16="http://schemas.microsoft.com/office/drawing/2014/main" xmlns="" w="9525">
                   <a:solidFill>
                     <a:srgbClr val="000000"/>
                   </a:solidFill>
@@ -32160,7 +32155,7 @@
             </a:ln>
             <a:extLst>
               <a:ext uri="{91240B29-F687-4f45-9708-019B960494DF}">
-                <a14:hiddenLine xmlns="" xmlns:a16="http://schemas.microsoft.com/office/drawing/2014/main" xmlns:a14="http://schemas.microsoft.com/office/drawing/2010/main" xmlns:p14="http://schemas.microsoft.com/office/powerpoint/2010/main" w="9525">
+                <a14:hiddenLine xmlns:p14="http://schemas.microsoft.com/office/powerpoint/2010/main" xmlns:a14="http://schemas.microsoft.com/office/drawing/2010/main" xmlns:a16="http://schemas.microsoft.com/office/drawing/2014/main" xmlns="" w="9525">
                   <a:solidFill>
                     <a:srgbClr val="000000"/>
                   </a:solidFill>
@@ -32237,7 +32232,7 @@
             </a:ln>
             <a:extLst>
               <a:ext uri="{91240B29-F687-4f45-9708-019B960494DF}">
-                <a14:hiddenLine xmlns="" xmlns:a16="http://schemas.microsoft.com/office/drawing/2014/main" xmlns:a14="http://schemas.microsoft.com/office/drawing/2010/main" xmlns:p14="http://schemas.microsoft.com/office/powerpoint/2010/main" w="9525">
+                <a14:hiddenLine xmlns:p14="http://schemas.microsoft.com/office/powerpoint/2010/main" xmlns:a14="http://schemas.microsoft.com/office/drawing/2010/main" xmlns:a16="http://schemas.microsoft.com/office/drawing/2014/main" xmlns="" w="9525">
                   <a:solidFill>
                     <a:srgbClr val="000000"/>
                   </a:solidFill>
@@ -32314,7 +32309,7 @@
             </a:ln>
             <a:extLst>
               <a:ext uri="{91240B29-F687-4f45-9708-019B960494DF}">
-                <a14:hiddenLine xmlns="" xmlns:a16="http://schemas.microsoft.com/office/drawing/2014/main" xmlns:a14="http://schemas.microsoft.com/office/drawing/2010/main" xmlns:p14="http://schemas.microsoft.com/office/powerpoint/2010/main" w="9525">
+                <a14:hiddenLine xmlns:p14="http://schemas.microsoft.com/office/powerpoint/2010/main" xmlns:a14="http://schemas.microsoft.com/office/drawing/2010/main" xmlns:a16="http://schemas.microsoft.com/office/drawing/2014/main" xmlns="" w="9525">
                   <a:solidFill>
                     <a:srgbClr val="000000"/>
                   </a:solidFill>
@@ -32419,7 +32414,7 @@
             </a:ln>
             <a:extLst>
               <a:ext uri="{91240B29-F687-4f45-9708-019B960494DF}">
-                <a14:hiddenLine xmlns="" xmlns:a16="http://schemas.microsoft.com/office/drawing/2014/main" xmlns:a14="http://schemas.microsoft.com/office/drawing/2010/main" xmlns:p14="http://schemas.microsoft.com/office/powerpoint/2010/main" w="9525">
+                <a14:hiddenLine xmlns:p14="http://schemas.microsoft.com/office/powerpoint/2010/main" xmlns:a14="http://schemas.microsoft.com/office/drawing/2010/main" xmlns:a16="http://schemas.microsoft.com/office/drawing/2014/main" xmlns="" w="9525">
                   <a:solidFill>
                     <a:srgbClr val="000000"/>
                   </a:solidFill>
@@ -32496,7 +32491,7 @@
             </a:ln>
             <a:extLst>
               <a:ext uri="{91240B29-F687-4f45-9708-019B960494DF}">
-                <a14:hiddenLine xmlns="" xmlns:a16="http://schemas.microsoft.com/office/drawing/2014/main" xmlns:a14="http://schemas.microsoft.com/office/drawing/2010/main" xmlns:p14="http://schemas.microsoft.com/office/powerpoint/2010/main" w="9525">
+                <a14:hiddenLine xmlns:p14="http://schemas.microsoft.com/office/powerpoint/2010/main" xmlns:a14="http://schemas.microsoft.com/office/drawing/2010/main" xmlns:a16="http://schemas.microsoft.com/office/drawing/2014/main" xmlns="" w="9525">
                   <a:solidFill>
                     <a:srgbClr val="000000"/>
                   </a:solidFill>
@@ -32573,7 +32568,7 @@
             </a:ln>
             <a:extLst>
               <a:ext uri="{91240B29-F687-4f45-9708-019B960494DF}">
-                <a14:hiddenLine xmlns="" xmlns:a16="http://schemas.microsoft.com/office/drawing/2014/main" xmlns:a14="http://schemas.microsoft.com/office/drawing/2010/main" xmlns:p14="http://schemas.microsoft.com/office/powerpoint/2010/main" w="9525">
+                <a14:hiddenLine xmlns:p14="http://schemas.microsoft.com/office/powerpoint/2010/main" xmlns:a14="http://schemas.microsoft.com/office/drawing/2010/main" xmlns:a16="http://schemas.microsoft.com/office/drawing/2014/main" xmlns="" w="9525">
                   <a:solidFill>
                     <a:srgbClr val="000000"/>
                   </a:solidFill>
@@ -32678,7 +32673,7 @@
             </a:ln>
             <a:extLst>
               <a:ext uri="{91240B29-F687-4f45-9708-019B960494DF}">
-                <a14:hiddenLine xmlns="" xmlns:a16="http://schemas.microsoft.com/office/drawing/2014/main" xmlns:a14="http://schemas.microsoft.com/office/drawing/2010/main" xmlns:p14="http://schemas.microsoft.com/office/powerpoint/2010/main" w="9525">
+                <a14:hiddenLine xmlns:p14="http://schemas.microsoft.com/office/powerpoint/2010/main" xmlns:a14="http://schemas.microsoft.com/office/drawing/2010/main" xmlns:a16="http://schemas.microsoft.com/office/drawing/2014/main" xmlns="" w="9525">
                   <a:solidFill>
                     <a:srgbClr val="000000"/>
                   </a:solidFill>
@@ -32783,7 +32778,7 @@
             </a:ln>
             <a:extLst>
               <a:ext uri="{91240B29-F687-4f45-9708-019B960494DF}">
-                <a14:hiddenLine xmlns="" xmlns:a16="http://schemas.microsoft.com/office/drawing/2014/main" xmlns:a14="http://schemas.microsoft.com/office/drawing/2010/main" xmlns:p14="http://schemas.microsoft.com/office/powerpoint/2010/main" w="9525">
+                <a14:hiddenLine xmlns:p14="http://schemas.microsoft.com/office/powerpoint/2010/main" xmlns:a14="http://schemas.microsoft.com/office/drawing/2010/main" xmlns:a16="http://schemas.microsoft.com/office/drawing/2014/main" xmlns="" w="9525">
                   <a:solidFill>
                     <a:srgbClr val="000000"/>
                   </a:solidFill>
@@ -32860,7 +32855,7 @@
             </a:ln>
             <a:extLst>
               <a:ext uri="{91240B29-F687-4f45-9708-019B960494DF}">
-                <a14:hiddenLine xmlns="" xmlns:a16="http://schemas.microsoft.com/office/drawing/2014/main" xmlns:a14="http://schemas.microsoft.com/office/drawing/2010/main" xmlns:p14="http://schemas.microsoft.com/office/powerpoint/2010/main" w="9525">
+                <a14:hiddenLine xmlns:p14="http://schemas.microsoft.com/office/powerpoint/2010/main" xmlns:a14="http://schemas.microsoft.com/office/drawing/2010/main" xmlns:a16="http://schemas.microsoft.com/office/drawing/2014/main" xmlns="" w="9525">
                   <a:solidFill>
                     <a:srgbClr val="000000"/>
                   </a:solidFill>
@@ -32985,7 +32980,7 @@
             </a:ln>
             <a:extLst>
               <a:ext uri="{91240B29-F687-4f45-9708-019B960494DF}">
-                <a14:hiddenLine xmlns="" xmlns:a16="http://schemas.microsoft.com/office/drawing/2014/main" xmlns:a14="http://schemas.microsoft.com/office/drawing/2010/main" xmlns:p14="http://schemas.microsoft.com/office/powerpoint/2010/main" w="9525">
+                <a14:hiddenLine xmlns:p14="http://schemas.microsoft.com/office/powerpoint/2010/main" xmlns:a14="http://schemas.microsoft.com/office/drawing/2010/main" xmlns:a16="http://schemas.microsoft.com/office/drawing/2014/main" xmlns="" w="9525">
                   <a:solidFill>
                     <a:srgbClr val="000000"/>
                   </a:solidFill>
@@ -33062,7 +33057,7 @@
             </a:ln>
             <a:extLst>
               <a:ext uri="{91240B29-F687-4f45-9708-019B960494DF}">
-                <a14:hiddenLine xmlns="" xmlns:a16="http://schemas.microsoft.com/office/drawing/2014/main" xmlns:a14="http://schemas.microsoft.com/office/drawing/2010/main" xmlns:p14="http://schemas.microsoft.com/office/powerpoint/2010/main" w="9525">
+                <a14:hiddenLine xmlns:p14="http://schemas.microsoft.com/office/powerpoint/2010/main" xmlns:a14="http://schemas.microsoft.com/office/drawing/2010/main" xmlns:a16="http://schemas.microsoft.com/office/drawing/2014/main" xmlns="" w="9525">
                   <a:solidFill>
                     <a:srgbClr val="000000"/>
                   </a:solidFill>
@@ -33167,7 +33162,7 @@
             </a:ln>
             <a:extLst>
               <a:ext uri="{91240B29-F687-4f45-9708-019B960494DF}">
-                <a14:hiddenLine xmlns="" xmlns:a16="http://schemas.microsoft.com/office/drawing/2014/main" xmlns:a14="http://schemas.microsoft.com/office/drawing/2010/main" xmlns:p14="http://schemas.microsoft.com/office/powerpoint/2010/main" w="9525">
+                <a14:hiddenLine xmlns:p14="http://schemas.microsoft.com/office/powerpoint/2010/main" xmlns:a14="http://schemas.microsoft.com/office/drawing/2010/main" xmlns:a16="http://schemas.microsoft.com/office/drawing/2014/main" xmlns="" w="9525">
                   <a:solidFill>
                     <a:srgbClr val="000000"/>
                   </a:solidFill>
@@ -33272,7 +33267,7 @@
             </a:ln>
             <a:extLst>
               <a:ext uri="{91240B29-F687-4f45-9708-019B960494DF}">
-                <a14:hiddenLine xmlns="" xmlns:a16="http://schemas.microsoft.com/office/drawing/2014/main" xmlns:a14="http://schemas.microsoft.com/office/drawing/2010/main" xmlns:p14="http://schemas.microsoft.com/office/powerpoint/2010/main" w="9525">
+                <a14:hiddenLine xmlns:p14="http://schemas.microsoft.com/office/powerpoint/2010/main" xmlns:a14="http://schemas.microsoft.com/office/drawing/2010/main" xmlns:a16="http://schemas.microsoft.com/office/drawing/2014/main" xmlns="" w="9525">
                   <a:solidFill>
                     <a:srgbClr val="000000"/>
                   </a:solidFill>
@@ -33349,7 +33344,7 @@
             </a:ln>
             <a:extLst>
               <a:ext uri="{91240B29-F687-4f45-9708-019B960494DF}">
-                <a14:hiddenLine xmlns="" xmlns:a16="http://schemas.microsoft.com/office/drawing/2014/main" xmlns:a14="http://schemas.microsoft.com/office/drawing/2010/main" xmlns:p14="http://schemas.microsoft.com/office/powerpoint/2010/main" w="9525">
+                <a14:hiddenLine xmlns:p14="http://schemas.microsoft.com/office/powerpoint/2010/main" xmlns:a14="http://schemas.microsoft.com/office/drawing/2010/main" xmlns:a16="http://schemas.microsoft.com/office/drawing/2014/main" xmlns="" w="9525">
                   <a:solidFill>
                     <a:srgbClr val="000000"/>
                   </a:solidFill>
@@ -33454,7 +33449,7 @@
             </a:ln>
             <a:extLst>
               <a:ext uri="{91240B29-F687-4f45-9708-019B960494DF}">
-                <a14:hiddenLine xmlns="" xmlns:a16="http://schemas.microsoft.com/office/drawing/2014/main" xmlns:a14="http://schemas.microsoft.com/office/drawing/2010/main" xmlns:p14="http://schemas.microsoft.com/office/powerpoint/2010/main" w="9525">
+                <a14:hiddenLine xmlns:p14="http://schemas.microsoft.com/office/powerpoint/2010/main" xmlns:a14="http://schemas.microsoft.com/office/drawing/2010/main" xmlns:a16="http://schemas.microsoft.com/office/drawing/2014/main" xmlns="" w="9525">
                   <a:solidFill>
                     <a:srgbClr val="000000"/>
                   </a:solidFill>
@@ -33559,7 +33554,7 @@
             </a:ln>
             <a:extLst>
               <a:ext uri="{91240B29-F687-4f45-9708-019B960494DF}">
-                <a14:hiddenLine xmlns="" xmlns:a16="http://schemas.microsoft.com/office/drawing/2014/main" xmlns:a14="http://schemas.microsoft.com/office/drawing/2010/main" xmlns:p14="http://schemas.microsoft.com/office/powerpoint/2010/main" w="9525">
+                <a14:hiddenLine xmlns:p14="http://schemas.microsoft.com/office/powerpoint/2010/main" xmlns:a14="http://schemas.microsoft.com/office/drawing/2010/main" xmlns:a16="http://schemas.microsoft.com/office/drawing/2014/main" xmlns="" w="9525">
                   <a:solidFill>
                     <a:srgbClr val="000000"/>
                   </a:solidFill>
@@ -33630,7 +33625,7 @@
             </a:ln>
             <a:extLst>
               <a:ext uri="{91240B29-F687-4f45-9708-019B960494DF}">
-                <a14:hiddenLine xmlns="" xmlns:a16="http://schemas.microsoft.com/office/drawing/2014/main" xmlns:a14="http://schemas.microsoft.com/office/drawing/2010/main" xmlns:p14="http://schemas.microsoft.com/office/powerpoint/2010/main" w="9525">
+                <a14:hiddenLine xmlns:p14="http://schemas.microsoft.com/office/powerpoint/2010/main" xmlns:a14="http://schemas.microsoft.com/office/drawing/2010/main" xmlns:a16="http://schemas.microsoft.com/office/drawing/2014/main" xmlns="" w="9525">
                   <a:solidFill>
                     <a:srgbClr val="000000"/>
                   </a:solidFill>
@@ -33735,7 +33730,7 @@
             </a:ln>
             <a:extLst>
               <a:ext uri="{91240B29-F687-4f45-9708-019B960494DF}">
-                <a14:hiddenLine xmlns="" xmlns:a16="http://schemas.microsoft.com/office/drawing/2014/main" xmlns:a14="http://schemas.microsoft.com/office/drawing/2010/main" xmlns:p14="http://schemas.microsoft.com/office/powerpoint/2010/main" w="9525">
+                <a14:hiddenLine xmlns:p14="http://schemas.microsoft.com/office/powerpoint/2010/main" xmlns:a14="http://schemas.microsoft.com/office/drawing/2010/main" xmlns:a16="http://schemas.microsoft.com/office/drawing/2014/main" xmlns="" w="9525">
                   <a:solidFill>
                     <a:srgbClr val="000000"/>
                   </a:solidFill>
@@ -33806,7 +33801,7 @@
             </a:ln>
             <a:extLst>
               <a:ext uri="{91240B29-F687-4f45-9708-019B960494DF}">
-                <a14:hiddenLine xmlns="" xmlns:a16="http://schemas.microsoft.com/office/drawing/2014/main" xmlns:a14="http://schemas.microsoft.com/office/drawing/2010/main" xmlns:p14="http://schemas.microsoft.com/office/powerpoint/2010/main" w="9525">
+                <a14:hiddenLine xmlns:p14="http://schemas.microsoft.com/office/powerpoint/2010/main" xmlns:a14="http://schemas.microsoft.com/office/drawing/2010/main" xmlns:a16="http://schemas.microsoft.com/office/drawing/2014/main" xmlns="" w="9525">
                   <a:solidFill>
                     <a:srgbClr val="000000"/>
                   </a:solidFill>
@@ -33911,7 +33906,7 @@
             </a:ln>
             <a:extLst>
               <a:ext uri="{91240B29-F687-4f45-9708-019B960494DF}">
-                <a14:hiddenLine xmlns="" xmlns:a16="http://schemas.microsoft.com/office/drawing/2014/main" xmlns:a14="http://schemas.microsoft.com/office/drawing/2010/main" xmlns:p14="http://schemas.microsoft.com/office/powerpoint/2010/main" w="9525">
+                <a14:hiddenLine xmlns:p14="http://schemas.microsoft.com/office/powerpoint/2010/main" xmlns:a14="http://schemas.microsoft.com/office/drawing/2010/main" xmlns:a16="http://schemas.microsoft.com/office/drawing/2014/main" xmlns="" w="9525">
                   <a:solidFill>
                     <a:srgbClr val="000000"/>
                   </a:solidFill>
@@ -33994,7 +33989,7 @@
             </a:ln>
             <a:extLst>
               <a:ext uri="{91240B29-F687-4f45-9708-019B960494DF}">
-                <a14:hiddenLine xmlns="" xmlns:a16="http://schemas.microsoft.com/office/drawing/2014/main" xmlns:a14="http://schemas.microsoft.com/office/drawing/2010/main" xmlns:p14="http://schemas.microsoft.com/office/powerpoint/2010/main" w="9525">
+                <a14:hiddenLine xmlns:p14="http://schemas.microsoft.com/office/powerpoint/2010/main" xmlns:a14="http://schemas.microsoft.com/office/drawing/2010/main" xmlns:a16="http://schemas.microsoft.com/office/drawing/2014/main" xmlns="" w="9525">
                   <a:solidFill>
                     <a:srgbClr val="000000"/>
                   </a:solidFill>
@@ -34099,7 +34094,7 @@
             </a:ln>
             <a:extLst>
               <a:ext uri="{91240B29-F687-4f45-9708-019B960494DF}">
-                <a14:hiddenLine xmlns="" xmlns:a16="http://schemas.microsoft.com/office/drawing/2014/main" xmlns:a14="http://schemas.microsoft.com/office/drawing/2010/main" xmlns:p14="http://schemas.microsoft.com/office/powerpoint/2010/main" w="9525">
+                <a14:hiddenLine xmlns:p14="http://schemas.microsoft.com/office/powerpoint/2010/main" xmlns:a14="http://schemas.microsoft.com/office/drawing/2010/main" xmlns:a16="http://schemas.microsoft.com/office/drawing/2014/main" xmlns="" w="9525">
                   <a:solidFill>
                     <a:srgbClr val="000000"/>
                   </a:solidFill>
@@ -34182,7 +34177,7 @@
             </a:ln>
             <a:extLst>
               <a:ext uri="{91240B29-F687-4f45-9708-019B960494DF}">
-                <a14:hiddenLine xmlns="" xmlns:a16="http://schemas.microsoft.com/office/drawing/2014/main" xmlns:a14="http://schemas.microsoft.com/office/drawing/2010/main" xmlns:p14="http://schemas.microsoft.com/office/powerpoint/2010/main" w="9525">
+                <a14:hiddenLine xmlns:p14="http://schemas.microsoft.com/office/powerpoint/2010/main" xmlns:a14="http://schemas.microsoft.com/office/drawing/2010/main" xmlns:a16="http://schemas.microsoft.com/office/drawing/2014/main" xmlns="" w="9525">
                   <a:solidFill>
                     <a:srgbClr val="000000"/>
                   </a:solidFill>
@@ -34287,7 +34282,7 @@
             </a:ln>
             <a:extLst>
               <a:ext uri="{91240B29-F687-4f45-9708-019B960494DF}">
-                <a14:hiddenLine xmlns="" xmlns:a16="http://schemas.microsoft.com/office/drawing/2014/main" xmlns:a14="http://schemas.microsoft.com/office/drawing/2010/main" xmlns:p14="http://schemas.microsoft.com/office/powerpoint/2010/main" w="9525">
+                <a14:hiddenLine xmlns:p14="http://schemas.microsoft.com/office/powerpoint/2010/main" xmlns:a14="http://schemas.microsoft.com/office/drawing/2010/main" xmlns:a16="http://schemas.microsoft.com/office/drawing/2014/main" xmlns="" w="9525">
                   <a:solidFill>
                     <a:srgbClr val="000000"/>
                   </a:solidFill>
@@ -34336,7 +34331,7 @@
             </a:ln>
             <a:extLst>
               <a:ext uri="{91240B29-F687-4f45-9708-019B960494DF}">
-                <a14:hiddenLine xmlns="" xmlns:a16="http://schemas.microsoft.com/office/drawing/2014/main" xmlns:a14="http://schemas.microsoft.com/office/drawing/2010/main" xmlns:p14="http://schemas.microsoft.com/office/powerpoint/2010/main" w="9525">
+                <a14:hiddenLine xmlns:p14="http://schemas.microsoft.com/office/powerpoint/2010/main" xmlns:a14="http://schemas.microsoft.com/office/drawing/2010/main" xmlns:a16="http://schemas.microsoft.com/office/drawing/2014/main" xmlns="" w="9525">
                   <a:solidFill>
                     <a:srgbClr val="000000"/>
                   </a:solidFill>
@@ -34441,7 +34436,7 @@
             </a:ln>
             <a:extLst>
               <a:ext uri="{91240B29-F687-4f45-9708-019B960494DF}">
-                <a14:hiddenLine xmlns="" xmlns:a16="http://schemas.microsoft.com/office/drawing/2014/main" xmlns:a14="http://schemas.microsoft.com/office/drawing/2010/main" xmlns:p14="http://schemas.microsoft.com/office/powerpoint/2010/main" w="9525">
+                <a14:hiddenLine xmlns:p14="http://schemas.microsoft.com/office/powerpoint/2010/main" xmlns:a14="http://schemas.microsoft.com/office/drawing/2010/main" xmlns:a16="http://schemas.microsoft.com/office/drawing/2014/main" xmlns="" w="9525">
                   <a:solidFill>
                     <a:srgbClr val="000000"/>
                   </a:solidFill>
@@ -34518,7 +34513,7 @@
             </a:ln>
             <a:extLst>
               <a:ext uri="{91240B29-F687-4f45-9708-019B960494DF}">
-                <a14:hiddenLine xmlns="" xmlns:a16="http://schemas.microsoft.com/office/drawing/2014/main" xmlns:a14="http://schemas.microsoft.com/office/drawing/2010/main" xmlns:p14="http://schemas.microsoft.com/office/powerpoint/2010/main" w="9525">
+                <a14:hiddenLine xmlns:p14="http://schemas.microsoft.com/office/powerpoint/2010/main" xmlns:a14="http://schemas.microsoft.com/office/drawing/2010/main" xmlns:a16="http://schemas.microsoft.com/office/drawing/2014/main" xmlns="" w="9525">
                   <a:solidFill>
                     <a:srgbClr val="000000"/>
                   </a:solidFill>
@@ -34595,7 +34590,7 @@
             </a:ln>
             <a:extLst>
               <a:ext uri="{91240B29-F687-4f45-9708-019B960494DF}">
-                <a14:hiddenLine xmlns="" xmlns:a16="http://schemas.microsoft.com/office/drawing/2014/main" xmlns:a14="http://schemas.microsoft.com/office/drawing/2010/main" xmlns:p14="http://schemas.microsoft.com/office/powerpoint/2010/main" w="9525">
+                <a14:hiddenLine xmlns:p14="http://schemas.microsoft.com/office/powerpoint/2010/main" xmlns:a14="http://schemas.microsoft.com/office/drawing/2010/main" xmlns:a16="http://schemas.microsoft.com/office/drawing/2014/main" xmlns="" w="9525">
                   <a:solidFill>
                     <a:srgbClr val="000000"/>
                   </a:solidFill>
@@ -34700,7 +34695,7 @@
             </a:ln>
             <a:extLst>
               <a:ext uri="{91240B29-F687-4f45-9708-019B960494DF}">
-                <a14:hiddenLine xmlns="" xmlns:a16="http://schemas.microsoft.com/office/drawing/2014/main" xmlns:a14="http://schemas.microsoft.com/office/drawing/2010/main" xmlns:p14="http://schemas.microsoft.com/office/powerpoint/2010/main" w="9525">
+                <a14:hiddenLine xmlns:p14="http://schemas.microsoft.com/office/powerpoint/2010/main" xmlns:a14="http://schemas.microsoft.com/office/drawing/2010/main" xmlns:a16="http://schemas.microsoft.com/office/drawing/2014/main" xmlns="" w="9525">
                   <a:solidFill>
                     <a:srgbClr val="000000"/>
                   </a:solidFill>
@@ -34783,7 +34778,7 @@
             </a:ln>
             <a:extLst>
               <a:ext uri="{91240B29-F687-4f45-9708-019B960494DF}">
-                <a14:hiddenLine xmlns="" xmlns:a16="http://schemas.microsoft.com/office/drawing/2014/main" xmlns:a14="http://schemas.microsoft.com/office/drawing/2010/main" xmlns:p14="http://schemas.microsoft.com/office/powerpoint/2010/main" w="9525">
+                <a14:hiddenLine xmlns:p14="http://schemas.microsoft.com/office/powerpoint/2010/main" xmlns:a14="http://schemas.microsoft.com/office/drawing/2010/main" xmlns:a16="http://schemas.microsoft.com/office/drawing/2014/main" xmlns="" w="9525">
                   <a:solidFill>
                     <a:srgbClr val="000000"/>
                   </a:solidFill>
@@ -34860,7 +34855,7 @@
             </a:ln>
             <a:extLst>
               <a:ext uri="{91240B29-F687-4f45-9708-019B960494DF}">
-                <a14:hiddenLine xmlns="" xmlns:a16="http://schemas.microsoft.com/office/drawing/2014/main" xmlns:a14="http://schemas.microsoft.com/office/drawing/2010/main" xmlns:p14="http://schemas.microsoft.com/office/powerpoint/2010/main" w="9525">
+                <a14:hiddenLine xmlns:p14="http://schemas.microsoft.com/office/powerpoint/2010/main" xmlns:a14="http://schemas.microsoft.com/office/drawing/2010/main" xmlns:a16="http://schemas.microsoft.com/office/drawing/2014/main" xmlns="" w="9525">
                   <a:solidFill>
                     <a:srgbClr val="000000"/>
                   </a:solidFill>
@@ -34965,7 +34960,7 @@
             </a:ln>
             <a:extLst>
               <a:ext uri="{91240B29-F687-4f45-9708-019B960494DF}">
-                <a14:hiddenLine xmlns="" xmlns:a16="http://schemas.microsoft.com/office/drawing/2014/main" xmlns:a14="http://schemas.microsoft.com/office/drawing/2010/main" xmlns:p14="http://schemas.microsoft.com/office/powerpoint/2010/main" w="9525">
+                <a14:hiddenLine xmlns:p14="http://schemas.microsoft.com/office/powerpoint/2010/main" xmlns:a14="http://schemas.microsoft.com/office/drawing/2010/main" xmlns:a16="http://schemas.microsoft.com/office/drawing/2014/main" xmlns="" w="9525">
                   <a:solidFill>
                     <a:srgbClr val="000000"/>
                   </a:solidFill>
@@ -35042,7 +35037,7 @@
             </a:ln>
             <a:extLst>
               <a:ext uri="{91240B29-F687-4f45-9708-019B960494DF}">
-                <a14:hiddenLine xmlns="" xmlns:a16="http://schemas.microsoft.com/office/drawing/2014/main" xmlns:a14="http://schemas.microsoft.com/office/drawing/2010/main" xmlns:p14="http://schemas.microsoft.com/office/powerpoint/2010/main" w="9525">
+                <a14:hiddenLine xmlns:p14="http://schemas.microsoft.com/office/powerpoint/2010/main" xmlns:a14="http://schemas.microsoft.com/office/drawing/2010/main" xmlns:a16="http://schemas.microsoft.com/office/drawing/2014/main" xmlns="" w="9525">
                   <a:solidFill>
                     <a:srgbClr val="000000"/>
                   </a:solidFill>
@@ -35147,7 +35142,7 @@
             </a:ln>
             <a:extLst>
               <a:ext uri="{91240B29-F687-4f45-9708-019B960494DF}">
-                <a14:hiddenLine xmlns="" xmlns:a16="http://schemas.microsoft.com/office/drawing/2014/main" xmlns:a14="http://schemas.microsoft.com/office/drawing/2010/main" xmlns:p14="http://schemas.microsoft.com/office/powerpoint/2010/main" w="9525">
+                <a14:hiddenLine xmlns:p14="http://schemas.microsoft.com/office/powerpoint/2010/main" xmlns:a14="http://schemas.microsoft.com/office/drawing/2010/main" xmlns:a16="http://schemas.microsoft.com/office/drawing/2014/main" xmlns="" w="9525">
                   <a:solidFill>
                     <a:srgbClr val="000000"/>
                   </a:solidFill>
@@ -35224,7 +35219,7 @@
             </a:ln>
             <a:extLst>
               <a:ext uri="{91240B29-F687-4f45-9708-019B960494DF}">
-                <a14:hiddenLine xmlns="" xmlns:a16="http://schemas.microsoft.com/office/drawing/2014/main" xmlns:a14="http://schemas.microsoft.com/office/drawing/2010/main" xmlns:p14="http://schemas.microsoft.com/office/powerpoint/2010/main" w="9525">
+                <a14:hiddenLine xmlns:p14="http://schemas.microsoft.com/office/powerpoint/2010/main" xmlns:a14="http://schemas.microsoft.com/office/drawing/2010/main" xmlns:a16="http://schemas.microsoft.com/office/drawing/2014/main" xmlns="" w="9525">
                   <a:solidFill>
                     <a:srgbClr val="000000"/>
                   </a:solidFill>
@@ -35329,7 +35324,7 @@
             </a:ln>
             <a:extLst>
               <a:ext uri="{91240B29-F687-4f45-9708-019B960494DF}">
-                <a14:hiddenLine xmlns="" xmlns:a16="http://schemas.microsoft.com/office/drawing/2014/main" xmlns:a14="http://schemas.microsoft.com/office/drawing/2010/main" xmlns:p14="http://schemas.microsoft.com/office/powerpoint/2010/main" w="9525">
+                <a14:hiddenLine xmlns:p14="http://schemas.microsoft.com/office/powerpoint/2010/main" xmlns:a14="http://schemas.microsoft.com/office/drawing/2010/main" xmlns:a16="http://schemas.microsoft.com/office/drawing/2014/main" xmlns="" w="9525">
                   <a:solidFill>
                     <a:srgbClr val="000000"/>
                   </a:solidFill>
@@ -35378,7 +35373,7 @@
             </a:ln>
             <a:extLst>
               <a:ext uri="{91240B29-F687-4f45-9708-019B960494DF}">
-                <a14:hiddenLine xmlns="" xmlns:a16="http://schemas.microsoft.com/office/drawing/2014/main" xmlns:a14="http://schemas.microsoft.com/office/drawing/2010/main" xmlns:p14="http://schemas.microsoft.com/office/powerpoint/2010/main" w="9525">
+                <a14:hiddenLine xmlns:p14="http://schemas.microsoft.com/office/powerpoint/2010/main" xmlns:a14="http://schemas.microsoft.com/office/drawing/2010/main" xmlns:a16="http://schemas.microsoft.com/office/drawing/2014/main" xmlns="" w="9525">
                   <a:solidFill>
                     <a:srgbClr val="000000"/>
                   </a:solidFill>
@@ -35458,7 +35453,7 @@
             </a:ln>
             <a:extLst>
               <a:ext uri="{91240B29-F687-4f45-9708-019B960494DF}">
-                <a14:hiddenLine xmlns="" xmlns:a16="http://schemas.microsoft.com/office/drawing/2014/main" xmlns:a14="http://schemas.microsoft.com/office/drawing/2010/main" xmlns:p14="http://schemas.microsoft.com/office/powerpoint/2010/main" w="9525">
+                <a14:hiddenLine xmlns:p14="http://schemas.microsoft.com/office/powerpoint/2010/main" xmlns:a14="http://schemas.microsoft.com/office/drawing/2010/main" xmlns:a16="http://schemas.microsoft.com/office/drawing/2014/main" xmlns="" w="9525">
                   <a:solidFill>
                     <a:srgbClr val="000000"/>
                   </a:solidFill>
@@ -35563,7 +35558,7 @@
             </a:ln>
             <a:extLst>
               <a:ext uri="{91240B29-F687-4f45-9708-019B960494DF}">
-                <a14:hiddenLine xmlns="" xmlns:a16="http://schemas.microsoft.com/office/drawing/2014/main" xmlns:a14="http://schemas.microsoft.com/office/drawing/2010/main" xmlns:p14="http://schemas.microsoft.com/office/powerpoint/2010/main" w="9525">
+                <a14:hiddenLine xmlns:p14="http://schemas.microsoft.com/office/powerpoint/2010/main" xmlns:a14="http://schemas.microsoft.com/office/drawing/2010/main" xmlns:a16="http://schemas.microsoft.com/office/drawing/2014/main" xmlns="" w="9525">
                   <a:solidFill>
                     <a:srgbClr val="000000"/>
                   </a:solidFill>
@@ -35640,7 +35635,7 @@
             </a:ln>
             <a:extLst>
               <a:ext uri="{91240B29-F687-4f45-9708-019B960494DF}">
-                <a14:hiddenLine xmlns="" xmlns:a16="http://schemas.microsoft.com/office/drawing/2014/main" xmlns:a14="http://schemas.microsoft.com/office/drawing/2010/main" xmlns:p14="http://schemas.microsoft.com/office/powerpoint/2010/main" w="9525">
+                <a14:hiddenLine xmlns:p14="http://schemas.microsoft.com/office/powerpoint/2010/main" xmlns:a14="http://schemas.microsoft.com/office/drawing/2010/main" xmlns:a16="http://schemas.microsoft.com/office/drawing/2014/main" xmlns="" w="9525">
                   <a:solidFill>
                     <a:srgbClr val="000000"/>
                   </a:solidFill>
@@ -35745,7 +35740,7 @@
             </a:ln>
             <a:extLst>
               <a:ext uri="{91240B29-F687-4f45-9708-019B960494DF}">
-                <a14:hiddenLine xmlns="" xmlns:a16="http://schemas.microsoft.com/office/drawing/2014/main" xmlns:a14="http://schemas.microsoft.com/office/drawing/2010/main" xmlns:p14="http://schemas.microsoft.com/office/powerpoint/2010/main" w="9525">
+                <a14:hiddenLine xmlns:p14="http://schemas.microsoft.com/office/powerpoint/2010/main" xmlns:a14="http://schemas.microsoft.com/office/drawing/2010/main" xmlns:a16="http://schemas.microsoft.com/office/drawing/2014/main" xmlns="" w="9525">
                   <a:solidFill>
                     <a:srgbClr val="000000"/>
                   </a:solidFill>
@@ -35850,7 +35845,7 @@
             </a:ln>
             <a:extLst>
               <a:ext uri="{91240B29-F687-4f45-9708-019B960494DF}">
-                <a14:hiddenLine xmlns="" xmlns:a16="http://schemas.microsoft.com/office/drawing/2014/main" xmlns:a14="http://schemas.microsoft.com/office/drawing/2010/main" xmlns:p14="http://schemas.microsoft.com/office/powerpoint/2010/main" w="9525">
+                <a14:hiddenLine xmlns:p14="http://schemas.microsoft.com/office/powerpoint/2010/main" xmlns:a14="http://schemas.microsoft.com/office/drawing/2010/main" xmlns:a16="http://schemas.microsoft.com/office/drawing/2014/main" xmlns="" w="9525">
                   <a:solidFill>
                     <a:srgbClr val="000000"/>
                   </a:solidFill>
@@ -35930,7 +35925,7 @@
             </a:ln>
             <a:extLst>
               <a:ext uri="{91240B29-F687-4f45-9708-019B960494DF}">
-                <a14:hiddenLine xmlns="" xmlns:a16="http://schemas.microsoft.com/office/drawing/2014/main" xmlns:a14="http://schemas.microsoft.com/office/drawing/2010/main" xmlns:p14="http://schemas.microsoft.com/office/powerpoint/2010/main" w="9525">
+                <a14:hiddenLine xmlns:p14="http://schemas.microsoft.com/office/powerpoint/2010/main" xmlns:a14="http://schemas.microsoft.com/office/drawing/2010/main" xmlns:a16="http://schemas.microsoft.com/office/drawing/2014/main" xmlns="" w="9525">
                   <a:solidFill>
                     <a:srgbClr val="000000"/>
                   </a:solidFill>
@@ -36007,7 +36002,7 @@
             </a:ln>
             <a:extLst>
               <a:ext uri="{91240B29-F687-4f45-9708-019B960494DF}">
-                <a14:hiddenLine xmlns="" xmlns:a16="http://schemas.microsoft.com/office/drawing/2014/main" xmlns:a14="http://schemas.microsoft.com/office/drawing/2010/main" xmlns:p14="http://schemas.microsoft.com/office/powerpoint/2010/main" w="9525">
+                <a14:hiddenLine xmlns:p14="http://schemas.microsoft.com/office/powerpoint/2010/main" xmlns:a14="http://schemas.microsoft.com/office/drawing/2010/main" xmlns:a16="http://schemas.microsoft.com/office/drawing/2014/main" xmlns="" w="9525">
                   <a:solidFill>
                     <a:srgbClr val="000000"/>
                   </a:solidFill>
@@ -36112,7 +36107,7 @@
             </a:ln>
             <a:extLst>
               <a:ext uri="{91240B29-F687-4f45-9708-019B960494DF}">
-                <a14:hiddenLine xmlns="" xmlns:a16="http://schemas.microsoft.com/office/drawing/2014/main" xmlns:a14="http://schemas.microsoft.com/office/drawing/2010/main" xmlns:p14="http://schemas.microsoft.com/office/powerpoint/2010/main" w="9525">
+                <a14:hiddenLine xmlns:p14="http://schemas.microsoft.com/office/powerpoint/2010/main" xmlns:a14="http://schemas.microsoft.com/office/drawing/2010/main" xmlns:a16="http://schemas.microsoft.com/office/drawing/2014/main" xmlns="" w="9525">
                   <a:solidFill>
                     <a:srgbClr val="000000"/>
                   </a:solidFill>
@@ -36217,7 +36212,7 @@
             </a:ln>
             <a:extLst>
               <a:ext uri="{91240B29-F687-4f45-9708-019B960494DF}">
-                <a14:hiddenLine xmlns="" xmlns:a16="http://schemas.microsoft.com/office/drawing/2014/main" xmlns:a14="http://schemas.microsoft.com/office/drawing/2010/main" xmlns:p14="http://schemas.microsoft.com/office/powerpoint/2010/main" w="9525">
+                <a14:hiddenLine xmlns:p14="http://schemas.microsoft.com/office/powerpoint/2010/main" xmlns:a14="http://schemas.microsoft.com/office/drawing/2010/main" xmlns:a16="http://schemas.microsoft.com/office/drawing/2014/main" xmlns="" w="9525">
                   <a:solidFill>
                     <a:srgbClr val="000000"/>
                   </a:solidFill>
@@ -36294,7 +36289,7 @@
             </a:ln>
             <a:extLst>
               <a:ext uri="{91240B29-F687-4f45-9708-019B960494DF}">
-                <a14:hiddenLine xmlns="" xmlns:a16="http://schemas.microsoft.com/office/drawing/2014/main" xmlns:a14="http://schemas.microsoft.com/office/drawing/2010/main" xmlns:p14="http://schemas.microsoft.com/office/powerpoint/2010/main" w="9525">
+                <a14:hiddenLine xmlns:p14="http://schemas.microsoft.com/office/powerpoint/2010/main" xmlns:a14="http://schemas.microsoft.com/office/drawing/2010/main" xmlns:a16="http://schemas.microsoft.com/office/drawing/2014/main" xmlns="" w="9525">
                   <a:solidFill>
                     <a:srgbClr val="000000"/>
                   </a:solidFill>
@@ -36429,7 +36424,7 @@
             </a:ln>
             <a:extLst>
               <a:ext uri="{91240B29-F687-4f45-9708-019B960494DF}">
-                <a14:hiddenLine xmlns="" xmlns:a16="http://schemas.microsoft.com/office/drawing/2014/main" xmlns:a14="http://schemas.microsoft.com/office/drawing/2010/main" xmlns:p14="http://schemas.microsoft.com/office/powerpoint/2010/main" w="9525">
+                <a14:hiddenLine xmlns:p14="http://schemas.microsoft.com/office/powerpoint/2010/main" xmlns:a14="http://schemas.microsoft.com/office/drawing/2010/main" xmlns:a16="http://schemas.microsoft.com/office/drawing/2014/main" xmlns="" w="9525">
                   <a:solidFill>
                     <a:srgbClr val="000000"/>
                   </a:solidFill>
@@ -36512,7 +36507,7 @@
             </a:ln>
             <a:extLst>
               <a:ext uri="{91240B29-F687-4f45-9708-019B960494DF}">
-                <a14:hiddenLine xmlns="" xmlns:a16="http://schemas.microsoft.com/office/drawing/2014/main" xmlns:a14="http://schemas.microsoft.com/office/drawing/2010/main" xmlns:p14="http://schemas.microsoft.com/office/powerpoint/2010/main" w="9525">
+                <a14:hiddenLine xmlns:p14="http://schemas.microsoft.com/office/powerpoint/2010/main" xmlns:a14="http://schemas.microsoft.com/office/drawing/2010/main" xmlns:a16="http://schemas.microsoft.com/office/drawing/2014/main" xmlns="" w="9525">
                   <a:solidFill>
                     <a:srgbClr val="000000"/>
                   </a:solidFill>
@@ -36617,7 +36612,7 @@
             </a:ln>
             <a:extLst>
               <a:ext uri="{91240B29-F687-4f45-9708-019B960494DF}">
-                <a14:hiddenLine xmlns="" xmlns:a16="http://schemas.microsoft.com/office/drawing/2014/main" xmlns:a14="http://schemas.microsoft.com/office/drawing/2010/main" xmlns:p14="http://schemas.microsoft.com/office/powerpoint/2010/main" w="9525">
+                <a14:hiddenLine xmlns:p14="http://schemas.microsoft.com/office/powerpoint/2010/main" xmlns:a14="http://schemas.microsoft.com/office/drawing/2010/main" xmlns:a16="http://schemas.microsoft.com/office/drawing/2014/main" xmlns="" w="9525">
                   <a:solidFill>
                     <a:srgbClr val="000000"/>
                   </a:solidFill>
@@ -36747,7 +36742,7 @@
             </a:ln>
             <a:extLst>
               <a:ext uri="{91240B29-F687-4f45-9708-019B960494DF}">
-                <a14:hiddenLine xmlns="" xmlns:a16="http://schemas.microsoft.com/office/drawing/2014/main" xmlns:a14="http://schemas.microsoft.com/office/drawing/2010/main" xmlns:p14="http://schemas.microsoft.com/office/powerpoint/2010/main" w="9525">
+                <a14:hiddenLine xmlns:p14="http://schemas.microsoft.com/office/powerpoint/2010/main" xmlns:a14="http://schemas.microsoft.com/office/drawing/2010/main" xmlns:a16="http://schemas.microsoft.com/office/drawing/2014/main" xmlns="" w="9525">
                   <a:solidFill>
                     <a:srgbClr val="000000"/>
                   </a:solidFill>
@@ -36877,7 +36872,7 @@
             </a:ln>
             <a:extLst>
               <a:ext uri="{91240B29-F687-4f45-9708-019B960494DF}">
-                <a14:hiddenLine xmlns="" xmlns:a16="http://schemas.microsoft.com/office/drawing/2014/main" xmlns:a14="http://schemas.microsoft.com/office/drawing/2010/main" xmlns:p14="http://schemas.microsoft.com/office/powerpoint/2010/main" w="9525">
+                <a14:hiddenLine xmlns:p14="http://schemas.microsoft.com/office/powerpoint/2010/main" xmlns:a14="http://schemas.microsoft.com/office/drawing/2010/main" xmlns:a16="http://schemas.microsoft.com/office/drawing/2014/main" xmlns="" w="9525">
                   <a:solidFill>
                     <a:srgbClr val="000000"/>
                   </a:solidFill>
@@ -36982,7 +36977,7 @@
             </a:ln>
             <a:extLst>
               <a:ext uri="{91240B29-F687-4f45-9708-019B960494DF}">
-                <a14:hiddenLine xmlns="" xmlns:a16="http://schemas.microsoft.com/office/drawing/2014/main" xmlns:a14="http://schemas.microsoft.com/office/drawing/2010/main" xmlns:p14="http://schemas.microsoft.com/office/powerpoint/2010/main" w="9525">
+                <a14:hiddenLine xmlns:p14="http://schemas.microsoft.com/office/powerpoint/2010/main" xmlns:a14="http://schemas.microsoft.com/office/drawing/2010/main" xmlns:a16="http://schemas.microsoft.com/office/drawing/2014/main" xmlns="" w="9525">
                   <a:solidFill>
                     <a:srgbClr val="000000"/>
                   </a:solidFill>
@@ -37062,7 +37057,7 @@
             </a:ln>
             <a:extLst>
               <a:ext uri="{91240B29-F687-4f45-9708-019B960494DF}">
-                <a14:hiddenLine xmlns="" xmlns:a16="http://schemas.microsoft.com/office/drawing/2014/main" xmlns:a14="http://schemas.microsoft.com/office/drawing/2010/main" xmlns:p14="http://schemas.microsoft.com/office/powerpoint/2010/main" w="9525">
+                <a14:hiddenLine xmlns:p14="http://schemas.microsoft.com/office/powerpoint/2010/main" xmlns:a14="http://schemas.microsoft.com/office/drawing/2010/main" xmlns:a16="http://schemas.microsoft.com/office/drawing/2014/main" xmlns="" w="9525">
                   <a:solidFill>
                     <a:srgbClr val="000000"/>
                   </a:solidFill>
@@ -37167,7 +37162,7 @@
             </a:ln>
             <a:extLst>
               <a:ext uri="{91240B29-F687-4f45-9708-019B960494DF}">
-                <a14:hiddenLine xmlns="" xmlns:a16="http://schemas.microsoft.com/office/drawing/2014/main" xmlns:a14="http://schemas.microsoft.com/office/drawing/2010/main" xmlns:p14="http://schemas.microsoft.com/office/powerpoint/2010/main" w="9525">
+                <a14:hiddenLine xmlns:p14="http://schemas.microsoft.com/office/powerpoint/2010/main" xmlns:a14="http://schemas.microsoft.com/office/drawing/2010/main" xmlns:a16="http://schemas.microsoft.com/office/drawing/2014/main" xmlns="" w="9525">
                   <a:solidFill>
                     <a:srgbClr val="000000"/>
                   </a:solidFill>
@@ -37250,7 +37245,7 @@
             </a:ln>
             <a:extLst>
               <a:ext uri="{91240B29-F687-4f45-9708-019B960494DF}">
-                <a14:hiddenLine xmlns="" xmlns:a16="http://schemas.microsoft.com/office/drawing/2014/main" xmlns:a14="http://schemas.microsoft.com/office/drawing/2010/main" xmlns:p14="http://schemas.microsoft.com/office/powerpoint/2010/main" w="9525">
+                <a14:hiddenLine xmlns:p14="http://schemas.microsoft.com/office/powerpoint/2010/main" xmlns:a14="http://schemas.microsoft.com/office/drawing/2010/main" xmlns:a16="http://schemas.microsoft.com/office/drawing/2014/main" xmlns="" w="9525">
                   <a:solidFill>
                     <a:srgbClr val="000000"/>
                   </a:solidFill>
@@ -37355,7 +37350,7 @@
             </a:ln>
             <a:extLst>
               <a:ext uri="{91240B29-F687-4f45-9708-019B960494DF}">
-                <a14:hiddenLine xmlns="" xmlns:a16="http://schemas.microsoft.com/office/drawing/2014/main" xmlns:a14="http://schemas.microsoft.com/office/drawing/2010/main" xmlns:p14="http://schemas.microsoft.com/office/powerpoint/2010/main" w="9525">
+                <a14:hiddenLine xmlns:p14="http://schemas.microsoft.com/office/powerpoint/2010/main" xmlns:a14="http://schemas.microsoft.com/office/drawing/2010/main" xmlns:a16="http://schemas.microsoft.com/office/drawing/2014/main" xmlns="" w="9525">
                   <a:solidFill>
                     <a:srgbClr val="000000"/>
                   </a:solidFill>
@@ -37438,7 +37433,7 @@
             </a:ln>
             <a:extLst>
               <a:ext uri="{91240B29-F687-4f45-9708-019B960494DF}">
-                <a14:hiddenLine xmlns="" xmlns:a16="http://schemas.microsoft.com/office/drawing/2014/main" xmlns:a14="http://schemas.microsoft.com/office/drawing/2010/main" xmlns:p14="http://schemas.microsoft.com/office/powerpoint/2010/main" w="9525">
+                <a14:hiddenLine xmlns:p14="http://schemas.microsoft.com/office/powerpoint/2010/main" xmlns:a14="http://schemas.microsoft.com/office/drawing/2010/main" xmlns:a16="http://schemas.microsoft.com/office/drawing/2014/main" xmlns="" w="9525">
                   <a:solidFill>
                     <a:srgbClr val="000000"/>
                   </a:solidFill>
@@ -37543,7 +37538,7 @@
             </a:ln>
             <a:extLst>
               <a:ext uri="{91240B29-F687-4f45-9708-019B960494DF}">
-                <a14:hiddenLine xmlns="" xmlns:a16="http://schemas.microsoft.com/office/drawing/2014/main" xmlns:a14="http://schemas.microsoft.com/office/drawing/2010/main" xmlns:p14="http://schemas.microsoft.com/office/powerpoint/2010/main" w="9525">
+                <a14:hiddenLine xmlns:p14="http://schemas.microsoft.com/office/powerpoint/2010/main" xmlns:a14="http://schemas.microsoft.com/office/drawing/2010/main" xmlns:a16="http://schemas.microsoft.com/office/drawing/2014/main" xmlns="" w="9525">
                   <a:solidFill>
                     <a:srgbClr val="000000"/>
                   </a:solidFill>
@@ -37592,7 +37587,7 @@
             </a:ln>
             <a:extLst>
               <a:ext uri="{91240B29-F687-4f45-9708-019B960494DF}">
-                <a14:hiddenLine xmlns="" xmlns:a16="http://schemas.microsoft.com/office/drawing/2014/main" xmlns:a14="http://schemas.microsoft.com/office/drawing/2010/main" xmlns:p14="http://schemas.microsoft.com/office/powerpoint/2010/main" w="9525">
+                <a14:hiddenLine xmlns:p14="http://schemas.microsoft.com/office/powerpoint/2010/main" xmlns:a14="http://schemas.microsoft.com/office/drawing/2010/main" xmlns:a16="http://schemas.microsoft.com/office/drawing/2014/main" xmlns="" w="9525">
                   <a:solidFill>
                     <a:srgbClr val="000000"/>
                   </a:solidFill>

</xml_diff>